<commit_message>
created powerpoint presentation slides. Now they just need some words
</commit_message>
<xml_diff>
--- a/Presentation/SocialHub_FrancisT_06_23_2020.pptx
+++ b/Presentation/SocialHub_FrancisT_06_23_2020.pptx
@@ -6,6 +6,22 @@
   </p:sldMasterIdLst>
   <p:sldIdLst>
     <p:sldId id="256" r:id="rId2"/>
+    <p:sldId id="259" r:id="rId3"/>
+    <p:sldId id="257" r:id="rId4"/>
+    <p:sldId id="260" r:id="rId5"/>
+    <p:sldId id="264" r:id="rId6"/>
+    <p:sldId id="261" r:id="rId7"/>
+    <p:sldId id="262" r:id="rId8"/>
+    <p:sldId id="263" r:id="rId9"/>
+    <p:sldId id="265" r:id="rId10"/>
+    <p:sldId id="266" r:id="rId11"/>
+    <p:sldId id="267" r:id="rId12"/>
+    <p:sldId id="268" r:id="rId13"/>
+    <p:sldId id="269" r:id="rId14"/>
+    <p:sldId id="270" r:id="rId15"/>
+    <p:sldId id="271" r:id="rId16"/>
+    <p:sldId id="272" r:id="rId17"/>
+    <p:sldId id="273" r:id="rId18"/>
   </p:sldIdLst>
   <p:sldSz cx="12192000" cy="6858000"/>
   <p:notesSz cx="6858000" cy="9144000"/>
@@ -104,7 +120,192 @@
       </a:defRPr>
     </a:lvl9pPr>
   </p:defaultTextStyle>
+  <p:extLst>
+    <p:ext uri="{EFAFB233-063F-42B5-8137-9DF3F51BA10A}">
+      <p15:sldGuideLst xmlns:p15="http://schemas.microsoft.com/office/powerpoint/2012/main"/>
+    </p:ext>
+  </p:extLst>
 </p:presentation>
+</file>
+
+<file path=ppt/revisionInfo.xml><?xml version="1.0" encoding="utf-8"?>
+<p1510:revInfo xmlns:a="http://schemas.openxmlformats.org/drawingml/2006/main" xmlns:r="http://schemas.openxmlformats.org/officeDocument/2006/relationships" xmlns:p1510="http://schemas.microsoft.com/office/powerpoint/2015/10/main">
+  <p1510:revLst>
+    <p1510:client id="{E2F6CC62-A8FA-4CA3-B44E-705F9FC4EF55}" v="22" dt="2020-06-23T20:03:29.650"/>
+  </p1510:revLst>
+</p1510:revInfo>
+</file>
+
+<file path=ppt/changesInfos/changesInfo1.xml><?xml version="1.0" encoding="utf-8"?>
+<pc:chgInfo xmlns:a="http://schemas.openxmlformats.org/drawingml/2006/main" xmlns:r="http://schemas.openxmlformats.org/officeDocument/2006/relationships" xmlns:ac="http://schemas.microsoft.com/office/drawing/2013/main/command" xmlns:pc="http://schemas.microsoft.com/office/powerpoint/2013/main/command">
+  <pc:docChgLst>
+    <pc:chgData name="Francis, Thomas" userId="2e7f689e-290c-4746-ba0f-274b885931e9" providerId="ADAL" clId="{E2F6CC62-A8FA-4CA3-B44E-705F9FC4EF55}"/>
+    <pc:docChg chg="addSld modSld">
+      <pc:chgData name="Francis, Thomas" userId="2e7f689e-290c-4746-ba0f-274b885931e9" providerId="ADAL" clId="{E2F6CC62-A8FA-4CA3-B44E-705F9FC4EF55}" dt="2020-06-23T20:03:29.649" v="21"/>
+      <pc:docMkLst>
+        <pc:docMk/>
+      </pc:docMkLst>
+      <pc:sldChg chg="add">
+        <pc:chgData name="Francis, Thomas" userId="2e7f689e-290c-4746-ba0f-274b885931e9" providerId="ADAL" clId="{E2F6CC62-A8FA-4CA3-B44E-705F9FC4EF55}" dt="2020-06-23T19:21:32.184" v="0"/>
+        <pc:sldMkLst>
+          <pc:docMk/>
+          <pc:sldMk cId="3120845105" sldId="257"/>
+        </pc:sldMkLst>
+      </pc:sldChg>
+      <pc:sldChg chg="add">
+        <pc:chgData name="Francis, Thomas" userId="2e7f689e-290c-4746-ba0f-274b885931e9" providerId="ADAL" clId="{E2F6CC62-A8FA-4CA3-B44E-705F9FC4EF55}" dt="2020-06-23T19:25:52.582" v="1"/>
+        <pc:sldMkLst>
+          <pc:docMk/>
+          <pc:sldMk cId="3646455698" sldId="258"/>
+        </pc:sldMkLst>
+      </pc:sldChg>
+      <pc:sldChg chg="add">
+        <pc:chgData name="Francis, Thomas" userId="2e7f689e-290c-4746-ba0f-274b885931e9" providerId="ADAL" clId="{E2F6CC62-A8FA-4CA3-B44E-705F9FC4EF55}" dt="2020-06-23T19:27:40.992" v="2"/>
+        <pc:sldMkLst>
+          <pc:docMk/>
+          <pc:sldMk cId="2261067227" sldId="259"/>
+        </pc:sldMkLst>
+      </pc:sldChg>
+      <pc:sldChg chg="add">
+        <pc:chgData name="Francis, Thomas" userId="2e7f689e-290c-4746-ba0f-274b885931e9" providerId="ADAL" clId="{E2F6CC62-A8FA-4CA3-B44E-705F9FC4EF55}" dt="2020-06-23T19:29:19.158" v="3"/>
+        <pc:sldMkLst>
+          <pc:docMk/>
+          <pc:sldMk cId="1218510847" sldId="260"/>
+        </pc:sldMkLst>
+      </pc:sldChg>
+      <pc:sldChg chg="add">
+        <pc:chgData name="Francis, Thomas" userId="2e7f689e-290c-4746-ba0f-274b885931e9" providerId="ADAL" clId="{E2F6CC62-A8FA-4CA3-B44E-705F9FC4EF55}" dt="2020-06-23T19:30:46.506" v="4"/>
+        <pc:sldMkLst>
+          <pc:docMk/>
+          <pc:sldMk cId="1869608470" sldId="261"/>
+        </pc:sldMkLst>
+      </pc:sldChg>
+      <pc:sldChg chg="add">
+        <pc:chgData name="Francis, Thomas" userId="2e7f689e-290c-4746-ba0f-274b885931e9" providerId="ADAL" clId="{E2F6CC62-A8FA-4CA3-B44E-705F9FC4EF55}" dt="2020-06-23T19:31:18.217" v="5"/>
+        <pc:sldMkLst>
+          <pc:docMk/>
+          <pc:sldMk cId="3390689853" sldId="262"/>
+        </pc:sldMkLst>
+      </pc:sldChg>
+      <pc:sldChg chg="add">
+        <pc:chgData name="Francis, Thomas" userId="2e7f689e-290c-4746-ba0f-274b885931e9" providerId="ADAL" clId="{E2F6CC62-A8FA-4CA3-B44E-705F9FC4EF55}" dt="2020-06-23T19:31:36.099" v="6"/>
+        <pc:sldMkLst>
+          <pc:docMk/>
+          <pc:sldMk cId="3588991441" sldId="263"/>
+        </pc:sldMkLst>
+      </pc:sldChg>
+      <pc:sldChg chg="modSp add">
+        <pc:chgData name="Francis, Thomas" userId="2e7f689e-290c-4746-ba0f-274b885931e9" providerId="ADAL" clId="{E2F6CC62-A8FA-4CA3-B44E-705F9FC4EF55}" dt="2020-06-23T19:36:32.553" v="8"/>
+        <pc:sldMkLst>
+          <pc:docMk/>
+          <pc:sldMk cId="2857083325" sldId="264"/>
+        </pc:sldMkLst>
+        <pc:spChg chg="mod">
+          <ac:chgData name="Francis, Thomas" userId="2e7f689e-290c-4746-ba0f-274b885931e9" providerId="ADAL" clId="{E2F6CC62-A8FA-4CA3-B44E-705F9FC4EF55}" dt="2020-06-23T19:36:32.553" v="8"/>
+          <ac:spMkLst>
+            <pc:docMk/>
+            <pc:sldMk cId="2857083325" sldId="264"/>
+            <ac:spMk id="2" creationId="{03A83AAA-7579-4CCF-B549-55E15067F0C9}"/>
+          </ac:spMkLst>
+        </pc:spChg>
+      </pc:sldChg>
+      <pc:sldChg chg="add">
+        <pc:chgData name="Francis, Thomas" userId="2e7f689e-290c-4746-ba0f-274b885931e9" providerId="ADAL" clId="{E2F6CC62-A8FA-4CA3-B44E-705F9FC4EF55}" dt="2020-06-23T19:37:06.500" v="9"/>
+        <pc:sldMkLst>
+          <pc:docMk/>
+          <pc:sldMk cId="3954596595" sldId="265"/>
+        </pc:sldMkLst>
+      </pc:sldChg>
+      <pc:sldChg chg="add">
+        <pc:chgData name="Francis, Thomas" userId="2e7f689e-290c-4746-ba0f-274b885931e9" providerId="ADAL" clId="{E2F6CC62-A8FA-4CA3-B44E-705F9FC4EF55}" dt="2020-06-23T19:37:32.212" v="10"/>
+        <pc:sldMkLst>
+          <pc:docMk/>
+          <pc:sldMk cId="769491226" sldId="266"/>
+        </pc:sldMkLst>
+      </pc:sldChg>
+      <pc:sldChg chg="modSp add">
+        <pc:chgData name="Francis, Thomas" userId="2e7f689e-290c-4746-ba0f-274b885931e9" providerId="ADAL" clId="{E2F6CC62-A8FA-4CA3-B44E-705F9FC4EF55}" dt="2020-06-23T19:40:22.187" v="12"/>
+        <pc:sldMkLst>
+          <pc:docMk/>
+          <pc:sldMk cId="2268850528" sldId="267"/>
+        </pc:sldMkLst>
+        <pc:spChg chg="mod">
+          <ac:chgData name="Francis, Thomas" userId="2e7f689e-290c-4746-ba0f-274b885931e9" providerId="ADAL" clId="{E2F6CC62-A8FA-4CA3-B44E-705F9FC4EF55}" dt="2020-06-23T19:40:22.187" v="12"/>
+          <ac:spMkLst>
+            <pc:docMk/>
+            <pc:sldMk cId="2268850528" sldId="267"/>
+            <ac:spMk id="2" creationId="{B3037C3D-BFC2-4468-9E2B-915398E1B4AA}"/>
+          </ac:spMkLst>
+        </pc:spChg>
+      </pc:sldChg>
+      <pc:sldChg chg="add">
+        <pc:chgData name="Francis, Thomas" userId="2e7f689e-290c-4746-ba0f-274b885931e9" providerId="ADAL" clId="{E2F6CC62-A8FA-4CA3-B44E-705F9FC4EF55}" dt="2020-06-23T19:41:19.089" v="15"/>
+        <pc:sldMkLst>
+          <pc:docMk/>
+          <pc:sldMk cId="1372409126" sldId="268"/>
+        </pc:sldMkLst>
+      </pc:sldChg>
+      <pc:sldChg chg="modSp add">
+        <pc:chgData name="Francis, Thomas" userId="2e7f689e-290c-4746-ba0f-274b885931e9" providerId="ADAL" clId="{E2F6CC62-A8FA-4CA3-B44E-705F9FC4EF55}" dt="2020-06-23T19:40:44.097" v="14"/>
+        <pc:sldMkLst>
+          <pc:docMk/>
+          <pc:sldMk cId="2347595266" sldId="268"/>
+        </pc:sldMkLst>
+        <pc:spChg chg="mod">
+          <ac:chgData name="Francis, Thomas" userId="2e7f689e-290c-4746-ba0f-274b885931e9" providerId="ADAL" clId="{E2F6CC62-A8FA-4CA3-B44E-705F9FC4EF55}" dt="2020-06-23T19:40:44.097" v="14"/>
+          <ac:spMkLst>
+            <pc:docMk/>
+            <pc:sldMk cId="2347595266" sldId="268"/>
+            <ac:spMk id="2" creationId="{98295DE0-31D7-4D91-A9AD-C3EE6CBCE0A4}"/>
+          </ac:spMkLst>
+        </pc:spChg>
+      </pc:sldChg>
+      <pc:sldChg chg="modSp add">
+        <pc:chgData name="Francis, Thomas" userId="2e7f689e-290c-4746-ba0f-274b885931e9" providerId="ADAL" clId="{E2F6CC62-A8FA-4CA3-B44E-705F9FC4EF55}" dt="2020-06-23T19:44:39.336" v="17"/>
+        <pc:sldMkLst>
+          <pc:docMk/>
+          <pc:sldMk cId="3782560227" sldId="269"/>
+        </pc:sldMkLst>
+        <pc:spChg chg="mod">
+          <ac:chgData name="Francis, Thomas" userId="2e7f689e-290c-4746-ba0f-274b885931e9" providerId="ADAL" clId="{E2F6CC62-A8FA-4CA3-B44E-705F9FC4EF55}" dt="2020-06-23T19:44:39.336" v="17"/>
+          <ac:spMkLst>
+            <pc:docMk/>
+            <pc:sldMk cId="3782560227" sldId="269"/>
+            <ac:spMk id="2" creationId="{C8C62815-189A-4B56-BE46-22DD75FF65EF}"/>
+          </ac:spMkLst>
+        </pc:spChg>
+      </pc:sldChg>
+      <pc:sldChg chg="add">
+        <pc:chgData name="Francis, Thomas" userId="2e7f689e-290c-4746-ba0f-274b885931e9" providerId="ADAL" clId="{E2F6CC62-A8FA-4CA3-B44E-705F9FC4EF55}" dt="2020-06-23T19:47:10.964" v="18"/>
+        <pc:sldMkLst>
+          <pc:docMk/>
+          <pc:sldMk cId="3084942385" sldId="270"/>
+        </pc:sldMkLst>
+      </pc:sldChg>
+      <pc:sldChg chg="add">
+        <pc:chgData name="Francis, Thomas" userId="2e7f689e-290c-4746-ba0f-274b885931e9" providerId="ADAL" clId="{E2F6CC62-A8FA-4CA3-B44E-705F9FC4EF55}" dt="2020-06-23T19:49:29.744" v="19"/>
+        <pc:sldMkLst>
+          <pc:docMk/>
+          <pc:sldMk cId="2554370827" sldId="271"/>
+        </pc:sldMkLst>
+      </pc:sldChg>
+      <pc:sldChg chg="add">
+        <pc:chgData name="Francis, Thomas" userId="2e7f689e-290c-4746-ba0f-274b885931e9" providerId="ADAL" clId="{E2F6CC62-A8FA-4CA3-B44E-705F9FC4EF55}" dt="2020-06-23T19:51:38.718" v="20"/>
+        <pc:sldMkLst>
+          <pc:docMk/>
+          <pc:sldMk cId="3345576059" sldId="272"/>
+        </pc:sldMkLst>
+      </pc:sldChg>
+      <pc:sldChg chg="add">
+        <pc:chgData name="Francis, Thomas" userId="2e7f689e-290c-4746-ba0f-274b885931e9" providerId="ADAL" clId="{E2F6CC62-A8FA-4CA3-B44E-705F9FC4EF55}" dt="2020-06-23T20:03:29.649" v="21"/>
+        <pc:sldMkLst>
+          <pc:docMk/>
+          <pc:sldMk cId="3166939221" sldId="273"/>
+        </pc:sldMkLst>
+      </pc:sldChg>
+    </pc:docChg>
+  </pc:docChgLst>
+</pc:chgInfo>
 </file>
 
 <file path=ppt/slideLayouts/slideLayout1.xml><?xml version="1.0" encoding="utf-8"?>
@@ -7640,7 +7841,10 @@
           <a:bodyPr/>
           <a:lstStyle/>
           <a:p>
-            <a:endParaRPr lang="en-US" dirty="0"/>
+            <a:r>
+              <a:rPr lang="en-US" dirty="0"/>
+              <a:t>Name of This Business</a:t>
+            </a:r>
           </a:p>
         </p:txBody>
       </p:sp>
@@ -7667,7 +7871,7 @@
           <a:p>
             <a:r>
               <a:rPr lang="en-US" dirty="0"/>
-              <a:t>THE Social Hub for Adults</a:t>
+              <a:t>An Adult Social Hub</a:t>
             </a:r>
           </a:p>
         </p:txBody>
@@ -7676,6 +7880,1468 @@
     <p:extLst>
       <p:ext uri="{BB962C8B-B14F-4D97-AF65-F5344CB8AC3E}">
         <p14:creationId xmlns:p14="http://schemas.microsoft.com/office/powerpoint/2010/main" val="118792049"/>
+      </p:ext>
+    </p:extLst>
+  </p:cSld>
+  <p:clrMapOvr>
+    <a:masterClrMapping/>
+  </p:clrMapOvr>
+</p:sld>
+</file>
+
+<file path=ppt/slides/slide10.xml><?xml version="1.0" encoding="utf-8"?>
+<p:sld xmlns:a="http://schemas.openxmlformats.org/drawingml/2006/main" xmlns:r="http://schemas.openxmlformats.org/officeDocument/2006/relationships" xmlns:p="http://schemas.openxmlformats.org/presentationml/2006/main">
+  <p:cSld>
+    <p:spTree>
+      <p:nvGrpSpPr>
+        <p:cNvPr id="1" name=""/>
+        <p:cNvGrpSpPr/>
+        <p:nvPr/>
+      </p:nvGrpSpPr>
+      <p:grpSpPr>
+        <a:xfrm>
+          <a:off x="0" y="0"/>
+          <a:ext cx="0" cy="0"/>
+          <a:chOff x="0" y="0"/>
+          <a:chExt cx="0" cy="0"/>
+        </a:xfrm>
+      </p:grpSpPr>
+      <p:sp>
+        <p:nvSpPr>
+          <p:cNvPr id="2" name="Title 1">
+            <a:extLst>
+              <a:ext uri="{FF2B5EF4-FFF2-40B4-BE49-F238E27FC236}">
+                <a16:creationId xmlns:a16="http://schemas.microsoft.com/office/drawing/2014/main" id="{4662463E-1C73-4495-9B05-DD94995DA51C}"/>
+              </a:ext>
+            </a:extLst>
+          </p:cNvPr>
+          <p:cNvSpPr>
+            <a:spLocks noGrp="1"/>
+          </p:cNvSpPr>
+          <p:nvPr>
+            <p:ph type="title"/>
+          </p:nvPr>
+        </p:nvSpPr>
+        <p:spPr/>
+        <p:txBody>
+          <a:bodyPr/>
+          <a:lstStyle/>
+          <a:p>
+            <a:r>
+              <a:rPr lang="en-US" dirty="0"/>
+              <a:t>Getting people through the door: innovators and early adopters.</a:t>
+            </a:r>
+          </a:p>
+        </p:txBody>
+      </p:sp>
+      <p:sp>
+        <p:nvSpPr>
+          <p:cNvPr id="3" name="Content Placeholder 2">
+            <a:extLst>
+              <a:ext uri="{FF2B5EF4-FFF2-40B4-BE49-F238E27FC236}">
+                <a16:creationId xmlns:a16="http://schemas.microsoft.com/office/drawing/2014/main" id="{C83C7887-2280-44A9-A116-CC573F03482B}"/>
+              </a:ext>
+            </a:extLst>
+          </p:cNvPr>
+          <p:cNvSpPr>
+            <a:spLocks noGrp="1"/>
+          </p:cNvSpPr>
+          <p:nvPr>
+            <p:ph idx="1"/>
+          </p:nvPr>
+        </p:nvSpPr>
+        <p:spPr/>
+        <p:txBody>
+          <a:bodyPr/>
+          <a:lstStyle/>
+          <a:p>
+            <a:endParaRPr lang="en-US" dirty="0"/>
+          </a:p>
+        </p:txBody>
+      </p:sp>
+    </p:spTree>
+    <p:extLst>
+      <p:ext uri="{BB962C8B-B14F-4D97-AF65-F5344CB8AC3E}">
+        <p14:creationId xmlns:p14="http://schemas.microsoft.com/office/powerpoint/2010/main" val="769491226"/>
+      </p:ext>
+    </p:extLst>
+  </p:cSld>
+  <p:clrMapOvr>
+    <a:masterClrMapping/>
+  </p:clrMapOvr>
+</p:sld>
+</file>
+
+<file path=ppt/slides/slide11.xml><?xml version="1.0" encoding="utf-8"?>
+<p:sld xmlns:a="http://schemas.openxmlformats.org/drawingml/2006/main" xmlns:r="http://schemas.openxmlformats.org/officeDocument/2006/relationships" xmlns:p="http://schemas.openxmlformats.org/presentationml/2006/main">
+  <p:cSld>
+    <p:spTree>
+      <p:nvGrpSpPr>
+        <p:cNvPr id="1" name=""/>
+        <p:cNvGrpSpPr/>
+        <p:nvPr/>
+      </p:nvGrpSpPr>
+      <p:grpSpPr>
+        <a:xfrm>
+          <a:off x="0" y="0"/>
+          <a:ext cx="0" cy="0"/>
+          <a:chOff x="0" y="0"/>
+          <a:chExt cx="0" cy="0"/>
+        </a:xfrm>
+      </p:grpSpPr>
+      <p:sp>
+        <p:nvSpPr>
+          <p:cNvPr id="2" name="Title 1">
+            <a:extLst>
+              <a:ext uri="{FF2B5EF4-FFF2-40B4-BE49-F238E27FC236}">
+                <a16:creationId xmlns:a16="http://schemas.microsoft.com/office/drawing/2014/main" id="{B3037C3D-BFC2-4468-9E2B-915398E1B4AA}"/>
+              </a:ext>
+            </a:extLst>
+          </p:cNvPr>
+          <p:cNvSpPr>
+            <a:spLocks noGrp="1"/>
+          </p:cNvSpPr>
+          <p:nvPr>
+            <p:ph type="title"/>
+          </p:nvPr>
+        </p:nvSpPr>
+        <p:spPr/>
+        <p:txBody>
+          <a:bodyPr/>
+          <a:lstStyle/>
+          <a:p>
+            <a:r>
+              <a:rPr lang="en-US" dirty="0"/>
+              <a:t>Getting people through the door: mainstream and late adopters.</a:t>
+            </a:r>
+          </a:p>
+        </p:txBody>
+      </p:sp>
+      <p:sp>
+        <p:nvSpPr>
+          <p:cNvPr id="3" name="Content Placeholder 2">
+            <a:extLst>
+              <a:ext uri="{FF2B5EF4-FFF2-40B4-BE49-F238E27FC236}">
+                <a16:creationId xmlns:a16="http://schemas.microsoft.com/office/drawing/2014/main" id="{82D175DE-DD27-4B6D-A263-AF7633BD39F3}"/>
+              </a:ext>
+            </a:extLst>
+          </p:cNvPr>
+          <p:cNvSpPr>
+            <a:spLocks noGrp="1"/>
+          </p:cNvSpPr>
+          <p:nvPr>
+            <p:ph idx="1"/>
+          </p:nvPr>
+        </p:nvSpPr>
+        <p:spPr/>
+        <p:txBody>
+          <a:bodyPr/>
+          <a:lstStyle/>
+          <a:p>
+            <a:endParaRPr lang="en-US"/>
+          </a:p>
+        </p:txBody>
+      </p:sp>
+    </p:spTree>
+    <p:extLst>
+      <p:ext uri="{BB962C8B-B14F-4D97-AF65-F5344CB8AC3E}">
+        <p14:creationId xmlns:p14="http://schemas.microsoft.com/office/powerpoint/2010/main" val="2268850528"/>
+      </p:ext>
+    </p:extLst>
+  </p:cSld>
+  <p:clrMapOvr>
+    <a:masterClrMapping/>
+  </p:clrMapOvr>
+</p:sld>
+</file>
+
+<file path=ppt/slides/slide12.xml><?xml version="1.0" encoding="utf-8"?>
+<p:sld xmlns:a="http://schemas.openxmlformats.org/drawingml/2006/main" xmlns:r="http://schemas.openxmlformats.org/officeDocument/2006/relationships" xmlns:p="http://schemas.openxmlformats.org/presentationml/2006/main">
+  <p:cSld>
+    <p:spTree>
+      <p:nvGrpSpPr>
+        <p:cNvPr id="1" name=""/>
+        <p:cNvGrpSpPr/>
+        <p:nvPr/>
+      </p:nvGrpSpPr>
+      <p:grpSpPr>
+        <a:xfrm>
+          <a:off x="0" y="0"/>
+          <a:ext cx="0" cy="0"/>
+          <a:chOff x="0" y="0"/>
+          <a:chExt cx="0" cy="0"/>
+        </a:xfrm>
+      </p:grpSpPr>
+      <p:sp>
+        <p:nvSpPr>
+          <p:cNvPr id="2" name="Title 1">
+            <a:extLst>
+              <a:ext uri="{FF2B5EF4-FFF2-40B4-BE49-F238E27FC236}">
+                <a16:creationId xmlns:a16="http://schemas.microsoft.com/office/drawing/2014/main" id="{BA951A29-BC9A-4D1A-A73C-FDD2862C3BAA}"/>
+              </a:ext>
+            </a:extLst>
+          </p:cNvPr>
+          <p:cNvSpPr>
+            <a:spLocks noGrp="1"/>
+          </p:cNvSpPr>
+          <p:nvPr>
+            <p:ph type="title"/>
+          </p:nvPr>
+        </p:nvSpPr>
+        <p:spPr/>
+        <p:txBody>
+          <a:bodyPr/>
+          <a:lstStyle/>
+          <a:p>
+            <a:r>
+              <a:rPr lang="en-US" dirty="0"/>
+              <a:t>Maintaining Long-term relevancy: flexibility and foresight.</a:t>
+            </a:r>
+          </a:p>
+        </p:txBody>
+      </p:sp>
+      <p:sp>
+        <p:nvSpPr>
+          <p:cNvPr id="3" name="Content Placeholder 2">
+            <a:extLst>
+              <a:ext uri="{FF2B5EF4-FFF2-40B4-BE49-F238E27FC236}">
+                <a16:creationId xmlns:a16="http://schemas.microsoft.com/office/drawing/2014/main" id="{D42A00CE-02EC-46F2-9902-98278BC8FA74}"/>
+              </a:ext>
+            </a:extLst>
+          </p:cNvPr>
+          <p:cNvSpPr>
+            <a:spLocks noGrp="1"/>
+          </p:cNvSpPr>
+          <p:nvPr>
+            <p:ph idx="1"/>
+          </p:nvPr>
+        </p:nvSpPr>
+        <p:spPr/>
+        <p:txBody>
+          <a:bodyPr/>
+          <a:lstStyle/>
+          <a:p>
+            <a:r>
+              <a:rPr lang="en-US" dirty="0"/>
+              <a:t>Flexibility in space usage</a:t>
+            </a:r>
+          </a:p>
+          <a:p>
+            <a:r>
+              <a:rPr lang="en-US" dirty="0"/>
+              <a:t>Incorporation of tech at the very beginning to future-proof the space</a:t>
+            </a:r>
+          </a:p>
+          <a:p>
+            <a:pPr marL="0" indent="0">
+              <a:buNone/>
+            </a:pPr>
+            <a:endParaRPr lang="en-US" dirty="0"/>
+          </a:p>
+          <a:p>
+            <a:endParaRPr lang="en-US" dirty="0"/>
+          </a:p>
+        </p:txBody>
+      </p:sp>
+    </p:spTree>
+    <p:extLst>
+      <p:ext uri="{BB962C8B-B14F-4D97-AF65-F5344CB8AC3E}">
+        <p14:creationId xmlns:p14="http://schemas.microsoft.com/office/powerpoint/2010/main" val="1372409126"/>
+      </p:ext>
+    </p:extLst>
+  </p:cSld>
+  <p:clrMapOvr>
+    <a:masterClrMapping/>
+  </p:clrMapOvr>
+</p:sld>
+</file>
+
+<file path=ppt/slides/slide13.xml><?xml version="1.0" encoding="utf-8"?>
+<p:sld xmlns:a="http://schemas.openxmlformats.org/drawingml/2006/main" xmlns:r="http://schemas.openxmlformats.org/officeDocument/2006/relationships" xmlns:p="http://schemas.openxmlformats.org/presentationml/2006/main">
+  <p:cSld>
+    <p:spTree>
+      <p:nvGrpSpPr>
+        <p:cNvPr id="1" name=""/>
+        <p:cNvGrpSpPr/>
+        <p:nvPr/>
+      </p:nvGrpSpPr>
+      <p:grpSpPr>
+        <a:xfrm>
+          <a:off x="0" y="0"/>
+          <a:ext cx="0" cy="0"/>
+          <a:chOff x="0" y="0"/>
+          <a:chExt cx="0" cy="0"/>
+        </a:xfrm>
+      </p:grpSpPr>
+      <p:sp>
+        <p:nvSpPr>
+          <p:cNvPr id="2" name="Title 1">
+            <a:extLst>
+              <a:ext uri="{FF2B5EF4-FFF2-40B4-BE49-F238E27FC236}">
+                <a16:creationId xmlns:a16="http://schemas.microsoft.com/office/drawing/2014/main" id="{C8C62815-189A-4B56-BE46-22DD75FF65EF}"/>
+              </a:ext>
+            </a:extLst>
+          </p:cNvPr>
+          <p:cNvSpPr>
+            <a:spLocks noGrp="1"/>
+          </p:cNvSpPr>
+          <p:nvPr>
+            <p:ph type="title"/>
+          </p:nvPr>
+        </p:nvSpPr>
+        <p:spPr/>
+        <p:txBody>
+          <a:bodyPr/>
+          <a:lstStyle/>
+          <a:p>
+            <a:r>
+              <a:rPr lang="en-US" dirty="0"/>
+              <a:t>Maintaining Long-Term Relevancy: analyzing our consumer cycle</a:t>
+            </a:r>
+          </a:p>
+        </p:txBody>
+      </p:sp>
+      <p:sp>
+        <p:nvSpPr>
+          <p:cNvPr id="3" name="Content Placeholder 2">
+            <a:extLst>
+              <a:ext uri="{FF2B5EF4-FFF2-40B4-BE49-F238E27FC236}">
+                <a16:creationId xmlns:a16="http://schemas.microsoft.com/office/drawing/2014/main" id="{BE5FF881-FCB7-4DA1-8287-9465D4AC7E47}"/>
+              </a:ext>
+            </a:extLst>
+          </p:cNvPr>
+          <p:cNvSpPr>
+            <a:spLocks noGrp="1"/>
+          </p:cNvSpPr>
+          <p:nvPr>
+            <p:ph idx="1"/>
+          </p:nvPr>
+        </p:nvSpPr>
+        <p:spPr/>
+        <p:txBody>
+          <a:bodyPr/>
+          <a:lstStyle/>
+          <a:p>
+            <a:endParaRPr lang="en-US" dirty="0"/>
+          </a:p>
+        </p:txBody>
+      </p:sp>
+    </p:spTree>
+    <p:extLst>
+      <p:ext uri="{BB962C8B-B14F-4D97-AF65-F5344CB8AC3E}">
+        <p14:creationId xmlns:p14="http://schemas.microsoft.com/office/powerpoint/2010/main" val="3782560227"/>
+      </p:ext>
+    </p:extLst>
+  </p:cSld>
+  <p:clrMapOvr>
+    <a:masterClrMapping/>
+  </p:clrMapOvr>
+</p:sld>
+</file>
+
+<file path=ppt/slides/slide14.xml><?xml version="1.0" encoding="utf-8"?>
+<p:sld xmlns:a="http://schemas.openxmlformats.org/drawingml/2006/main" xmlns:r="http://schemas.openxmlformats.org/officeDocument/2006/relationships" xmlns:p="http://schemas.openxmlformats.org/presentationml/2006/main">
+  <p:cSld>
+    <p:spTree>
+      <p:nvGrpSpPr>
+        <p:cNvPr id="1" name=""/>
+        <p:cNvGrpSpPr/>
+        <p:nvPr/>
+      </p:nvGrpSpPr>
+      <p:grpSpPr>
+        <a:xfrm>
+          <a:off x="0" y="0"/>
+          <a:ext cx="0" cy="0"/>
+          <a:chOff x="0" y="0"/>
+          <a:chExt cx="0" cy="0"/>
+        </a:xfrm>
+      </p:grpSpPr>
+      <p:sp>
+        <p:nvSpPr>
+          <p:cNvPr id="2" name="Title 1">
+            <a:extLst>
+              <a:ext uri="{FF2B5EF4-FFF2-40B4-BE49-F238E27FC236}">
+                <a16:creationId xmlns:a16="http://schemas.microsoft.com/office/drawing/2014/main" id="{912499FA-0186-4237-9979-3B7E114399E2}"/>
+              </a:ext>
+            </a:extLst>
+          </p:cNvPr>
+          <p:cNvSpPr>
+            <a:spLocks noGrp="1"/>
+          </p:cNvSpPr>
+          <p:nvPr>
+            <p:ph type="title"/>
+          </p:nvPr>
+        </p:nvSpPr>
+        <p:spPr/>
+        <p:txBody>
+          <a:bodyPr/>
+          <a:lstStyle/>
+          <a:p>
+            <a:r>
+              <a:rPr lang="en-US" dirty="0"/>
+              <a:t>Avoiding Liability in the Kitchen</a:t>
+            </a:r>
+          </a:p>
+        </p:txBody>
+      </p:sp>
+      <p:sp>
+        <p:nvSpPr>
+          <p:cNvPr id="3" name="Content Placeholder 2">
+            <a:extLst>
+              <a:ext uri="{FF2B5EF4-FFF2-40B4-BE49-F238E27FC236}">
+                <a16:creationId xmlns:a16="http://schemas.microsoft.com/office/drawing/2014/main" id="{856D4DB8-51FC-457D-B0A1-049B0EF6BFA7}"/>
+              </a:ext>
+            </a:extLst>
+          </p:cNvPr>
+          <p:cNvSpPr>
+            <a:spLocks noGrp="1"/>
+          </p:cNvSpPr>
+          <p:nvPr>
+            <p:ph idx="1"/>
+          </p:nvPr>
+        </p:nvSpPr>
+        <p:spPr/>
+        <p:txBody>
+          <a:bodyPr/>
+          <a:lstStyle/>
+          <a:p>
+            <a:r>
+              <a:rPr lang="en-US" dirty="0"/>
+              <a:t>Supervisors</a:t>
+            </a:r>
+          </a:p>
+          <a:p>
+            <a:r>
+              <a:rPr lang="en-US" dirty="0"/>
+              <a:t>Liability waivers and allergy forms.</a:t>
+            </a:r>
+          </a:p>
+          <a:p>
+            <a:r>
+              <a:rPr lang="en-US" dirty="0"/>
+              <a:t>Separating food into food-specific fridges and shelves to prevent cross-contamination</a:t>
+            </a:r>
+          </a:p>
+        </p:txBody>
+      </p:sp>
+    </p:spTree>
+    <p:extLst>
+      <p:ext uri="{BB962C8B-B14F-4D97-AF65-F5344CB8AC3E}">
+        <p14:creationId xmlns:p14="http://schemas.microsoft.com/office/powerpoint/2010/main" val="3084942385"/>
+      </p:ext>
+    </p:extLst>
+  </p:cSld>
+  <p:clrMapOvr>
+    <a:masterClrMapping/>
+  </p:clrMapOvr>
+</p:sld>
+</file>
+
+<file path=ppt/slides/slide15.xml><?xml version="1.0" encoding="utf-8"?>
+<p:sld xmlns:a="http://schemas.openxmlformats.org/drawingml/2006/main" xmlns:r="http://schemas.openxmlformats.org/officeDocument/2006/relationships" xmlns:p="http://schemas.openxmlformats.org/presentationml/2006/main">
+  <p:cSld>
+    <p:spTree>
+      <p:nvGrpSpPr>
+        <p:cNvPr id="1" name=""/>
+        <p:cNvGrpSpPr/>
+        <p:nvPr/>
+      </p:nvGrpSpPr>
+      <p:grpSpPr>
+        <a:xfrm>
+          <a:off x="0" y="0"/>
+          <a:ext cx="0" cy="0"/>
+          <a:chOff x="0" y="0"/>
+          <a:chExt cx="0" cy="0"/>
+        </a:xfrm>
+      </p:grpSpPr>
+      <p:sp>
+        <p:nvSpPr>
+          <p:cNvPr id="2" name="Title 1">
+            <a:extLst>
+              <a:ext uri="{FF2B5EF4-FFF2-40B4-BE49-F238E27FC236}">
+                <a16:creationId xmlns:a16="http://schemas.microsoft.com/office/drawing/2014/main" id="{233DB1E5-3D5A-499C-92D8-9926CB2F0CA1}"/>
+              </a:ext>
+            </a:extLst>
+          </p:cNvPr>
+          <p:cNvSpPr>
+            <a:spLocks noGrp="1"/>
+          </p:cNvSpPr>
+          <p:nvPr>
+            <p:ph type="title"/>
+          </p:nvPr>
+        </p:nvSpPr>
+        <p:spPr/>
+        <p:txBody>
+          <a:bodyPr/>
+          <a:lstStyle/>
+          <a:p>
+            <a:r>
+              <a:rPr lang="en-US" dirty="0"/>
+              <a:t>Type of Business</a:t>
+            </a:r>
+          </a:p>
+        </p:txBody>
+      </p:sp>
+      <p:sp>
+        <p:nvSpPr>
+          <p:cNvPr id="3" name="Content Placeholder 2">
+            <a:extLst>
+              <a:ext uri="{FF2B5EF4-FFF2-40B4-BE49-F238E27FC236}">
+                <a16:creationId xmlns:a16="http://schemas.microsoft.com/office/drawing/2014/main" id="{092F2695-6742-4FC6-BCF3-A1BA616EF10F}"/>
+              </a:ext>
+            </a:extLst>
+          </p:cNvPr>
+          <p:cNvSpPr>
+            <a:spLocks noGrp="1"/>
+          </p:cNvSpPr>
+          <p:nvPr>
+            <p:ph idx="1"/>
+          </p:nvPr>
+        </p:nvSpPr>
+        <p:spPr/>
+        <p:txBody>
+          <a:bodyPr/>
+          <a:lstStyle/>
+          <a:p>
+            <a:r>
+              <a:rPr lang="en-US" dirty="0"/>
+              <a:t>Operate as a for-profit LLC, Co-Op</a:t>
+            </a:r>
+          </a:p>
+          <a:p>
+            <a:r>
+              <a:rPr lang="en-US" dirty="0"/>
+              <a:t>Operate as a non-profit, attempting to solve a public health issue</a:t>
+            </a:r>
+          </a:p>
+        </p:txBody>
+      </p:sp>
+    </p:spTree>
+    <p:extLst>
+      <p:ext uri="{BB962C8B-B14F-4D97-AF65-F5344CB8AC3E}">
+        <p14:creationId xmlns:p14="http://schemas.microsoft.com/office/powerpoint/2010/main" val="2554370827"/>
+      </p:ext>
+    </p:extLst>
+  </p:cSld>
+  <p:clrMapOvr>
+    <a:masterClrMapping/>
+  </p:clrMapOvr>
+</p:sld>
+</file>
+
+<file path=ppt/slides/slide16.xml><?xml version="1.0" encoding="utf-8"?>
+<p:sld xmlns:a="http://schemas.openxmlformats.org/drawingml/2006/main" xmlns:r="http://schemas.openxmlformats.org/officeDocument/2006/relationships" xmlns:p="http://schemas.openxmlformats.org/presentationml/2006/main">
+  <p:cSld>
+    <p:spTree>
+      <p:nvGrpSpPr>
+        <p:cNvPr id="1" name=""/>
+        <p:cNvGrpSpPr/>
+        <p:nvPr/>
+      </p:nvGrpSpPr>
+      <p:grpSpPr>
+        <a:xfrm>
+          <a:off x="0" y="0"/>
+          <a:ext cx="0" cy="0"/>
+          <a:chOff x="0" y="0"/>
+          <a:chExt cx="0" cy="0"/>
+        </a:xfrm>
+      </p:grpSpPr>
+      <p:sp>
+        <p:nvSpPr>
+          <p:cNvPr id="2" name="Title 1">
+            <a:extLst>
+              <a:ext uri="{FF2B5EF4-FFF2-40B4-BE49-F238E27FC236}">
+                <a16:creationId xmlns:a16="http://schemas.microsoft.com/office/drawing/2014/main" id="{EF0FDFBD-C4F8-4F2B-B418-027C2D9234B8}"/>
+              </a:ext>
+            </a:extLst>
+          </p:cNvPr>
+          <p:cNvSpPr>
+            <a:spLocks noGrp="1"/>
+          </p:cNvSpPr>
+          <p:nvPr>
+            <p:ph type="title"/>
+          </p:nvPr>
+        </p:nvSpPr>
+        <p:spPr/>
+        <p:txBody>
+          <a:bodyPr/>
+          <a:lstStyle/>
+          <a:p>
+            <a:r>
+              <a:rPr lang="en-US" dirty="0"/>
+              <a:t>Finances</a:t>
+            </a:r>
+          </a:p>
+        </p:txBody>
+      </p:sp>
+      <p:sp>
+        <p:nvSpPr>
+          <p:cNvPr id="3" name="Content Placeholder 2">
+            <a:extLst>
+              <a:ext uri="{FF2B5EF4-FFF2-40B4-BE49-F238E27FC236}">
+                <a16:creationId xmlns:a16="http://schemas.microsoft.com/office/drawing/2014/main" id="{71DB8266-80FE-4AE4-8A09-30C2E2B143AA}"/>
+              </a:ext>
+            </a:extLst>
+          </p:cNvPr>
+          <p:cNvSpPr>
+            <a:spLocks noGrp="1"/>
+          </p:cNvSpPr>
+          <p:nvPr>
+            <p:ph idx="1"/>
+          </p:nvPr>
+        </p:nvSpPr>
+        <p:spPr/>
+        <p:txBody>
+          <a:bodyPr/>
+          <a:lstStyle/>
+          <a:p>
+            <a:r>
+              <a:rPr lang="en-US" dirty="0"/>
+              <a:t>Operating Costs: ~$144,000 for the first five months of operation</a:t>
+            </a:r>
+          </a:p>
+          <a:p>
+            <a:r>
+              <a:rPr lang="en-US" dirty="0"/>
+              <a:t>Overhead: $39,000</a:t>
+            </a:r>
+          </a:p>
+          <a:p>
+            <a:r>
+              <a:rPr lang="en-US" dirty="0"/>
+              <a:t>Funding estimate total: $185,000</a:t>
+            </a:r>
+          </a:p>
+          <a:p>
+            <a:r>
+              <a:rPr lang="en-US" dirty="0"/>
+              <a:t>Break-even point: an engaged community of 250 people</a:t>
+            </a:r>
+          </a:p>
+          <a:p>
+            <a:r>
+              <a:rPr lang="en-US" dirty="0"/>
+              <a:t>Max community engagement capacity: 500 people</a:t>
+            </a:r>
+          </a:p>
+        </p:txBody>
+      </p:sp>
+    </p:spTree>
+    <p:extLst>
+      <p:ext uri="{BB962C8B-B14F-4D97-AF65-F5344CB8AC3E}">
+        <p14:creationId xmlns:p14="http://schemas.microsoft.com/office/powerpoint/2010/main" val="3345576059"/>
+      </p:ext>
+    </p:extLst>
+  </p:cSld>
+  <p:clrMapOvr>
+    <a:masterClrMapping/>
+  </p:clrMapOvr>
+</p:sld>
+</file>
+
+<file path=ppt/slides/slide17.xml><?xml version="1.0" encoding="utf-8"?>
+<p:sld xmlns:a="http://schemas.openxmlformats.org/drawingml/2006/main" xmlns:r="http://schemas.openxmlformats.org/officeDocument/2006/relationships" xmlns:p="http://schemas.openxmlformats.org/presentationml/2006/main">
+  <p:cSld>
+    <p:spTree>
+      <p:nvGrpSpPr>
+        <p:cNvPr id="1" name=""/>
+        <p:cNvGrpSpPr/>
+        <p:nvPr/>
+      </p:nvGrpSpPr>
+      <p:grpSpPr>
+        <a:xfrm>
+          <a:off x="0" y="0"/>
+          <a:ext cx="0" cy="0"/>
+          <a:chOff x="0" y="0"/>
+          <a:chExt cx="0" cy="0"/>
+        </a:xfrm>
+      </p:grpSpPr>
+      <p:sp>
+        <p:nvSpPr>
+          <p:cNvPr id="2" name="Title 1">
+            <a:extLst>
+              <a:ext uri="{FF2B5EF4-FFF2-40B4-BE49-F238E27FC236}">
+                <a16:creationId xmlns:a16="http://schemas.microsoft.com/office/drawing/2014/main" id="{0B49C125-978B-4A83-AF64-24CCB912E43E}"/>
+              </a:ext>
+            </a:extLst>
+          </p:cNvPr>
+          <p:cNvSpPr>
+            <a:spLocks noGrp="1"/>
+          </p:cNvSpPr>
+          <p:nvPr>
+            <p:ph type="title"/>
+          </p:nvPr>
+        </p:nvSpPr>
+        <p:spPr/>
+        <p:txBody>
+          <a:bodyPr/>
+          <a:lstStyle/>
+          <a:p>
+            <a:r>
+              <a:rPr lang="en-US" dirty="0"/>
+              <a:t>Target Demographic: 18-34 year-olds in the New Haven County Area, CT</a:t>
+            </a:r>
+          </a:p>
+        </p:txBody>
+      </p:sp>
+      <p:sp>
+        <p:nvSpPr>
+          <p:cNvPr id="3" name="Content Placeholder 2">
+            <a:extLst>
+              <a:ext uri="{FF2B5EF4-FFF2-40B4-BE49-F238E27FC236}">
+                <a16:creationId xmlns:a16="http://schemas.microsoft.com/office/drawing/2014/main" id="{4EDA088C-672F-4FD5-BCB0-9D0AA8F203F3}"/>
+              </a:ext>
+            </a:extLst>
+          </p:cNvPr>
+          <p:cNvSpPr>
+            <a:spLocks noGrp="1"/>
+          </p:cNvSpPr>
+          <p:nvPr>
+            <p:ph idx="1"/>
+          </p:nvPr>
+        </p:nvSpPr>
+        <p:spPr/>
+        <p:txBody>
+          <a:bodyPr/>
+          <a:lstStyle/>
+          <a:p>
+            <a:r>
+              <a:rPr lang="en-US" dirty="0"/>
+              <a:t>Target Demographic size in New Haven County: ~200,000 people</a:t>
+            </a:r>
+          </a:p>
+          <a:p>
+            <a:r>
+              <a:rPr lang="en-US" dirty="0"/>
+              <a:t>Percent of people needed to break even: 0.122%</a:t>
+            </a:r>
+          </a:p>
+          <a:p>
+            <a:r>
+              <a:rPr lang="en-US" dirty="0"/>
+              <a:t>Percent of people needed to reach max capacity: 0.2%</a:t>
+            </a:r>
+          </a:p>
+        </p:txBody>
+      </p:sp>
+    </p:spTree>
+    <p:extLst>
+      <p:ext uri="{BB962C8B-B14F-4D97-AF65-F5344CB8AC3E}">
+        <p14:creationId xmlns:p14="http://schemas.microsoft.com/office/powerpoint/2010/main" val="3166939221"/>
+      </p:ext>
+    </p:extLst>
+  </p:cSld>
+  <p:clrMapOvr>
+    <a:masterClrMapping/>
+  </p:clrMapOvr>
+</p:sld>
+</file>
+
+<file path=ppt/slides/slide2.xml><?xml version="1.0" encoding="utf-8"?>
+<p:sld xmlns:a="http://schemas.openxmlformats.org/drawingml/2006/main" xmlns:r="http://schemas.openxmlformats.org/officeDocument/2006/relationships" xmlns:p="http://schemas.openxmlformats.org/presentationml/2006/main">
+  <p:cSld>
+    <p:spTree>
+      <p:nvGrpSpPr>
+        <p:cNvPr id="1" name=""/>
+        <p:cNvGrpSpPr/>
+        <p:nvPr/>
+      </p:nvGrpSpPr>
+      <p:grpSpPr>
+        <a:xfrm>
+          <a:off x="0" y="0"/>
+          <a:ext cx="0" cy="0"/>
+          <a:chOff x="0" y="0"/>
+          <a:chExt cx="0" cy="0"/>
+        </a:xfrm>
+      </p:grpSpPr>
+      <p:sp>
+        <p:nvSpPr>
+          <p:cNvPr id="2" name="Title 1">
+            <a:extLst>
+              <a:ext uri="{FF2B5EF4-FFF2-40B4-BE49-F238E27FC236}">
+                <a16:creationId xmlns:a16="http://schemas.microsoft.com/office/drawing/2014/main" id="{F73C27AA-D214-4CB7-B091-BBB36FE26B5A}"/>
+              </a:ext>
+            </a:extLst>
+          </p:cNvPr>
+          <p:cNvSpPr>
+            <a:spLocks noGrp="1"/>
+          </p:cNvSpPr>
+          <p:nvPr>
+            <p:ph type="title"/>
+          </p:nvPr>
+        </p:nvSpPr>
+        <p:spPr/>
+        <p:txBody>
+          <a:bodyPr/>
+          <a:lstStyle/>
+          <a:p>
+            <a:r>
+              <a:rPr lang="en-US" dirty="0"/>
+              <a:t>The Loneliness Epidemic in the U.S.</a:t>
+            </a:r>
+          </a:p>
+        </p:txBody>
+      </p:sp>
+      <p:sp>
+        <p:nvSpPr>
+          <p:cNvPr id="3" name="Content Placeholder 2">
+            <a:extLst>
+              <a:ext uri="{FF2B5EF4-FFF2-40B4-BE49-F238E27FC236}">
+                <a16:creationId xmlns:a16="http://schemas.microsoft.com/office/drawing/2014/main" id="{2ACBEB85-D66C-4239-B404-B1EAD1E1AB74}"/>
+              </a:ext>
+            </a:extLst>
+          </p:cNvPr>
+          <p:cNvSpPr>
+            <a:spLocks noGrp="1"/>
+          </p:cNvSpPr>
+          <p:nvPr>
+            <p:ph idx="1"/>
+          </p:nvPr>
+        </p:nvSpPr>
+        <p:spPr/>
+        <p:txBody>
+          <a:bodyPr/>
+          <a:lstStyle/>
+          <a:p>
+            <a:r>
+              <a:rPr lang="en-US" dirty="0"/>
+              <a:t>Cite reasons why it exists</a:t>
+            </a:r>
+          </a:p>
+          <a:p>
+            <a:r>
+              <a:rPr lang="en-US" dirty="0"/>
+              <a:t>Cite that loneliness is public health problem</a:t>
+            </a:r>
+          </a:p>
+        </p:txBody>
+      </p:sp>
+    </p:spTree>
+    <p:extLst>
+      <p:ext uri="{BB962C8B-B14F-4D97-AF65-F5344CB8AC3E}">
+        <p14:creationId xmlns:p14="http://schemas.microsoft.com/office/powerpoint/2010/main" val="2261067227"/>
+      </p:ext>
+    </p:extLst>
+  </p:cSld>
+  <p:clrMapOvr>
+    <a:masterClrMapping/>
+  </p:clrMapOvr>
+</p:sld>
+</file>
+
+<file path=ppt/slides/slide3.xml><?xml version="1.0" encoding="utf-8"?>
+<p:sld xmlns:a="http://schemas.openxmlformats.org/drawingml/2006/main" xmlns:r="http://schemas.openxmlformats.org/officeDocument/2006/relationships" xmlns:p="http://schemas.openxmlformats.org/presentationml/2006/main">
+  <p:cSld>
+    <p:spTree>
+      <p:nvGrpSpPr>
+        <p:cNvPr id="1" name=""/>
+        <p:cNvGrpSpPr/>
+        <p:nvPr/>
+      </p:nvGrpSpPr>
+      <p:grpSpPr>
+        <a:xfrm>
+          <a:off x="0" y="0"/>
+          <a:ext cx="0" cy="0"/>
+          <a:chOff x="0" y="0"/>
+          <a:chExt cx="0" cy="0"/>
+        </a:xfrm>
+      </p:grpSpPr>
+      <p:sp>
+        <p:nvSpPr>
+          <p:cNvPr id="2" name="Title 1">
+            <a:extLst>
+              <a:ext uri="{FF2B5EF4-FFF2-40B4-BE49-F238E27FC236}">
+                <a16:creationId xmlns:a16="http://schemas.microsoft.com/office/drawing/2014/main" id="{BCB2D7CD-753D-4A6A-8CFD-C62EE5AACC66}"/>
+              </a:ext>
+            </a:extLst>
+          </p:cNvPr>
+          <p:cNvSpPr>
+            <a:spLocks noGrp="1"/>
+          </p:cNvSpPr>
+          <p:nvPr>
+            <p:ph type="title"/>
+          </p:nvPr>
+        </p:nvSpPr>
+        <p:spPr/>
+        <p:txBody>
+          <a:bodyPr/>
+          <a:lstStyle/>
+          <a:p>
+            <a:r>
+              <a:rPr lang="en-US" dirty="0"/>
+              <a:t>Mission</a:t>
+            </a:r>
+          </a:p>
+        </p:txBody>
+      </p:sp>
+      <p:sp>
+        <p:nvSpPr>
+          <p:cNvPr id="3" name="Content Placeholder 2">
+            <a:extLst>
+              <a:ext uri="{FF2B5EF4-FFF2-40B4-BE49-F238E27FC236}">
+                <a16:creationId xmlns:a16="http://schemas.microsoft.com/office/drawing/2014/main" id="{DA475984-AACC-404F-9DED-331D7A7B3FEF}"/>
+              </a:ext>
+            </a:extLst>
+          </p:cNvPr>
+          <p:cNvSpPr>
+            <a:spLocks noGrp="1"/>
+          </p:cNvSpPr>
+          <p:nvPr>
+            <p:ph idx="1"/>
+          </p:nvPr>
+        </p:nvSpPr>
+        <p:spPr/>
+        <p:txBody>
+          <a:bodyPr/>
+          <a:lstStyle/>
+          <a:p>
+            <a:r>
+              <a:rPr lang="en-US" dirty="0"/>
+              <a:t>Mitigate or reduce the loneliness epidemic in the U.S.</a:t>
+            </a:r>
+          </a:p>
+          <a:p>
+            <a:r>
+              <a:rPr lang="en-US" dirty="0"/>
+              <a:t>(include graphic of the loneliness epidemic)</a:t>
+            </a:r>
+          </a:p>
+        </p:txBody>
+      </p:sp>
+    </p:spTree>
+    <p:extLst>
+      <p:ext uri="{BB962C8B-B14F-4D97-AF65-F5344CB8AC3E}">
+        <p14:creationId xmlns:p14="http://schemas.microsoft.com/office/powerpoint/2010/main" val="3120845105"/>
+      </p:ext>
+    </p:extLst>
+  </p:cSld>
+  <p:clrMapOvr>
+    <a:masterClrMapping/>
+  </p:clrMapOvr>
+</p:sld>
+</file>
+
+<file path=ppt/slides/slide4.xml><?xml version="1.0" encoding="utf-8"?>
+<p:sld xmlns:a="http://schemas.openxmlformats.org/drawingml/2006/main" xmlns:r="http://schemas.openxmlformats.org/officeDocument/2006/relationships" xmlns:p="http://schemas.openxmlformats.org/presentationml/2006/main">
+  <p:cSld>
+    <p:spTree>
+      <p:nvGrpSpPr>
+        <p:cNvPr id="1" name=""/>
+        <p:cNvGrpSpPr/>
+        <p:nvPr/>
+      </p:nvGrpSpPr>
+      <p:grpSpPr>
+        <a:xfrm>
+          <a:off x="0" y="0"/>
+          <a:ext cx="0" cy="0"/>
+          <a:chOff x="0" y="0"/>
+          <a:chExt cx="0" cy="0"/>
+        </a:xfrm>
+      </p:grpSpPr>
+      <p:sp>
+        <p:nvSpPr>
+          <p:cNvPr id="2" name="Title 1">
+            <a:extLst>
+              <a:ext uri="{FF2B5EF4-FFF2-40B4-BE49-F238E27FC236}">
+                <a16:creationId xmlns:a16="http://schemas.microsoft.com/office/drawing/2014/main" id="{0E9E9493-B9AD-4917-A903-3B6FE53A9442}"/>
+              </a:ext>
+            </a:extLst>
+          </p:cNvPr>
+          <p:cNvSpPr>
+            <a:spLocks noGrp="1"/>
+          </p:cNvSpPr>
+          <p:nvPr>
+            <p:ph type="title"/>
+          </p:nvPr>
+        </p:nvSpPr>
+        <p:spPr/>
+        <p:txBody>
+          <a:bodyPr/>
+          <a:lstStyle/>
+          <a:p>
+            <a:r>
+              <a:rPr lang="en-US" dirty="0"/>
+              <a:t>App Saturation in the Digital Age:</a:t>
+            </a:r>
+            <a:br>
+              <a:rPr lang="en-US" dirty="0"/>
+            </a:br>
+            <a:r>
+              <a:rPr lang="en-US" dirty="0"/>
+              <a:t>What has fallen?</a:t>
+            </a:r>
+          </a:p>
+        </p:txBody>
+      </p:sp>
+      <p:sp>
+        <p:nvSpPr>
+          <p:cNvPr id="3" name="Content Placeholder 2">
+            <a:extLst>
+              <a:ext uri="{FF2B5EF4-FFF2-40B4-BE49-F238E27FC236}">
+                <a16:creationId xmlns:a16="http://schemas.microsoft.com/office/drawing/2014/main" id="{CFCB06AD-75C0-48A3-9D8C-FF5CEE3919A4}"/>
+              </a:ext>
+            </a:extLst>
+          </p:cNvPr>
+          <p:cNvSpPr>
+            <a:spLocks noGrp="1"/>
+          </p:cNvSpPr>
+          <p:nvPr>
+            <p:ph idx="1"/>
+          </p:nvPr>
+        </p:nvSpPr>
+        <p:spPr/>
+        <p:txBody>
+          <a:bodyPr/>
+          <a:lstStyle/>
+          <a:p>
+            <a:endParaRPr lang="en-US" dirty="0"/>
+          </a:p>
+        </p:txBody>
+      </p:sp>
+    </p:spTree>
+    <p:extLst>
+      <p:ext uri="{BB962C8B-B14F-4D97-AF65-F5344CB8AC3E}">
+        <p14:creationId xmlns:p14="http://schemas.microsoft.com/office/powerpoint/2010/main" val="1218510847"/>
+      </p:ext>
+    </p:extLst>
+  </p:cSld>
+  <p:clrMapOvr>
+    <a:masterClrMapping/>
+  </p:clrMapOvr>
+</p:sld>
+</file>
+
+<file path=ppt/slides/slide5.xml><?xml version="1.0" encoding="utf-8"?>
+<p:sld xmlns:a="http://schemas.openxmlformats.org/drawingml/2006/main" xmlns:r="http://schemas.openxmlformats.org/officeDocument/2006/relationships" xmlns:p="http://schemas.openxmlformats.org/presentationml/2006/main">
+  <p:cSld>
+    <p:spTree>
+      <p:nvGrpSpPr>
+        <p:cNvPr id="1" name=""/>
+        <p:cNvGrpSpPr/>
+        <p:nvPr/>
+      </p:nvGrpSpPr>
+      <p:grpSpPr>
+        <a:xfrm>
+          <a:off x="0" y="0"/>
+          <a:ext cx="0" cy="0"/>
+          <a:chOff x="0" y="0"/>
+          <a:chExt cx="0" cy="0"/>
+        </a:xfrm>
+      </p:grpSpPr>
+      <p:sp>
+        <p:nvSpPr>
+          <p:cNvPr id="2" name="Title 1">
+            <a:extLst>
+              <a:ext uri="{FF2B5EF4-FFF2-40B4-BE49-F238E27FC236}">
+                <a16:creationId xmlns:a16="http://schemas.microsoft.com/office/drawing/2014/main" id="{03A83AAA-7579-4CCF-B549-55E15067F0C9}"/>
+              </a:ext>
+            </a:extLst>
+          </p:cNvPr>
+          <p:cNvSpPr>
+            <a:spLocks noGrp="1"/>
+          </p:cNvSpPr>
+          <p:nvPr>
+            <p:ph type="title"/>
+          </p:nvPr>
+        </p:nvSpPr>
+        <p:spPr/>
+        <p:txBody>
+          <a:bodyPr/>
+          <a:lstStyle/>
+          <a:p>
+            <a:r>
+              <a:rPr lang="en-US" dirty="0"/>
+              <a:t>App Saturation in the Digital Age:</a:t>
+            </a:r>
+            <a:br>
+              <a:rPr lang="en-US" dirty="0"/>
+            </a:br>
+            <a:r>
+              <a:rPr lang="en-US" dirty="0"/>
+              <a:t>What has risen?</a:t>
+            </a:r>
+          </a:p>
+        </p:txBody>
+      </p:sp>
+      <p:sp>
+        <p:nvSpPr>
+          <p:cNvPr id="3" name="Content Placeholder 2">
+            <a:extLst>
+              <a:ext uri="{FF2B5EF4-FFF2-40B4-BE49-F238E27FC236}">
+                <a16:creationId xmlns:a16="http://schemas.microsoft.com/office/drawing/2014/main" id="{A5953C17-5FCD-4DAC-B513-0B581147CD2E}"/>
+              </a:ext>
+            </a:extLst>
+          </p:cNvPr>
+          <p:cNvSpPr>
+            <a:spLocks noGrp="1"/>
+          </p:cNvSpPr>
+          <p:nvPr>
+            <p:ph idx="1"/>
+          </p:nvPr>
+        </p:nvSpPr>
+        <p:spPr/>
+        <p:txBody>
+          <a:bodyPr/>
+          <a:lstStyle/>
+          <a:p>
+            <a:endParaRPr lang="en-US" dirty="0"/>
+          </a:p>
+        </p:txBody>
+      </p:sp>
+    </p:spTree>
+    <p:extLst>
+      <p:ext uri="{BB962C8B-B14F-4D97-AF65-F5344CB8AC3E}">
+        <p14:creationId xmlns:p14="http://schemas.microsoft.com/office/powerpoint/2010/main" val="2857083325"/>
+      </p:ext>
+    </p:extLst>
+  </p:cSld>
+  <p:clrMapOvr>
+    <a:masterClrMapping/>
+  </p:clrMapOvr>
+</p:sld>
+</file>
+
+<file path=ppt/slides/slide6.xml><?xml version="1.0" encoding="utf-8"?>
+<p:sld xmlns:a="http://schemas.openxmlformats.org/drawingml/2006/main" xmlns:r="http://schemas.openxmlformats.org/officeDocument/2006/relationships" xmlns:p="http://schemas.openxmlformats.org/presentationml/2006/main">
+  <p:cSld>
+    <p:spTree>
+      <p:nvGrpSpPr>
+        <p:cNvPr id="1" name=""/>
+        <p:cNvGrpSpPr/>
+        <p:nvPr/>
+      </p:nvGrpSpPr>
+      <p:grpSpPr>
+        <a:xfrm>
+          <a:off x="0" y="0"/>
+          <a:ext cx="0" cy="0"/>
+          <a:chOff x="0" y="0"/>
+          <a:chExt cx="0" cy="0"/>
+        </a:xfrm>
+      </p:grpSpPr>
+      <p:sp>
+        <p:nvSpPr>
+          <p:cNvPr id="2" name="Title 1">
+            <a:extLst>
+              <a:ext uri="{FF2B5EF4-FFF2-40B4-BE49-F238E27FC236}">
+                <a16:creationId xmlns:a16="http://schemas.microsoft.com/office/drawing/2014/main" id="{EB55CCCA-E5E2-4C6E-A942-18132981FBAF}"/>
+              </a:ext>
+            </a:extLst>
+          </p:cNvPr>
+          <p:cNvSpPr>
+            <a:spLocks noGrp="1"/>
+          </p:cNvSpPr>
+          <p:nvPr>
+            <p:ph type="title"/>
+          </p:nvPr>
+        </p:nvSpPr>
+        <p:spPr/>
+        <p:txBody>
+          <a:bodyPr/>
+          <a:lstStyle/>
+          <a:p>
+            <a:r>
+              <a:rPr lang="en-US" dirty="0"/>
+              <a:t>The Current Method of Meeting People</a:t>
+            </a:r>
+          </a:p>
+        </p:txBody>
+      </p:sp>
+      <p:sp>
+        <p:nvSpPr>
+          <p:cNvPr id="3" name="Content Placeholder 2">
+            <a:extLst>
+              <a:ext uri="{FF2B5EF4-FFF2-40B4-BE49-F238E27FC236}">
+                <a16:creationId xmlns:a16="http://schemas.microsoft.com/office/drawing/2014/main" id="{9D92BAF7-0615-4FB6-B39B-9CDCF6D1CA74}"/>
+              </a:ext>
+            </a:extLst>
+          </p:cNvPr>
+          <p:cNvSpPr>
+            <a:spLocks noGrp="1"/>
+          </p:cNvSpPr>
+          <p:nvPr>
+            <p:ph idx="1"/>
+          </p:nvPr>
+        </p:nvSpPr>
+        <p:spPr/>
+        <p:txBody>
+          <a:bodyPr/>
+          <a:lstStyle/>
+          <a:p>
+            <a:endParaRPr lang="en-US"/>
+          </a:p>
+        </p:txBody>
+      </p:sp>
+    </p:spTree>
+    <p:extLst>
+      <p:ext uri="{BB962C8B-B14F-4D97-AF65-F5344CB8AC3E}">
+        <p14:creationId xmlns:p14="http://schemas.microsoft.com/office/powerpoint/2010/main" val="1869608470"/>
+      </p:ext>
+    </p:extLst>
+  </p:cSld>
+  <p:clrMapOvr>
+    <a:masterClrMapping/>
+  </p:clrMapOvr>
+</p:sld>
+</file>
+
+<file path=ppt/slides/slide7.xml><?xml version="1.0" encoding="utf-8"?>
+<p:sld xmlns:a="http://schemas.openxmlformats.org/drawingml/2006/main" xmlns:r="http://schemas.openxmlformats.org/officeDocument/2006/relationships" xmlns:p="http://schemas.openxmlformats.org/presentationml/2006/main">
+  <p:cSld>
+    <p:spTree>
+      <p:nvGrpSpPr>
+        <p:cNvPr id="1" name=""/>
+        <p:cNvGrpSpPr/>
+        <p:nvPr/>
+      </p:nvGrpSpPr>
+      <p:grpSpPr>
+        <a:xfrm>
+          <a:off x="0" y="0"/>
+          <a:ext cx="0" cy="0"/>
+          <a:chOff x="0" y="0"/>
+          <a:chExt cx="0" cy="0"/>
+        </a:xfrm>
+      </p:grpSpPr>
+      <p:sp>
+        <p:nvSpPr>
+          <p:cNvPr id="2" name="Title 1">
+            <a:extLst>
+              <a:ext uri="{FF2B5EF4-FFF2-40B4-BE49-F238E27FC236}">
+                <a16:creationId xmlns:a16="http://schemas.microsoft.com/office/drawing/2014/main" id="{B8AD46B9-84F6-4361-8E76-6BAFE815FFC1}"/>
+              </a:ext>
+            </a:extLst>
+          </p:cNvPr>
+          <p:cNvSpPr>
+            <a:spLocks noGrp="1"/>
+          </p:cNvSpPr>
+          <p:nvPr>
+            <p:ph type="title"/>
+          </p:nvPr>
+        </p:nvSpPr>
+        <p:spPr/>
+        <p:txBody>
+          <a:bodyPr/>
+          <a:lstStyle/>
+          <a:p>
+            <a:r>
+              <a:rPr lang="en-US" dirty="0"/>
+              <a:t>The Old Method of Meeting People</a:t>
+            </a:r>
+          </a:p>
+        </p:txBody>
+      </p:sp>
+      <p:sp>
+        <p:nvSpPr>
+          <p:cNvPr id="3" name="Content Placeholder 2">
+            <a:extLst>
+              <a:ext uri="{FF2B5EF4-FFF2-40B4-BE49-F238E27FC236}">
+                <a16:creationId xmlns:a16="http://schemas.microsoft.com/office/drawing/2014/main" id="{69F4B873-5DDA-4F2C-8891-E4BC94C1F90B}"/>
+              </a:ext>
+            </a:extLst>
+          </p:cNvPr>
+          <p:cNvSpPr>
+            <a:spLocks noGrp="1"/>
+          </p:cNvSpPr>
+          <p:nvPr>
+            <p:ph idx="1"/>
+          </p:nvPr>
+        </p:nvSpPr>
+        <p:spPr/>
+        <p:txBody>
+          <a:bodyPr/>
+          <a:lstStyle/>
+          <a:p>
+            <a:endParaRPr lang="en-US"/>
+          </a:p>
+        </p:txBody>
+      </p:sp>
+    </p:spTree>
+    <p:extLst>
+      <p:ext uri="{BB962C8B-B14F-4D97-AF65-F5344CB8AC3E}">
+        <p14:creationId xmlns:p14="http://schemas.microsoft.com/office/powerpoint/2010/main" val="3390689853"/>
+      </p:ext>
+    </p:extLst>
+  </p:cSld>
+  <p:clrMapOvr>
+    <a:masterClrMapping/>
+  </p:clrMapOvr>
+</p:sld>
+</file>
+
+<file path=ppt/slides/slide8.xml><?xml version="1.0" encoding="utf-8"?>
+<p:sld xmlns:a="http://schemas.openxmlformats.org/drawingml/2006/main" xmlns:r="http://schemas.openxmlformats.org/officeDocument/2006/relationships" xmlns:p="http://schemas.openxmlformats.org/presentationml/2006/main">
+  <p:cSld>
+    <p:spTree>
+      <p:nvGrpSpPr>
+        <p:cNvPr id="1" name=""/>
+        <p:cNvGrpSpPr/>
+        <p:nvPr/>
+      </p:nvGrpSpPr>
+      <p:grpSpPr>
+        <a:xfrm>
+          <a:off x="0" y="0"/>
+          <a:ext cx="0" cy="0"/>
+          <a:chOff x="0" y="0"/>
+          <a:chExt cx="0" cy="0"/>
+        </a:xfrm>
+      </p:grpSpPr>
+      <p:sp>
+        <p:nvSpPr>
+          <p:cNvPr id="2" name="Title 1">
+            <a:extLst>
+              <a:ext uri="{FF2B5EF4-FFF2-40B4-BE49-F238E27FC236}">
+                <a16:creationId xmlns:a16="http://schemas.microsoft.com/office/drawing/2014/main" id="{04CED4E4-98F4-4D9F-B822-03E91F005E9C}"/>
+              </a:ext>
+            </a:extLst>
+          </p:cNvPr>
+          <p:cNvSpPr>
+            <a:spLocks noGrp="1"/>
+          </p:cNvSpPr>
+          <p:nvPr>
+            <p:ph type="title"/>
+          </p:nvPr>
+        </p:nvSpPr>
+        <p:spPr/>
+        <p:txBody>
+          <a:bodyPr/>
+          <a:lstStyle/>
+          <a:p>
+            <a:r>
+              <a:rPr lang="en-US" dirty="0"/>
+              <a:t>Appealing to Human Nature</a:t>
+            </a:r>
+          </a:p>
+        </p:txBody>
+      </p:sp>
+      <p:sp>
+        <p:nvSpPr>
+          <p:cNvPr id="3" name="Content Placeholder 2">
+            <a:extLst>
+              <a:ext uri="{FF2B5EF4-FFF2-40B4-BE49-F238E27FC236}">
+                <a16:creationId xmlns:a16="http://schemas.microsoft.com/office/drawing/2014/main" id="{38614445-E97F-4EB7-A9CF-27D818C15CC8}"/>
+              </a:ext>
+            </a:extLst>
+          </p:cNvPr>
+          <p:cNvSpPr>
+            <a:spLocks noGrp="1"/>
+          </p:cNvSpPr>
+          <p:nvPr>
+            <p:ph idx="1"/>
+          </p:nvPr>
+        </p:nvSpPr>
+        <p:spPr/>
+        <p:txBody>
+          <a:bodyPr/>
+          <a:lstStyle/>
+          <a:p>
+            <a:r>
+              <a:rPr lang="en-US" dirty="0"/>
+              <a:t>Universal Languages</a:t>
+            </a:r>
+          </a:p>
+          <a:p>
+            <a:r>
+              <a:rPr lang="en-US" dirty="0"/>
+              <a:t>Shared Activities</a:t>
+            </a:r>
+          </a:p>
+          <a:p>
+            <a:r>
+              <a:rPr lang="en-US" dirty="0"/>
+              <a:t>Amenities of a theoretical brick-and-mortar location</a:t>
+            </a:r>
+          </a:p>
+        </p:txBody>
+      </p:sp>
+    </p:spTree>
+    <p:extLst>
+      <p:ext uri="{BB962C8B-B14F-4D97-AF65-F5344CB8AC3E}">
+        <p14:creationId xmlns:p14="http://schemas.microsoft.com/office/powerpoint/2010/main" val="3588991441"/>
+      </p:ext>
+    </p:extLst>
+  </p:cSld>
+  <p:clrMapOvr>
+    <a:masterClrMapping/>
+  </p:clrMapOvr>
+</p:sld>
+</file>
+
+<file path=ppt/slides/slide9.xml><?xml version="1.0" encoding="utf-8"?>
+<p:sld xmlns:a="http://schemas.openxmlformats.org/drawingml/2006/main" xmlns:r="http://schemas.openxmlformats.org/officeDocument/2006/relationships" xmlns:p="http://schemas.openxmlformats.org/presentationml/2006/main">
+  <p:cSld>
+    <p:spTree>
+      <p:nvGrpSpPr>
+        <p:cNvPr id="1" name=""/>
+        <p:cNvGrpSpPr/>
+        <p:nvPr/>
+      </p:nvGrpSpPr>
+      <p:grpSpPr>
+        <a:xfrm>
+          <a:off x="0" y="0"/>
+          <a:ext cx="0" cy="0"/>
+          <a:chOff x="0" y="0"/>
+          <a:chExt cx="0" cy="0"/>
+        </a:xfrm>
+      </p:grpSpPr>
+      <p:sp>
+        <p:nvSpPr>
+          <p:cNvPr id="2" name="Title 1">
+            <a:extLst>
+              <a:ext uri="{FF2B5EF4-FFF2-40B4-BE49-F238E27FC236}">
+                <a16:creationId xmlns:a16="http://schemas.microsoft.com/office/drawing/2014/main" id="{436E6B99-EA4B-4CFC-8B53-A278E290312B}"/>
+              </a:ext>
+            </a:extLst>
+          </p:cNvPr>
+          <p:cNvSpPr>
+            <a:spLocks noGrp="1"/>
+          </p:cNvSpPr>
+          <p:nvPr>
+            <p:ph type="title"/>
+          </p:nvPr>
+        </p:nvSpPr>
+        <p:spPr/>
+        <p:txBody>
+          <a:bodyPr/>
+          <a:lstStyle/>
+          <a:p>
+            <a:r>
+              <a:rPr lang="en-US" dirty="0"/>
+              <a:t>Practical Challenges</a:t>
+            </a:r>
+          </a:p>
+        </p:txBody>
+      </p:sp>
+      <p:sp>
+        <p:nvSpPr>
+          <p:cNvPr id="3" name="Content Placeholder 2">
+            <a:extLst>
+              <a:ext uri="{FF2B5EF4-FFF2-40B4-BE49-F238E27FC236}">
+                <a16:creationId xmlns:a16="http://schemas.microsoft.com/office/drawing/2014/main" id="{66B4A99F-C54A-4282-B4E7-C53053C15A07}"/>
+              </a:ext>
+            </a:extLst>
+          </p:cNvPr>
+          <p:cNvSpPr>
+            <a:spLocks noGrp="1"/>
+          </p:cNvSpPr>
+          <p:nvPr>
+            <p:ph idx="1"/>
+          </p:nvPr>
+        </p:nvSpPr>
+        <p:spPr/>
+        <p:txBody>
+          <a:bodyPr/>
+          <a:lstStyle/>
+          <a:p>
+            <a:pPr marL="0" indent="0">
+              <a:buNone/>
+            </a:pPr>
+            <a:endParaRPr lang="en-US" dirty="0"/>
+          </a:p>
+        </p:txBody>
+      </p:sp>
+    </p:spTree>
+    <p:extLst>
+      <p:ext uri="{BB962C8B-B14F-4D97-AF65-F5344CB8AC3E}">
+        <p14:creationId xmlns:p14="http://schemas.microsoft.com/office/powerpoint/2010/main" val="3954596595"/>
       </p:ext>
     </p:extLst>
   </p:cSld>

</xml_diff>

<commit_message>
made some changes to the powerpoint
</commit_message>
<xml_diff>
--- a/Presentation/SocialHub_FrancisT_06_23_2020.pptx
+++ b/Presentation/SocialHub_FrancisT_06_23_2020.pptx
@@ -22,8 +22,8 @@
     <p:sldId id="268" r:id="rId16"/>
     <p:sldId id="270" r:id="rId17"/>
     <p:sldId id="271" r:id="rId18"/>
-    <p:sldId id="272" r:id="rId19"/>
-    <p:sldId id="273" r:id="rId20"/>
+    <p:sldId id="273" r:id="rId19"/>
+    <p:sldId id="272" r:id="rId20"/>
   </p:sldIdLst>
   <p:sldSz cx="12192000" cy="6858000"/>
   <p:notesSz cx="6858000" cy="9144000"/>
@@ -133,6 +133,7 @@
 <file path=ppt/revisionInfo.xml><?xml version="1.0" encoding="utf-8"?>
 <p1510:revInfo xmlns:a="http://schemas.openxmlformats.org/drawingml/2006/main" xmlns:r="http://schemas.openxmlformats.org/officeDocument/2006/relationships" xmlns:p1510="http://schemas.microsoft.com/office/powerpoint/2015/10/main">
   <p1510:revLst>
+    <p1510:client id="{63F3CF76-1364-475A-823F-3E38657C5F84}" v="1" dt="2020-06-24T23:57:48.677"/>
     <p1510:client id="{E2F6CC62-A8FA-4CA3-B44E-705F9FC4EF55}" v="45" dt="2020-06-24T18:48:24.480"/>
   </p1510:revLst>
 </p1510:revInfo>
@@ -718,6 +719,97 @@
       </pc:sldChg>
     </pc:docChg>
   </pc:docChgLst>
+  <pc:docChgLst>
+    <pc:chgData name="Thomas Francis" userId="5c2c6e3652e668e7" providerId="LiveId" clId="{63F3CF76-1364-475A-823F-3E38657C5F84}"/>
+    <pc:docChg chg="custSel modSld sldOrd">
+      <pc:chgData name="Thomas Francis" userId="5c2c6e3652e668e7" providerId="LiveId" clId="{63F3CF76-1364-475A-823F-3E38657C5F84}" dt="2020-06-25T00:01:11.186" v="177" actId="20577"/>
+      <pc:docMkLst>
+        <pc:docMk/>
+      </pc:docMkLst>
+      <pc:sldChg chg="modSp mod">
+        <pc:chgData name="Thomas Francis" userId="5c2c6e3652e668e7" providerId="LiveId" clId="{63F3CF76-1364-475A-823F-3E38657C5F84}" dt="2020-06-24T23:58:01.864" v="145" actId="20577"/>
+        <pc:sldMkLst>
+          <pc:docMk/>
+          <pc:sldMk cId="1218510847" sldId="260"/>
+        </pc:sldMkLst>
+        <pc:spChg chg="mod">
+          <ac:chgData name="Thomas Francis" userId="5c2c6e3652e668e7" providerId="LiveId" clId="{63F3CF76-1364-475A-823F-3E38657C5F84}" dt="2020-06-24T23:58:01.864" v="145" actId="20577"/>
+          <ac:spMkLst>
+            <pc:docMk/>
+            <pc:sldMk cId="1218510847" sldId="260"/>
+            <ac:spMk id="3" creationId="{CFCB06AD-75C0-48A3-9D8C-FF5CEE3919A4}"/>
+          </ac:spMkLst>
+        </pc:spChg>
+      </pc:sldChg>
+      <pc:sldChg chg="modSp mod">
+        <pc:chgData name="Thomas Francis" userId="5c2c6e3652e668e7" providerId="LiveId" clId="{63F3CF76-1364-475A-823F-3E38657C5F84}" dt="2020-06-24T23:51:55.403" v="0" actId="33524"/>
+        <pc:sldMkLst>
+          <pc:docMk/>
+          <pc:sldMk cId="1869608470" sldId="261"/>
+        </pc:sldMkLst>
+        <pc:spChg chg="mod">
+          <ac:chgData name="Thomas Francis" userId="5c2c6e3652e668e7" providerId="LiveId" clId="{63F3CF76-1364-475A-823F-3E38657C5F84}" dt="2020-06-24T23:51:55.403" v="0" actId="33524"/>
+          <ac:spMkLst>
+            <pc:docMk/>
+            <pc:sldMk cId="1869608470" sldId="261"/>
+            <ac:spMk id="3" creationId="{9D92BAF7-0615-4FB6-B39B-9CDCF6D1CA74}"/>
+          </ac:spMkLst>
+        </pc:spChg>
+      </pc:sldChg>
+      <pc:sldChg chg="modSp mod">
+        <pc:chgData name="Thomas Francis" userId="5c2c6e3652e668e7" providerId="LiveId" clId="{63F3CF76-1364-475A-823F-3E38657C5F84}" dt="2020-06-24T23:54:07.901" v="7" actId="20577"/>
+        <pc:sldMkLst>
+          <pc:docMk/>
+          <pc:sldMk cId="2268850528" sldId="267"/>
+        </pc:sldMkLst>
+        <pc:spChg chg="mod">
+          <ac:chgData name="Thomas Francis" userId="5c2c6e3652e668e7" providerId="LiveId" clId="{63F3CF76-1364-475A-823F-3E38657C5F84}" dt="2020-06-24T23:54:07.901" v="7" actId="20577"/>
+          <ac:spMkLst>
+            <pc:docMk/>
+            <pc:sldMk cId="2268850528" sldId="267"/>
+            <ac:spMk id="3" creationId="{82D175DE-DD27-4B6D-A263-AF7633BD39F3}"/>
+          </ac:spMkLst>
+        </pc:spChg>
+      </pc:sldChg>
+      <pc:sldChg chg="modSp mod">
+        <pc:chgData name="Thomas Francis" userId="5c2c6e3652e668e7" providerId="LiveId" clId="{63F3CF76-1364-475A-823F-3E38657C5F84}" dt="2020-06-25T00:01:11.186" v="177" actId="20577"/>
+        <pc:sldMkLst>
+          <pc:docMk/>
+          <pc:sldMk cId="3084942385" sldId="270"/>
+        </pc:sldMkLst>
+        <pc:spChg chg="mod">
+          <ac:chgData name="Thomas Francis" userId="5c2c6e3652e668e7" providerId="LiveId" clId="{63F3CF76-1364-475A-823F-3E38657C5F84}" dt="2020-06-25T00:01:11.186" v="177" actId="20577"/>
+          <ac:spMkLst>
+            <pc:docMk/>
+            <pc:sldMk cId="3084942385" sldId="270"/>
+            <ac:spMk id="3" creationId="{856D4DB8-51FC-457D-B0A1-049B0EF6BFA7}"/>
+          </ac:spMkLst>
+        </pc:spChg>
+      </pc:sldChg>
+      <pc:sldChg chg="modSp mod">
+        <pc:chgData name="Thomas Francis" userId="5c2c6e3652e668e7" providerId="LiveId" clId="{63F3CF76-1364-475A-823F-3E38657C5F84}" dt="2020-06-24T23:55:48.658" v="103" actId="20577"/>
+        <pc:sldMkLst>
+          <pc:docMk/>
+          <pc:sldMk cId="2554370827" sldId="271"/>
+        </pc:sldMkLst>
+        <pc:spChg chg="mod">
+          <ac:chgData name="Thomas Francis" userId="5c2c6e3652e668e7" providerId="LiveId" clId="{63F3CF76-1364-475A-823F-3E38657C5F84}" dt="2020-06-24T23:55:48.658" v="103" actId="20577"/>
+          <ac:spMkLst>
+            <pc:docMk/>
+            <pc:sldMk cId="2554370827" sldId="271"/>
+            <ac:spMk id="3" creationId="{092F2695-6742-4FC6-BCF3-A1BA616EF10F}"/>
+          </ac:spMkLst>
+        </pc:spChg>
+      </pc:sldChg>
+      <pc:sldChg chg="ord">
+        <pc:chgData name="Thomas Francis" userId="5c2c6e3652e668e7" providerId="LiveId" clId="{63F3CF76-1364-475A-823F-3E38657C5F84}" dt="2020-06-24T23:55:59.441" v="105"/>
+        <pc:sldMkLst>
+          <pc:docMk/>
+          <pc:sldMk cId="3166939221" sldId="273"/>
+        </pc:sldMkLst>
+      </pc:sldChg>
+    </pc:docChg>
+  </pc:docChgLst>
 </pc:chgInfo>
 </file>
 
@@ -8857,7 +8949,7 @@
           <a:p>
             <a:r>
               <a:rPr lang="en-US" dirty="0"/>
-              <a:t>Screening hours are flexible but must end before 2 hours prior to opening</a:t>
+              <a:t>Screening hours are flexible but must end 2 hours prior to opening</a:t>
             </a:r>
           </a:p>
           <a:p>
@@ -9077,7 +9169,7 @@
           <a:p>
             <a:r>
               <a:rPr lang="en-US" dirty="0"/>
-              <a:t>Supervisors</a:t>
+              <a:t>Chefs will be encouraged to bring an assistant to supervise and dismiss people at will</a:t>
             </a:r>
           </a:p>
           <a:p>
@@ -9181,7 +9273,7 @@
           <a:p>
             <a:r>
               <a:rPr lang="en-US" dirty="0"/>
-              <a:t>Unlikely, but it’s also possible to operate as a non-profit because we are technically solving a public health issue</a:t>
+              <a:t>Unlikely, but it’s also possible to operate as a non-profit because we are technically working on a public health issue</a:t>
             </a:r>
           </a:p>
         </p:txBody>
@@ -9221,7 +9313,7 @@
           <p:cNvPr id="2" name="Title 1">
             <a:extLst>
               <a:ext uri="{FF2B5EF4-FFF2-40B4-BE49-F238E27FC236}">
-                <a16:creationId xmlns:a16="http://schemas.microsoft.com/office/drawing/2014/main" id="{EF0FDFBD-C4F8-4F2B-B418-027C2D9234B8}"/>
+                <a16:creationId xmlns:a16="http://schemas.microsoft.com/office/drawing/2014/main" id="{0B49C125-978B-4A83-AF64-24CCB912E43E}"/>
               </a:ext>
             </a:extLst>
           </p:cNvPr>
@@ -9239,7 +9331,7 @@
           <a:p>
             <a:r>
               <a:rPr lang="en-US" dirty="0"/>
-              <a:t>Finances</a:t>
+              <a:t>Target Demographic: 18-80 year-olds in the New Haven County Area, CT</a:t>
             </a:r>
           </a:p>
         </p:txBody>
@@ -9249,7 +9341,7 @@
           <p:cNvPr id="3" name="Content Placeholder 2">
             <a:extLst>
               <a:ext uri="{FF2B5EF4-FFF2-40B4-BE49-F238E27FC236}">
-                <a16:creationId xmlns:a16="http://schemas.microsoft.com/office/drawing/2014/main" id="{71DB8266-80FE-4AE4-8A09-30C2E2B143AA}"/>
+                <a16:creationId xmlns:a16="http://schemas.microsoft.com/office/drawing/2014/main" id="{4EDA088C-672F-4FD5-BCB0-9D0AA8F203F3}"/>
               </a:ext>
             </a:extLst>
           </p:cNvPr>
@@ -9267,31 +9359,19 @@
           <a:p>
             <a:r>
               <a:rPr lang="en-US" dirty="0"/>
-              <a:t>Operating Costs: _________ for the first six months of operation</a:t>
+              <a:t>Target Demographic size in New Haven County: ~people</a:t>
             </a:r>
           </a:p>
           <a:p>
             <a:r>
               <a:rPr lang="en-US" dirty="0"/>
-              <a:t>Overhead: ______</a:t>
+              <a:t>Percent of people needed to break even: ______%</a:t>
             </a:r>
           </a:p>
           <a:p>
             <a:r>
               <a:rPr lang="en-US" dirty="0"/>
-              <a:t>Funding estimate total: _________</a:t>
-            </a:r>
-          </a:p>
-          <a:p>
-            <a:r>
-              <a:rPr lang="en-US" dirty="0"/>
-              <a:t>Break-even point: an engaged community of ___ people</a:t>
-            </a:r>
-          </a:p>
-          <a:p>
-            <a:r>
-              <a:rPr lang="en-US" dirty="0"/>
-              <a:t>Max community engagement capacity: ___ people</a:t>
+              <a:t>Percent of people needed to reach max capacity: 0.2%</a:t>
             </a:r>
           </a:p>
         </p:txBody>
@@ -9299,7 +9379,7 @@
     </p:spTree>
     <p:extLst>
       <p:ext uri="{BB962C8B-B14F-4D97-AF65-F5344CB8AC3E}">
-        <p14:creationId xmlns:p14="http://schemas.microsoft.com/office/powerpoint/2010/main" val="3345576059"/>
+        <p14:creationId xmlns:p14="http://schemas.microsoft.com/office/powerpoint/2010/main" val="3166939221"/>
       </p:ext>
     </p:extLst>
   </p:cSld>
@@ -9331,7 +9411,7 @@
           <p:cNvPr id="2" name="Title 1">
             <a:extLst>
               <a:ext uri="{FF2B5EF4-FFF2-40B4-BE49-F238E27FC236}">
-                <a16:creationId xmlns:a16="http://schemas.microsoft.com/office/drawing/2014/main" id="{0B49C125-978B-4A83-AF64-24CCB912E43E}"/>
+                <a16:creationId xmlns:a16="http://schemas.microsoft.com/office/drawing/2014/main" id="{EF0FDFBD-C4F8-4F2B-B418-027C2D9234B8}"/>
               </a:ext>
             </a:extLst>
           </p:cNvPr>
@@ -9349,7 +9429,7 @@
           <a:p>
             <a:r>
               <a:rPr lang="en-US" dirty="0"/>
-              <a:t>Target Demographic: 18-80 year-olds in the New Haven County Area, CT</a:t>
+              <a:t>Finances</a:t>
             </a:r>
           </a:p>
         </p:txBody>
@@ -9359,7 +9439,7 @@
           <p:cNvPr id="3" name="Content Placeholder 2">
             <a:extLst>
               <a:ext uri="{FF2B5EF4-FFF2-40B4-BE49-F238E27FC236}">
-                <a16:creationId xmlns:a16="http://schemas.microsoft.com/office/drawing/2014/main" id="{4EDA088C-672F-4FD5-BCB0-9D0AA8F203F3}"/>
+                <a16:creationId xmlns:a16="http://schemas.microsoft.com/office/drawing/2014/main" id="{71DB8266-80FE-4AE4-8A09-30C2E2B143AA}"/>
               </a:ext>
             </a:extLst>
           </p:cNvPr>
@@ -9377,19 +9457,31 @@
           <a:p>
             <a:r>
               <a:rPr lang="en-US" dirty="0"/>
-              <a:t>Target Demographic size in New Haven County: ~people</a:t>
+              <a:t>Operating Costs: _________ for the first six months of operation</a:t>
             </a:r>
           </a:p>
           <a:p>
             <a:r>
               <a:rPr lang="en-US" dirty="0"/>
-              <a:t>Percent of people needed to break even: ______%</a:t>
+              <a:t>Overhead: ______</a:t>
             </a:r>
           </a:p>
           <a:p>
             <a:r>
               <a:rPr lang="en-US" dirty="0"/>
-              <a:t>Percent of people needed to reach max capacity: 0.2%</a:t>
+              <a:t>Funding estimate total: _________</a:t>
+            </a:r>
+          </a:p>
+          <a:p>
+            <a:r>
+              <a:rPr lang="en-US" dirty="0"/>
+              <a:t>Break-even point: an engaged community of ___ people</a:t>
+            </a:r>
+          </a:p>
+          <a:p>
+            <a:r>
+              <a:rPr lang="en-US" dirty="0"/>
+              <a:t>Max community engagement capacity: ___ people</a:t>
             </a:r>
           </a:p>
         </p:txBody>
@@ -9397,7 +9489,7 @@
     </p:spTree>
     <p:extLst>
       <p:ext uri="{BB962C8B-B14F-4D97-AF65-F5344CB8AC3E}">
-        <p14:creationId xmlns:p14="http://schemas.microsoft.com/office/powerpoint/2010/main" val="3166939221"/>
+        <p14:creationId xmlns:p14="http://schemas.microsoft.com/office/powerpoint/2010/main" val="3345576059"/>
       </p:ext>
     </p:extLst>
   </p:cSld>
@@ -11365,18 +11457,15 @@
                   </a:schemeClr>
                 </a:solidFill>
               </a:rPr>
-              <a:t>Binge drinking has decreased among teens: </a:t>
-            </a:r>
+              <a:t>Religious attendance has decreased:</a:t>
+            </a:r>
+          </a:p>
+          <a:p>
             <a:r>
               <a:rPr lang="en-US" dirty="0">
-                <a:solidFill>
-                  <a:schemeClr val="tx2">
-                    <a:lumMod val="75000"/>
-                  </a:schemeClr>
-                </a:solidFill>
                 <a:hlinkClick r:id="rId2"/>
               </a:rPr>
-              <a:t>https://www.nytimes.com/2017/07/31/well/family/binge-drinking-drops-among-teenagers.html</a:t>
+              <a:t>https://www.pewforum.org/2016/08/23/2-religious-attendance-fluid-for-many-americans/</a:t>
             </a:r>
             <a:endParaRPr lang="en-US" dirty="0">
               <a:solidFill>
@@ -11387,6 +11476,16 @@
             </a:endParaRPr>
           </a:p>
           <a:p>
+            <a:r>
+              <a:rPr lang="en-US" dirty="0">
+                <a:solidFill>
+                  <a:schemeClr val="tx2">
+                    <a:lumMod val="75000"/>
+                  </a:schemeClr>
+                </a:solidFill>
+              </a:rPr>
+              <a:t>Binge drinking has decreased among teens: </a:t>
+            </a:r>
             <a:r>
               <a:rPr lang="en-US" dirty="0">
                 <a:solidFill>
@@ -11396,6 +11495,26 @@
                 </a:solidFill>
                 <a:hlinkClick r:id="rId3"/>
               </a:rPr>
+              <a:t>https://www.nytimes.com/2017/07/31/well/family/binge-drinking-drops-among-teenagers.html</a:t>
+            </a:r>
+            <a:endParaRPr lang="en-US" dirty="0">
+              <a:solidFill>
+                <a:schemeClr val="tx2">
+                  <a:lumMod val="75000"/>
+                </a:schemeClr>
+              </a:solidFill>
+            </a:endParaRPr>
+          </a:p>
+          <a:p>
+            <a:r>
+              <a:rPr lang="en-US" dirty="0">
+                <a:solidFill>
+                  <a:schemeClr val="tx2">
+                    <a:lumMod val="75000"/>
+                  </a:schemeClr>
+                </a:solidFill>
+                <a:hlinkClick r:id="rId4"/>
+              </a:rPr>
               <a:t>http://www.monitoringthefuture.org/pubs/monographs/mtf-overview2016.pdf</a:t>
             </a:r>
             <a:endParaRPr lang="en-US" dirty="0">
@@ -11424,7 +11543,7 @@
                     <a:lumMod val="75000"/>
                   </a:schemeClr>
                 </a:solidFill>
-                <a:hlinkClick r:id="rId4"/>
+                <a:hlinkClick r:id="rId5"/>
               </a:rPr>
               <a:t>https://www.reuters.com/article/us-usa-health-sex/young-u-s-men-having-a-lot-less-sex-in-the-21st-century-study-shows-idUSKBN23J2LI</a:t>
             </a:r>
@@ -12766,7 +12885,7 @@
           <a:lstStyle/>
           <a:p>
             <a:r>
-              <a:rPr lang="en-US">
+              <a:rPr lang="en-US" dirty="0">
                 <a:solidFill>
                   <a:schemeClr val="tx2">
                     <a:lumMod val="75000"/>
@@ -12778,7 +12897,7 @@
           </a:p>
           <a:p>
             <a:r>
-              <a:rPr lang="en-US">
+              <a:rPr lang="en-US" dirty="0">
                 <a:solidFill>
                   <a:schemeClr val="tx2">
                     <a:lumMod val="75000"/>
@@ -12790,7 +12909,7 @@
           </a:p>
           <a:p>
             <a:r>
-              <a:rPr lang="en-US">
+              <a:rPr lang="en-US" dirty="0">
                 <a:solidFill>
                   <a:schemeClr val="tx2">
                     <a:lumMod val="75000"/>
@@ -12803,7 +12922,7 @@
           <a:p>
             <a:pPr lvl="1"/>
             <a:r>
-              <a:rPr lang="en-US">
+              <a:rPr lang="en-US" dirty="0">
                 <a:solidFill>
                   <a:schemeClr val="tx2">
                     <a:lumMod val="75000"/>
@@ -12816,7 +12935,7 @@
           <a:p>
             <a:pPr lvl="2"/>
             <a:r>
-              <a:rPr lang="en-US">
+              <a:rPr lang="en-US" dirty="0">
                 <a:solidFill>
                   <a:schemeClr val="tx2">
                     <a:lumMod val="75000"/>
@@ -12827,7 +12946,7 @@
             </a:r>
           </a:p>
           <a:p>
-            <a:endParaRPr lang="en-US">
+            <a:endParaRPr lang="en-US" dirty="0">
               <a:solidFill>
                 <a:schemeClr val="tx2">
                   <a:lumMod val="75000"/>
@@ -12836,7 +12955,7 @@
             </a:endParaRPr>
           </a:p>
           <a:p>
-            <a:endParaRPr lang="en-US">
+            <a:endParaRPr lang="en-US" dirty="0">
               <a:solidFill>
                 <a:schemeClr val="tx2">
                   <a:lumMod val="75000"/>
@@ -13243,7 +13362,7 @@
             <a:pPr lvl="2"/>
             <a:r>
               <a:rPr lang="en-US" dirty="0"/>
-              <a:t>Not performing well in a special interest activity or looking like an outcast signals that your interest is not genuine or you’re not fit for the group.</a:t>
+              <a:t>Not performing well in a special interest activity or looking like an outcast signals that your interest is not genuine, or you’re not fit for the group.</a:t>
             </a:r>
           </a:p>
           <a:p>

</xml_diff>

<commit_message>
completed presentation draft 1
</commit_message>
<xml_diff>
--- a/Presentation/SocialHub_FrancisT_06_23_2020.pptx
+++ b/Presentation/SocialHub_FrancisT_06_23_2020.pptx
@@ -136,7 +136,7 @@
 <p1510:revInfo xmlns:a="http://schemas.openxmlformats.org/drawingml/2006/main" xmlns:r="http://schemas.openxmlformats.org/officeDocument/2006/relationships" xmlns:p1510="http://schemas.microsoft.com/office/powerpoint/2015/10/main">
   <p1510:revLst>
     <p1510:client id="{63F3CF76-1364-475A-823F-3E38657C5F84}" v="1" dt="2020-06-24T23:57:48.677"/>
-    <p1510:client id="{E2F6CC62-A8FA-4CA3-B44E-705F9FC4EF55}" v="73" dt="2020-06-25T14:07:02.123"/>
+    <p1510:client id="{E2F6CC62-A8FA-4CA3-B44E-705F9FC4EF55}" v="75" dt="2020-06-25T15:03:05.464"/>
   </p1510:revLst>
 </p1510:revInfo>
 </file>
@@ -146,7 +146,7 @@
   <pc:docChgLst>
     <pc:chgData name="Francis, Thomas" userId="2e7f689e-290c-4746-ba0f-274b885931e9" providerId="ADAL" clId="{E2F6CC62-A8FA-4CA3-B44E-705F9FC4EF55}"/>
     <pc:docChg chg="undo custSel mod addSld delSld modSld">
-      <pc:chgData name="Francis, Thomas" userId="2e7f689e-290c-4746-ba0f-274b885931e9" providerId="ADAL" clId="{E2F6CC62-A8FA-4CA3-B44E-705F9FC4EF55}" dt="2020-06-25T14:26:30.736" v="6966" actId="20577"/>
+      <pc:chgData name="Francis, Thomas" userId="2e7f689e-290c-4746-ba0f-274b885931e9" providerId="ADAL" clId="{E2F6CC62-A8FA-4CA3-B44E-705F9FC4EF55}" dt="2020-06-25T15:04:28.984" v="7180" actId="1076"/>
       <pc:docMkLst>
         <pc:docMk/>
       </pc:docMkLst>
@@ -726,13 +726,13 @@
         </pc:cxnChg>
       </pc:sldChg>
       <pc:sldChg chg="modSp add">
-        <pc:chgData name="Francis, Thomas" userId="2e7f689e-290c-4746-ba0f-274b885931e9" providerId="ADAL" clId="{E2F6CC62-A8FA-4CA3-B44E-705F9FC4EF55}" dt="2020-06-25T14:17:26.460" v="6781" actId="115"/>
+        <pc:chgData name="Francis, Thomas" userId="2e7f689e-290c-4746-ba0f-274b885931e9" providerId="ADAL" clId="{E2F6CC62-A8FA-4CA3-B44E-705F9FC4EF55}" dt="2020-06-25T14:57:23.524" v="7006" actId="20577"/>
         <pc:sldMkLst>
           <pc:docMk/>
           <pc:sldMk cId="3345576059" sldId="272"/>
         </pc:sldMkLst>
         <pc:spChg chg="mod">
-          <ac:chgData name="Francis, Thomas" userId="2e7f689e-290c-4746-ba0f-274b885931e9" providerId="ADAL" clId="{E2F6CC62-A8FA-4CA3-B44E-705F9FC4EF55}" dt="2020-06-25T14:17:26.460" v="6781" actId="115"/>
+          <ac:chgData name="Francis, Thomas" userId="2e7f689e-290c-4746-ba0f-274b885931e9" providerId="ADAL" clId="{E2F6CC62-A8FA-4CA3-B44E-705F9FC4EF55}" dt="2020-06-25T14:57:23.524" v="7006" actId="20577"/>
           <ac:spMkLst>
             <pc:docMk/>
             <pc:sldMk cId="3345576059" sldId="272"/>
@@ -921,13 +921,13 @@
         </pc:picChg>
       </pc:sldChg>
       <pc:sldChg chg="modSp add">
-        <pc:chgData name="Francis, Thomas" userId="2e7f689e-290c-4746-ba0f-274b885931e9" providerId="ADAL" clId="{E2F6CC62-A8FA-4CA3-B44E-705F9FC4EF55}" dt="2020-06-24T18:35:52.693" v="4045" actId="20577"/>
+        <pc:chgData name="Francis, Thomas" userId="2e7f689e-290c-4746-ba0f-274b885931e9" providerId="ADAL" clId="{E2F6CC62-A8FA-4CA3-B44E-705F9FC4EF55}" dt="2020-06-25T14:33:34.841" v="6970" actId="20577"/>
         <pc:sldMkLst>
           <pc:docMk/>
           <pc:sldMk cId="923092625" sldId="277"/>
         </pc:sldMkLst>
         <pc:spChg chg="mod">
-          <ac:chgData name="Francis, Thomas" userId="2e7f689e-290c-4746-ba0f-274b885931e9" providerId="ADAL" clId="{E2F6CC62-A8FA-4CA3-B44E-705F9FC4EF55}" dt="2020-06-24T18:28:56.069" v="3947" actId="20577"/>
+          <ac:chgData name="Francis, Thomas" userId="2e7f689e-290c-4746-ba0f-274b885931e9" providerId="ADAL" clId="{E2F6CC62-A8FA-4CA3-B44E-705F9FC4EF55}" dt="2020-06-25T14:33:34.841" v="6970" actId="20577"/>
           <ac:spMkLst>
             <pc:docMk/>
             <pc:sldMk cId="923092625" sldId="277"/>
@@ -944,7 +944,7 @@
         </pc:spChg>
       </pc:sldChg>
       <pc:sldChg chg="addSp delSp modSp add mod setBg">
-        <pc:chgData name="Francis, Thomas" userId="2e7f689e-290c-4746-ba0f-274b885931e9" providerId="ADAL" clId="{E2F6CC62-A8FA-4CA3-B44E-705F9FC4EF55}" dt="2020-06-25T13:41:28.317" v="5886" actId="1076"/>
+        <pc:chgData name="Francis, Thomas" userId="2e7f689e-290c-4746-ba0f-274b885931e9" providerId="ADAL" clId="{E2F6CC62-A8FA-4CA3-B44E-705F9FC4EF55}" dt="2020-06-25T15:04:28.984" v="7180" actId="1076"/>
         <pc:sldMkLst>
           <pc:docMk/>
           <pc:sldMk cId="1401021797" sldId="278"/>
@@ -963,6 +963,14 @@
             <pc:docMk/>
             <pc:sldMk cId="1401021797" sldId="278"/>
             <ac:spMk id="3" creationId="{6FEAA6AD-8F5A-4A62-8F8E-9D5C6C9AABF0}"/>
+          </ac:spMkLst>
+        </pc:spChg>
+        <pc:spChg chg="add mod">
+          <ac:chgData name="Francis, Thomas" userId="2e7f689e-290c-4746-ba0f-274b885931e9" providerId="ADAL" clId="{E2F6CC62-A8FA-4CA3-B44E-705F9FC4EF55}" dt="2020-06-25T15:04:28.984" v="7180" actId="1076"/>
+          <ac:spMkLst>
+            <pc:docMk/>
+            <pc:sldMk cId="1401021797" sldId="278"/>
+            <ac:spMk id="3" creationId="{B122CE73-AA67-4C5F-8470-CC8DDE0B17F9}"/>
           </ac:spMkLst>
         </pc:spChg>
         <pc:spChg chg="add">
@@ -1046,7 +1054,7 @@
         </pc:sldMkLst>
       </pc:sldChg>
       <pc:sldChg chg="addSp delSp modSp add">
-        <pc:chgData name="Francis, Thomas" userId="2e7f689e-290c-4746-ba0f-274b885931e9" providerId="ADAL" clId="{E2F6CC62-A8FA-4CA3-B44E-705F9FC4EF55}" dt="2020-06-25T14:18:06.710" v="6787" actId="20577"/>
+        <pc:chgData name="Francis, Thomas" userId="2e7f689e-290c-4746-ba0f-274b885931e9" providerId="ADAL" clId="{E2F6CC62-A8FA-4CA3-B44E-705F9FC4EF55}" dt="2020-06-25T15:01:21.002" v="7063" actId="20577"/>
         <pc:sldMkLst>
           <pc:docMk/>
           <pc:sldMk cId="4062344240" sldId="279"/>
@@ -1084,7 +1092,7 @@
           </ac:spMkLst>
         </pc:spChg>
         <pc:spChg chg="add mod">
-          <ac:chgData name="Francis, Thomas" userId="2e7f689e-290c-4746-ba0f-274b885931e9" providerId="ADAL" clId="{E2F6CC62-A8FA-4CA3-B44E-705F9FC4EF55}" dt="2020-06-25T14:18:06.710" v="6787" actId="20577"/>
+          <ac:chgData name="Francis, Thomas" userId="2e7f689e-290c-4746-ba0f-274b885931e9" providerId="ADAL" clId="{E2F6CC62-A8FA-4CA3-B44E-705F9FC4EF55}" dt="2020-06-25T15:01:21.002" v="7063" actId="20577"/>
           <ac:spMkLst>
             <pc:docMk/>
             <pc:sldMk cId="4062344240" sldId="279"/>
@@ -17517,36 +17525,38 @@
           <a:p>
             <a:r>
               <a:rPr lang="en-US" dirty="0"/>
-              <a:t>Operating Costs: </a:t>
+              <a:t>Monthly operating costs: </a:t>
             </a:r>
             <a:r>
               <a:rPr lang="en-US" b="1" dirty="0"/>
-              <a:t>$190,500 </a:t>
+              <a:t>$18,500</a:t>
+            </a:r>
+            <a:endParaRPr lang="en-US" dirty="0"/>
+          </a:p>
+          <a:p>
+            <a:r>
+              <a:rPr lang="en-US" dirty="0"/>
+              <a:t>Overhead: </a:t>
+            </a:r>
+            <a:r>
+              <a:rPr lang="en-US" b="1" dirty="0"/>
+              <a:t>$79,400</a:t>
+            </a:r>
+          </a:p>
+          <a:p>
+            <a:r>
+              <a:rPr lang="en-US" dirty="0"/>
+              <a:t>Funding estimate total: </a:t>
+            </a:r>
+            <a:r>
+              <a:rPr lang="en-US" b="1" dirty="0"/>
+              <a:t>$222,000 </a:t>
             </a:r>
             <a:r>
               <a:rPr lang="en-US" dirty="0"/>
               <a:t>for the first six months of operation</a:t>
             </a:r>
-          </a:p>
-          <a:p>
-            <a:r>
-              <a:rPr lang="en-US" dirty="0"/>
-              <a:t>Overhead: </a:t>
-            </a:r>
-            <a:r>
-              <a:rPr lang="en-US" b="1" dirty="0"/>
-              <a:t>$79,400</a:t>
-            </a:r>
-          </a:p>
-          <a:p>
-            <a:r>
-              <a:rPr lang="en-US" dirty="0"/>
-              <a:t>Funding estimate total: </a:t>
-            </a:r>
-            <a:r>
-              <a:rPr lang="en-US" b="1" dirty="0"/>
-              <a:t>$222,000</a:t>
-            </a:r>
+            <a:endParaRPr lang="en-US" b="1" dirty="0"/>
           </a:p>
           <a:p>
             <a:r>
@@ -18266,6 +18276,69 @@
           <a:p>
             <a:pPr algn="ctr"/>
             <a:endParaRPr lang="en-US"/>
+          </a:p>
+        </p:txBody>
+      </p:sp>
+      <p:sp>
+        <p:nvSpPr>
+          <p:cNvPr id="3" name="TextBox 2">
+            <a:extLst>
+              <a:ext uri="{FF2B5EF4-FFF2-40B4-BE49-F238E27FC236}">
+                <a16:creationId xmlns:a16="http://schemas.microsoft.com/office/drawing/2014/main" id="{B122CE73-AA67-4C5F-8470-CC8DDE0B17F9}"/>
+              </a:ext>
+            </a:extLst>
+          </p:cNvPr>
+          <p:cNvSpPr txBox="1"/>
+          <p:nvPr/>
+        </p:nvSpPr>
+        <p:spPr>
+          <a:xfrm>
+            <a:off x="725864" y="1307210"/>
+            <a:ext cx="7843706" cy="1200329"/>
+          </a:xfrm>
+          <a:prstGeom prst="rect">
+            <a:avLst/>
+          </a:prstGeom>
+          <a:noFill/>
+        </p:spPr>
+        <p:txBody>
+          <a:bodyPr wrap="square" rtlCol="0">
+            <a:spAutoFit/>
+          </a:bodyPr>
+          <a:lstStyle/>
+          <a:p>
+            <a:r>
+              <a:rPr lang="en-US" dirty="0"/>
+              <a:t>Membership fee: </a:t>
+            </a:r>
+            <a:r>
+              <a:rPr lang="en-US" b="1" dirty="0"/>
+              <a:t>$40 per month</a:t>
+            </a:r>
+          </a:p>
+          <a:p>
+            <a:r>
+              <a:rPr lang="en-US" dirty="0"/>
+              <a:t>Weekday Entry fee: </a:t>
+            </a:r>
+            <a:r>
+              <a:rPr lang="en-US" b="1" dirty="0"/>
+              <a:t>$10</a:t>
+            </a:r>
+          </a:p>
+          <a:p>
+            <a:r>
+              <a:rPr lang="en-US" dirty="0"/>
+              <a:t>Weekend Entry fee: </a:t>
+            </a:r>
+            <a:r>
+              <a:rPr lang="en-US" b="1" dirty="0"/>
+              <a:t>$20</a:t>
+            </a:r>
+            <a:endParaRPr lang="en-US" dirty="0"/>
+          </a:p>
+          <a:p>
+            <a:endParaRPr lang="en-US" dirty="0"/>
           </a:p>
         </p:txBody>
       </p:sp>
@@ -19049,7 +19122,7 @@
         <p:spPr>
           <a:xfrm>
             <a:off x="7837498" y="2583809"/>
-            <a:ext cx="3605074" cy="923330"/>
+            <a:ext cx="3605074" cy="1754326"/>
           </a:xfrm>
           <a:prstGeom prst="rect">
             <a:avLst/>
@@ -19064,7 +19137,16 @@
           <a:p>
             <a:r>
               <a:rPr lang="en-US" dirty="0"/>
-              <a:t>The 80/20 rule is used to approximate profit from sub-communities of engagement. </a:t>
+              <a:t>The 80/20 rule is used to approximate profit from sub-communities of engagement.</a:t>
+            </a:r>
+          </a:p>
+          <a:p>
+            <a:endParaRPr lang="en-US" dirty="0"/>
+          </a:p>
+          <a:p>
+            <a:r>
+              <a:rPr lang="en-US" dirty="0"/>
+              <a:t>Assumes exclusive sub-communities.</a:t>
             </a:r>
           </a:p>
         </p:txBody>
@@ -19398,7 +19480,7 @@
           <a:p>
             <a:r>
               <a:rPr lang="en-US" dirty="0"/>
-              <a:t>Health Effects of the Loneliness</a:t>
+              <a:t>Health Effects of Loneliness</a:t>
             </a:r>
           </a:p>
         </p:txBody>

</xml_diff>

<commit_message>
I might have found a permanent name
</commit_message>
<xml_diff>
--- a/Presentation/SocialHub_FrancisT_06_23_2020.pptx
+++ b/Presentation/SocialHub_FrancisT_06_23_2020.pptx
@@ -146,16 +146,24 @@
   <pc:docChgLst>
     <pc:chgData name="Francis, Thomas" userId="2e7f689e-290c-4746-ba0f-274b885931e9" providerId="ADAL" clId="{E2F6CC62-A8FA-4CA3-B44E-705F9FC4EF55}"/>
     <pc:docChg chg="undo custSel mod addSld delSld modSld">
-      <pc:chgData name="Francis, Thomas" userId="2e7f689e-290c-4746-ba0f-274b885931e9" providerId="ADAL" clId="{E2F6CC62-A8FA-4CA3-B44E-705F9FC4EF55}" dt="2020-06-25T15:04:28.984" v="7180" actId="1076"/>
+      <pc:chgData name="Francis, Thomas" userId="2e7f689e-290c-4746-ba0f-274b885931e9" providerId="ADAL" clId="{E2F6CC62-A8FA-4CA3-B44E-705F9FC4EF55}" dt="2020-06-25T19:13:55.413" v="7199" actId="20577"/>
       <pc:docMkLst>
         <pc:docMk/>
       </pc:docMkLst>
       <pc:sldChg chg="modSp">
-        <pc:chgData name="Francis, Thomas" userId="2e7f689e-290c-4746-ba0f-274b885931e9" providerId="ADAL" clId="{E2F6CC62-A8FA-4CA3-B44E-705F9FC4EF55}" dt="2020-06-24T16:26:21.569" v="3644" actId="114"/>
+        <pc:chgData name="Francis, Thomas" userId="2e7f689e-290c-4746-ba0f-274b885931e9" providerId="ADAL" clId="{E2F6CC62-A8FA-4CA3-B44E-705F9FC4EF55}" dt="2020-06-25T19:13:55.413" v="7199" actId="20577"/>
         <pc:sldMkLst>
           <pc:docMk/>
           <pc:sldMk cId="118792049" sldId="256"/>
         </pc:sldMkLst>
+        <pc:spChg chg="mod">
+          <ac:chgData name="Francis, Thomas" userId="2e7f689e-290c-4746-ba0f-274b885931e9" providerId="ADAL" clId="{E2F6CC62-A8FA-4CA3-B44E-705F9FC4EF55}" dt="2020-06-25T19:13:55.413" v="7199" actId="20577"/>
+          <ac:spMkLst>
+            <pc:docMk/>
+            <pc:sldMk cId="118792049" sldId="256"/>
+            <ac:spMk id="2" creationId="{14F14D6C-9B62-40E2-A81E-6E3568794489}"/>
+          </ac:spMkLst>
+        </pc:spChg>
         <pc:spChg chg="mod">
           <ac:chgData name="Francis, Thomas" userId="2e7f689e-290c-4746-ba0f-274b885931e9" providerId="ADAL" clId="{E2F6CC62-A8FA-4CA3-B44E-705F9FC4EF55}" dt="2020-06-24T16:26:21.569" v="3644" actId="114"/>
           <ac:spMkLst>
@@ -8858,9 +8866,10 @@
           <a:lstStyle/>
           <a:p>
             <a:r>
-              <a:rPr lang="en-US" dirty="0"/>
-              <a:t>Name of This Business</a:t>
-            </a:r>
+              <a:rPr lang="en-US"/>
+              <a:t>So-Show</a:t>
+            </a:r>
+            <a:endParaRPr lang="en-US" dirty="0"/>
           </a:p>
         </p:txBody>
       </p:sp>

</xml_diff>

<commit_message>
fixed the name, made it one word to keep it simple
</commit_message>
<xml_diff>
--- a/Presentation/SocialHub_FrancisT_06_23_2020.pptx
+++ b/Presentation/SocialHub_FrancisT_06_23_2020.pptx
@@ -135,7 +135,7 @@
 <file path=ppt/revisionInfo.xml><?xml version="1.0" encoding="utf-8"?>
 <p1510:revInfo xmlns:a="http://schemas.openxmlformats.org/drawingml/2006/main" xmlns:r="http://schemas.openxmlformats.org/officeDocument/2006/relationships" xmlns:p1510="http://schemas.microsoft.com/office/powerpoint/2015/10/main">
   <p1510:revLst>
-    <p1510:client id="{63F3CF76-1364-475A-823F-3E38657C5F84}" v="1" dt="2020-06-24T23:57:48.677"/>
+    <p1510:client id="{63F3CF76-1364-475A-823F-3E38657C5F84}" v="2" dt="2020-06-25T20:55:24.299"/>
     <p1510:client id="{E2F6CC62-A8FA-4CA3-B44E-705F9FC4EF55}" v="75" dt="2020-06-25T15:03:05.464"/>
   </p1510:revLst>
 </p1510:revInfo>
@@ -1241,10 +1241,25 @@
   <pc:docChgLst>
     <pc:chgData name="Thomas Francis" userId="5c2c6e3652e668e7" providerId="LiveId" clId="{63F3CF76-1364-475A-823F-3E38657C5F84}"/>
     <pc:docChg chg="custSel modSld sldOrd">
-      <pc:chgData name="Thomas Francis" userId="5c2c6e3652e668e7" providerId="LiveId" clId="{63F3CF76-1364-475A-823F-3E38657C5F84}" dt="2020-06-25T00:01:11.186" v="177" actId="20577"/>
+      <pc:chgData name="Thomas Francis" userId="5c2c6e3652e668e7" providerId="LiveId" clId="{63F3CF76-1364-475A-823F-3E38657C5F84}" dt="2020-06-25T20:53:56.821" v="184" actId="20577"/>
       <pc:docMkLst>
         <pc:docMk/>
       </pc:docMkLst>
+      <pc:sldChg chg="modSp mod">
+        <pc:chgData name="Thomas Francis" userId="5c2c6e3652e668e7" providerId="LiveId" clId="{63F3CF76-1364-475A-823F-3E38657C5F84}" dt="2020-06-25T20:53:56.821" v="184" actId="20577"/>
+        <pc:sldMkLst>
+          <pc:docMk/>
+          <pc:sldMk cId="118792049" sldId="256"/>
+        </pc:sldMkLst>
+        <pc:spChg chg="mod">
+          <ac:chgData name="Thomas Francis" userId="5c2c6e3652e668e7" providerId="LiveId" clId="{63F3CF76-1364-475A-823F-3E38657C5F84}" dt="2020-06-25T20:53:56.821" v="184" actId="20577"/>
+          <ac:spMkLst>
+            <pc:docMk/>
+            <pc:sldMk cId="118792049" sldId="256"/>
+            <ac:spMk id="2" creationId="{14F14D6C-9B62-40E2-A81E-6E3568794489}"/>
+          </ac:spMkLst>
+        </pc:spChg>
+      </pc:sldChg>
       <pc:sldChg chg="modSp mod">
         <pc:chgData name="Thomas Francis" userId="5c2c6e3652e668e7" providerId="LiveId" clId="{63F3CF76-1364-475A-823F-3E38657C5F84}" dt="2020-06-24T23:58:01.864" v="145" actId="20577"/>
         <pc:sldMkLst>
@@ -8866,10 +8881,9 @@
           <a:lstStyle/>
           <a:p>
             <a:r>
-              <a:rPr lang="en-US"/>
-              <a:t>So-Show</a:t>
-            </a:r>
-            <a:endParaRPr lang="en-US" dirty="0"/>
+              <a:rPr lang="en-US" dirty="0"/>
+              <a:t>The Soshow</a:t>
+            </a:r>
           </a:p>
         </p:txBody>
       </p:sp>

</xml_diff>

<commit_message>
NDA, updated rent cost
</commit_message>
<xml_diff>
--- a/Presentation/SocialHub_FrancisT_06_23_2020.pptx
+++ b/Presentation/SocialHub_FrancisT_06_23_2020.pptx
@@ -135,7 +135,6 @@
 <file path=ppt/revisionInfo.xml><?xml version="1.0" encoding="utf-8"?>
 <p1510:revInfo xmlns:a="http://schemas.openxmlformats.org/drawingml/2006/main" xmlns:r="http://schemas.openxmlformats.org/officeDocument/2006/relationships" xmlns:p1510="http://schemas.microsoft.com/office/powerpoint/2015/10/main">
   <p1510:revLst>
-    <p1510:client id="{63F3CF76-1364-475A-823F-3E38657C5F84}" v="2" dt="2020-06-25T20:55:24.299"/>
     <p1510:client id="{E2F6CC62-A8FA-4CA3-B44E-705F9FC4EF55}" v="81" dt="2020-06-26T14:02:27.736"/>
   </p1510:revLst>
 </p1510:revInfo>
@@ -1478,6 +1477,60 @@
     </pc:docChg>
   </pc:docChgLst>
   <pc:docChgLst>
+    <pc:chgData name="Thomas Francis" userId="2e7f689e-290c-4746-ba0f-274b885931e9" providerId="ADAL" clId="{E2F6CC62-A8FA-4CA3-B44E-705F9FC4EF55}"/>
+    <pc:docChg chg="modSld">
+      <pc:chgData name="Thomas Francis" userId="2e7f689e-290c-4746-ba0f-274b885931e9" providerId="ADAL" clId="{E2F6CC62-A8FA-4CA3-B44E-705F9FC4EF55}" dt="2020-07-01T15:09:44.797" v="43" actId="20577"/>
+      <pc:docMkLst>
+        <pc:docMk/>
+      </pc:docMkLst>
+      <pc:sldChg chg="modSp">
+        <pc:chgData name="Thomas Francis" userId="2e7f689e-290c-4746-ba0f-274b885931e9" providerId="ADAL" clId="{E2F6CC62-A8FA-4CA3-B44E-705F9FC4EF55}" dt="2020-07-01T15:09:44.797" v="43" actId="20577"/>
+        <pc:sldMkLst>
+          <pc:docMk/>
+          <pc:sldMk cId="3390689853" sldId="262"/>
+        </pc:sldMkLst>
+        <pc:spChg chg="mod">
+          <ac:chgData name="Thomas Francis" userId="2e7f689e-290c-4746-ba0f-274b885931e9" providerId="ADAL" clId="{E2F6CC62-A8FA-4CA3-B44E-705F9FC4EF55}" dt="2020-07-01T15:09:44.797" v="43" actId="20577"/>
+          <ac:spMkLst>
+            <pc:docMk/>
+            <pc:sldMk cId="3390689853" sldId="262"/>
+            <ac:spMk id="3" creationId="{69F4B873-5DDA-4F2C-8891-E4BC94C1F90B}"/>
+          </ac:spMkLst>
+        </pc:spChg>
+      </pc:sldChg>
+      <pc:sldChg chg="modSp">
+        <pc:chgData name="Thomas Francis" userId="2e7f689e-290c-4746-ba0f-274b885931e9" providerId="ADAL" clId="{E2F6CC62-A8FA-4CA3-B44E-705F9FC4EF55}" dt="2020-07-01T14:21:52.502" v="15" actId="20577"/>
+        <pc:sldMkLst>
+          <pc:docMk/>
+          <pc:sldMk cId="3345576059" sldId="272"/>
+        </pc:sldMkLst>
+        <pc:spChg chg="mod">
+          <ac:chgData name="Thomas Francis" userId="2e7f689e-290c-4746-ba0f-274b885931e9" providerId="ADAL" clId="{E2F6CC62-A8FA-4CA3-B44E-705F9FC4EF55}" dt="2020-07-01T14:21:52.502" v="15" actId="20577"/>
+          <ac:spMkLst>
+            <pc:docMk/>
+            <pc:sldMk cId="3345576059" sldId="272"/>
+            <ac:spMk id="3" creationId="{71DB8266-80FE-4AE4-8A09-30C2E2B143AA}"/>
+          </ac:spMkLst>
+        </pc:spChg>
+      </pc:sldChg>
+      <pc:sldChg chg="modSp">
+        <pc:chgData name="Thomas Francis" userId="2e7f689e-290c-4746-ba0f-274b885931e9" providerId="ADAL" clId="{E2F6CC62-A8FA-4CA3-B44E-705F9FC4EF55}" dt="2020-07-01T14:23:27.798" v="38" actId="15"/>
+        <pc:sldMkLst>
+          <pc:docMk/>
+          <pc:sldMk cId="3166939221" sldId="273"/>
+        </pc:sldMkLst>
+        <pc:spChg chg="mod">
+          <ac:chgData name="Thomas Francis" userId="2e7f689e-290c-4746-ba0f-274b885931e9" providerId="ADAL" clId="{E2F6CC62-A8FA-4CA3-B44E-705F9FC4EF55}" dt="2020-07-01T14:23:27.798" v="38" actId="15"/>
+          <ac:spMkLst>
+            <pc:docMk/>
+            <pc:sldMk cId="3166939221" sldId="273"/>
+            <ac:spMk id="3" creationId="{4EDA088C-672F-4FD5-BCB0-9D0AA8F203F3}"/>
+          </ac:spMkLst>
+        </pc:spChg>
+      </pc:sldChg>
+    </pc:docChg>
+  </pc:docChgLst>
+  <pc:docChgLst>
     <pc:chgData name="Thomas Francis" userId="5c2c6e3652e668e7" providerId="LiveId" clId="{63F3CF76-1364-475A-823F-3E38657C5F84}"/>
     <pc:docChg chg="custSel modSld sldOrd">
       <pc:chgData name="Thomas Francis" userId="5c2c6e3652e668e7" providerId="LiveId" clId="{63F3CF76-1364-475A-823F-3E38657C5F84}" dt="2020-06-25T20:53:56.821" v="184" actId="20577"/>
@@ -1775,7 +1828,7 @@
             <a:fld id="{B61BEF0D-F0BB-DE4B-95CE-6DB70DBA9567}" type="datetimeFigureOut">
               <a:rPr lang="en-US" dirty="0"/>
               <a:pPr/>
-              <a:t>6/26/2020</a:t>
+              <a:t>7/1/2020</a:t>
             </a:fld>
             <a:endParaRPr lang="en-US" dirty="0"/>
           </a:p>
@@ -2110,7 +2163,7 @@
             <a:fld id="{B61BEF0D-F0BB-DE4B-95CE-6DB70DBA9567}" type="datetimeFigureOut">
               <a:rPr lang="en-US" dirty="0"/>
               <a:pPr/>
-              <a:t>6/26/2020</a:t>
+              <a:t>7/1/2020</a:t>
             </a:fld>
             <a:endParaRPr lang="en-US" dirty="0"/>
           </a:p>
@@ -2508,7 +2561,7 @@
             <a:fld id="{B61BEF0D-F0BB-DE4B-95CE-6DB70DBA9567}" type="datetimeFigureOut">
               <a:rPr lang="en-US" dirty="0"/>
               <a:pPr/>
-              <a:t>6/26/2020</a:t>
+              <a:t>7/1/2020</a:t>
             </a:fld>
             <a:endParaRPr lang="en-US" dirty="0"/>
           </a:p>
@@ -2840,7 +2893,7 @@
             <a:fld id="{B61BEF0D-F0BB-DE4B-95CE-6DB70DBA9567}" type="datetimeFigureOut">
               <a:rPr lang="en-US" dirty="0"/>
               <a:pPr/>
-              <a:t>6/26/2020</a:t>
+              <a:t>7/1/2020</a:t>
             </a:fld>
             <a:endParaRPr lang="en-US" dirty="0"/>
           </a:p>
@@ -3157,7 +3210,7 @@
             <a:fld id="{B61BEF0D-F0BB-DE4B-95CE-6DB70DBA9567}" type="datetimeFigureOut">
               <a:rPr lang="en-US" dirty="0"/>
               <a:pPr/>
-              <a:t>6/26/2020</a:t>
+              <a:t>7/1/2020</a:t>
             </a:fld>
             <a:endParaRPr lang="en-US" dirty="0"/>
           </a:p>
@@ -3550,7 +3603,7 @@
             <a:fld id="{B61BEF0D-F0BB-DE4B-95CE-6DB70DBA9567}" type="datetimeFigureOut">
               <a:rPr lang="en-US" dirty="0"/>
               <a:pPr/>
-              <a:t>6/26/2020</a:t>
+              <a:t>7/1/2020</a:t>
             </a:fld>
             <a:endParaRPr lang="en-US" dirty="0"/>
           </a:p>
@@ -3804,7 +3857,7 @@
             <a:fld id="{B61BEF0D-F0BB-DE4B-95CE-6DB70DBA9567}" type="datetimeFigureOut">
               <a:rPr lang="en-US" dirty="0"/>
               <a:pPr/>
-              <a:t>6/26/2020</a:t>
+              <a:t>7/1/2020</a:t>
             </a:fld>
             <a:endParaRPr lang="en-US" dirty="0"/>
           </a:p>
@@ -4063,7 +4116,7 @@
             <a:fld id="{B61BEF0D-F0BB-DE4B-95CE-6DB70DBA9567}" type="datetimeFigureOut">
               <a:rPr lang="en-US" dirty="0"/>
               <a:pPr/>
-              <a:t>6/26/2020</a:t>
+              <a:t>7/1/2020</a:t>
             </a:fld>
             <a:endParaRPr lang="en-US" dirty="0"/>
           </a:p>
@@ -4322,7 +4375,7 @@
             <a:fld id="{B61BEF0D-F0BB-DE4B-95CE-6DB70DBA9567}" type="datetimeFigureOut">
               <a:rPr lang="en-US" dirty="0"/>
               <a:pPr/>
-              <a:t>6/26/2020</a:t>
+              <a:t>7/1/2020</a:t>
             </a:fld>
             <a:endParaRPr lang="en-US" dirty="0"/>
           </a:p>
@@ -4648,7 +4701,7 @@
             <a:fld id="{B61BEF0D-F0BB-DE4B-95CE-6DB70DBA9567}" type="datetimeFigureOut">
               <a:rPr lang="en-US" dirty="0"/>
               <a:pPr/>
-              <a:t>6/26/2020</a:t>
+              <a:t>7/1/2020</a:t>
             </a:fld>
             <a:endParaRPr lang="en-US" dirty="0"/>
           </a:p>
@@ -4968,7 +5021,7 @@
             <a:fld id="{B61BEF0D-F0BB-DE4B-95CE-6DB70DBA9567}" type="datetimeFigureOut">
               <a:rPr lang="en-US" dirty="0"/>
               <a:pPr/>
-              <a:t>6/26/2020</a:t>
+              <a:t>7/1/2020</a:t>
             </a:fld>
             <a:endParaRPr lang="en-US" dirty="0"/>
           </a:p>
@@ -5422,7 +5475,7 @@
             <a:fld id="{B61BEF0D-F0BB-DE4B-95CE-6DB70DBA9567}" type="datetimeFigureOut">
               <a:rPr lang="en-US" dirty="0"/>
               <a:pPr/>
-              <a:t>6/26/2020</a:t>
+              <a:t>7/1/2020</a:t>
             </a:fld>
             <a:endParaRPr lang="en-US" dirty="0"/>
           </a:p>
@@ -5624,7 +5677,7 @@
             <a:fld id="{B61BEF0D-F0BB-DE4B-95CE-6DB70DBA9567}" type="datetimeFigureOut">
               <a:rPr lang="en-US" dirty="0"/>
               <a:pPr/>
-              <a:t>6/26/2020</a:t>
+              <a:t>7/1/2020</a:t>
             </a:fld>
             <a:endParaRPr lang="en-US" dirty="0"/>
           </a:p>
@@ -5798,7 +5851,7 @@
             <a:fld id="{B61BEF0D-F0BB-DE4B-95CE-6DB70DBA9567}" type="datetimeFigureOut">
               <a:rPr lang="en-US" dirty="0"/>
               <a:pPr/>
-              <a:t>6/26/2020</a:t>
+              <a:t>7/1/2020</a:t>
             </a:fld>
             <a:endParaRPr lang="en-US" dirty="0"/>
           </a:p>
@@ -6128,7 +6181,7 @@
             <a:fld id="{B61BEF0D-F0BB-DE4B-95CE-6DB70DBA9567}" type="datetimeFigureOut">
               <a:rPr lang="en-US" dirty="0"/>
               <a:pPr/>
-              <a:t>6/26/2020</a:t>
+              <a:t>7/1/2020</a:t>
             </a:fld>
             <a:endParaRPr lang="en-US" dirty="0"/>
           </a:p>
@@ -6470,7 +6523,7 @@
             <a:fld id="{B61BEF0D-F0BB-DE4B-95CE-6DB70DBA9567}" type="datetimeFigureOut">
               <a:rPr lang="en-US" dirty="0"/>
               <a:pPr/>
-              <a:t>6/26/2020</a:t>
+              <a:t>7/1/2020</a:t>
             </a:fld>
             <a:endParaRPr lang="en-US" dirty="0"/>
           </a:p>
@@ -8584,7 +8637,7 @@
             <a:fld id="{B61BEF0D-F0BB-DE4B-95CE-6DB70DBA9567}" type="datetimeFigureOut">
               <a:rPr lang="en-US" dirty="0"/>
               <a:pPr/>
-              <a:t>6/26/2020</a:t>
+              <a:t>7/1/2020</a:t>
             </a:fld>
             <a:endParaRPr lang="en-US" dirty="0"/>
           </a:p>
@@ -17870,8 +17923,11 @@
                   </a:schemeClr>
                 </a:solidFill>
               </a:rPr>
-              <a:t>Target Demographic: </a:t>
+              <a:t>Target Demographic:</a:t>
             </a:r>
+          </a:p>
+          <a:p>
+            <a:pPr lvl="1"/>
             <a:r>
               <a:rPr lang="en-US" b="1" dirty="0">
                 <a:solidFill>
@@ -17880,20 +17936,10 @@
                   </a:schemeClr>
                 </a:solidFill>
               </a:rPr>
-              <a:t>18-80 year-olds</a:t>
+              <a:t>18-30 year-olds and 50-80 year-olds</a:t>
             </a:r>
           </a:p>
           <a:p>
-            <a:r>
-              <a:rPr lang="en-US">
-                <a:solidFill>
-                  <a:schemeClr val="tx2">
-                    <a:lumMod val="75000"/>
-                  </a:schemeClr>
-                </a:solidFill>
-              </a:rPr>
-              <a:t>Target Demographic size </a:t>
-            </a:r>
             <a:r>
               <a:rPr lang="en-US" dirty="0">
                 <a:solidFill>
@@ -17902,7 +17948,7 @@
                   </a:schemeClr>
                 </a:solidFill>
               </a:rPr>
-              <a:t>in New Haven County: </a:t>
+              <a:t>Target Demographic size in New Haven County: </a:t>
             </a:r>
             <a:r>
               <a:rPr lang="en-US" b="1" dirty="0">
@@ -18067,7 +18113,7 @@
             </a:r>
             <a:r>
               <a:rPr lang="en-US" b="1" dirty="0"/>
-              <a:t>$79,400</a:t>
+              <a:t>$92,070</a:t>
             </a:r>
           </a:p>
           <a:p>
@@ -18077,7 +18123,7 @@
             </a:r>
             <a:r>
               <a:rPr lang="en-US" b="1" dirty="0"/>
-              <a:t>$222,000 </a:t>
+              <a:t>$202,000 </a:t>
             </a:r>
             <a:r>
               <a:rPr lang="en-US" dirty="0"/>
@@ -25904,7 +25950,7 @@
           <a:lstStyle/>
           <a:p>
             <a:r>
-              <a:rPr lang="en-US">
+              <a:rPr lang="en-US" dirty="0">
                 <a:solidFill>
                   <a:schemeClr val="tx2">
                     <a:lumMod val="75000"/>
@@ -25916,7 +25962,7 @@
           </a:p>
           <a:p>
             <a:r>
-              <a:rPr lang="en-US">
+              <a:rPr lang="en-US" dirty="0">
                 <a:solidFill>
                   <a:schemeClr val="tx2">
                     <a:lumMod val="75000"/>
@@ -25928,7 +25974,7 @@
           </a:p>
           <a:p>
             <a:r>
-              <a:rPr lang="en-US">
+              <a:rPr lang="en-US" dirty="0">
                 <a:solidFill>
                   <a:schemeClr val="tx2">
                     <a:lumMod val="75000"/>
@@ -25939,7 +25985,7 @@
             </a:r>
           </a:p>
           <a:p>
-            <a:endParaRPr lang="en-US">
+            <a:endParaRPr lang="en-US" dirty="0">
               <a:solidFill>
                 <a:schemeClr val="tx2">
                   <a:lumMod val="75000"/>
@@ -25948,6 +25994,28 @@
             </a:endParaRPr>
           </a:p>
           <a:p>
+            <a:r>
+              <a:rPr lang="en-US" dirty="0">
+                <a:solidFill>
+                  <a:schemeClr val="tx2">
+                    <a:lumMod val="75000"/>
+                  </a:schemeClr>
+                </a:solidFill>
+              </a:rPr>
+              <a:t>Less social stigma because everyone is doing it</a:t>
+            </a:r>
+          </a:p>
+          <a:p>
+            <a:r>
+              <a:rPr lang="en-US" dirty="0">
+                <a:solidFill>
+                  <a:schemeClr val="tx2">
+                    <a:lumMod val="75000"/>
+                  </a:schemeClr>
+                </a:solidFill>
+              </a:rPr>
+              <a:t>Religious organizations were </a:t>
+            </a:r>
             <a:r>
               <a:rPr lang="en-US">
                 <a:solidFill>
@@ -25956,19 +26024,17 @@
                   </a:schemeClr>
                 </a:solidFill>
               </a:rPr>
-              <a:t>Less social stigma because everyone is doing it</a:t>
+              <a:t>once the center </a:t>
             </a:r>
-          </a:p>
-          <a:p>
             <a:r>
-              <a:rPr lang="en-US">
+              <a:rPr lang="en-US" dirty="0">
                 <a:solidFill>
                   <a:schemeClr val="tx2">
                     <a:lumMod val="75000"/>
                   </a:schemeClr>
                 </a:solidFill>
               </a:rPr>
-              <a:t>Religious organizations were once the epicenter of local life</a:t>
+              <a:t>of local life</a:t>
             </a:r>
           </a:p>
         </p:txBody>

</xml_diff>

<commit_message>
trying to fix branches
</commit_message>
<xml_diff>
--- a/Presentation/SocialHub_FrancisT_06_23_2020.pptx
+++ b/Presentation/SocialHub_FrancisT_06_23_2020.pptx
@@ -135,6 +135,7 @@
 <file path=ppt/revisionInfo.xml><?xml version="1.0" encoding="utf-8"?>
 <p1510:revInfo xmlns:a="http://schemas.openxmlformats.org/drawingml/2006/main" xmlns:r="http://schemas.openxmlformats.org/officeDocument/2006/relationships" xmlns:p1510="http://schemas.microsoft.com/office/powerpoint/2015/10/main">
   <p1510:revLst>
+    <p1510:client id="{63F3CF76-1364-475A-823F-3E38657C5F84}" v="2" dt="2020-06-25T20:55:24.299"/>
     <p1510:client id="{E2F6CC62-A8FA-4CA3-B44E-705F9FC4EF55}" v="81" dt="2020-06-26T14:02:27.736"/>
   </p1510:revLst>
 </p1510:revInfo>
@@ -1477,60 +1478,6 @@
     </pc:docChg>
   </pc:docChgLst>
   <pc:docChgLst>
-    <pc:chgData name="Thomas Francis" userId="2e7f689e-290c-4746-ba0f-274b885931e9" providerId="ADAL" clId="{E2F6CC62-A8FA-4CA3-B44E-705F9FC4EF55}"/>
-    <pc:docChg chg="modSld">
-      <pc:chgData name="Thomas Francis" userId="2e7f689e-290c-4746-ba0f-274b885931e9" providerId="ADAL" clId="{E2F6CC62-A8FA-4CA3-B44E-705F9FC4EF55}" dt="2020-07-01T15:09:44.797" v="43" actId="20577"/>
-      <pc:docMkLst>
-        <pc:docMk/>
-      </pc:docMkLst>
-      <pc:sldChg chg="modSp">
-        <pc:chgData name="Thomas Francis" userId="2e7f689e-290c-4746-ba0f-274b885931e9" providerId="ADAL" clId="{E2F6CC62-A8FA-4CA3-B44E-705F9FC4EF55}" dt="2020-07-01T15:09:44.797" v="43" actId="20577"/>
-        <pc:sldMkLst>
-          <pc:docMk/>
-          <pc:sldMk cId="3390689853" sldId="262"/>
-        </pc:sldMkLst>
-        <pc:spChg chg="mod">
-          <ac:chgData name="Thomas Francis" userId="2e7f689e-290c-4746-ba0f-274b885931e9" providerId="ADAL" clId="{E2F6CC62-A8FA-4CA3-B44E-705F9FC4EF55}" dt="2020-07-01T15:09:44.797" v="43" actId="20577"/>
-          <ac:spMkLst>
-            <pc:docMk/>
-            <pc:sldMk cId="3390689853" sldId="262"/>
-            <ac:spMk id="3" creationId="{69F4B873-5DDA-4F2C-8891-E4BC94C1F90B}"/>
-          </ac:spMkLst>
-        </pc:spChg>
-      </pc:sldChg>
-      <pc:sldChg chg="modSp">
-        <pc:chgData name="Thomas Francis" userId="2e7f689e-290c-4746-ba0f-274b885931e9" providerId="ADAL" clId="{E2F6CC62-A8FA-4CA3-B44E-705F9FC4EF55}" dt="2020-07-01T14:21:52.502" v="15" actId="20577"/>
-        <pc:sldMkLst>
-          <pc:docMk/>
-          <pc:sldMk cId="3345576059" sldId="272"/>
-        </pc:sldMkLst>
-        <pc:spChg chg="mod">
-          <ac:chgData name="Thomas Francis" userId="2e7f689e-290c-4746-ba0f-274b885931e9" providerId="ADAL" clId="{E2F6CC62-A8FA-4CA3-B44E-705F9FC4EF55}" dt="2020-07-01T14:21:52.502" v="15" actId="20577"/>
-          <ac:spMkLst>
-            <pc:docMk/>
-            <pc:sldMk cId="3345576059" sldId="272"/>
-            <ac:spMk id="3" creationId="{71DB8266-80FE-4AE4-8A09-30C2E2B143AA}"/>
-          </ac:spMkLst>
-        </pc:spChg>
-      </pc:sldChg>
-      <pc:sldChg chg="modSp">
-        <pc:chgData name="Thomas Francis" userId="2e7f689e-290c-4746-ba0f-274b885931e9" providerId="ADAL" clId="{E2F6CC62-A8FA-4CA3-B44E-705F9FC4EF55}" dt="2020-07-01T14:23:27.798" v="38" actId="15"/>
-        <pc:sldMkLst>
-          <pc:docMk/>
-          <pc:sldMk cId="3166939221" sldId="273"/>
-        </pc:sldMkLst>
-        <pc:spChg chg="mod">
-          <ac:chgData name="Thomas Francis" userId="2e7f689e-290c-4746-ba0f-274b885931e9" providerId="ADAL" clId="{E2F6CC62-A8FA-4CA3-B44E-705F9FC4EF55}" dt="2020-07-01T14:23:27.798" v="38" actId="15"/>
-          <ac:spMkLst>
-            <pc:docMk/>
-            <pc:sldMk cId="3166939221" sldId="273"/>
-            <ac:spMk id="3" creationId="{4EDA088C-672F-4FD5-BCB0-9D0AA8F203F3}"/>
-          </ac:spMkLst>
-        </pc:spChg>
-      </pc:sldChg>
-    </pc:docChg>
-  </pc:docChgLst>
-  <pc:docChgLst>
     <pc:chgData name="Thomas Francis" userId="5c2c6e3652e668e7" providerId="LiveId" clId="{63F3CF76-1364-475A-823F-3E38657C5F84}"/>
     <pc:docChg chg="custSel modSld sldOrd">
       <pc:chgData name="Thomas Francis" userId="5c2c6e3652e668e7" providerId="LiveId" clId="{63F3CF76-1364-475A-823F-3E38657C5F84}" dt="2020-06-25T20:53:56.821" v="184" actId="20577"/>
@@ -1828,7 +1775,7 @@
             <a:fld id="{B61BEF0D-F0BB-DE4B-95CE-6DB70DBA9567}" type="datetimeFigureOut">
               <a:rPr lang="en-US" dirty="0"/>
               <a:pPr/>
-              <a:t>7/1/2020</a:t>
+              <a:t>6/26/2020</a:t>
             </a:fld>
             <a:endParaRPr lang="en-US" dirty="0"/>
           </a:p>
@@ -2163,7 +2110,7 @@
             <a:fld id="{B61BEF0D-F0BB-DE4B-95CE-6DB70DBA9567}" type="datetimeFigureOut">
               <a:rPr lang="en-US" dirty="0"/>
               <a:pPr/>
-              <a:t>7/1/2020</a:t>
+              <a:t>6/26/2020</a:t>
             </a:fld>
             <a:endParaRPr lang="en-US" dirty="0"/>
           </a:p>
@@ -2561,7 +2508,7 @@
             <a:fld id="{B61BEF0D-F0BB-DE4B-95CE-6DB70DBA9567}" type="datetimeFigureOut">
               <a:rPr lang="en-US" dirty="0"/>
               <a:pPr/>
-              <a:t>7/1/2020</a:t>
+              <a:t>6/26/2020</a:t>
             </a:fld>
             <a:endParaRPr lang="en-US" dirty="0"/>
           </a:p>
@@ -2893,7 +2840,7 @@
             <a:fld id="{B61BEF0D-F0BB-DE4B-95CE-6DB70DBA9567}" type="datetimeFigureOut">
               <a:rPr lang="en-US" dirty="0"/>
               <a:pPr/>
-              <a:t>7/1/2020</a:t>
+              <a:t>6/26/2020</a:t>
             </a:fld>
             <a:endParaRPr lang="en-US" dirty="0"/>
           </a:p>
@@ -3210,7 +3157,7 @@
             <a:fld id="{B61BEF0D-F0BB-DE4B-95CE-6DB70DBA9567}" type="datetimeFigureOut">
               <a:rPr lang="en-US" dirty="0"/>
               <a:pPr/>
-              <a:t>7/1/2020</a:t>
+              <a:t>6/26/2020</a:t>
             </a:fld>
             <a:endParaRPr lang="en-US" dirty="0"/>
           </a:p>
@@ -3603,7 +3550,7 @@
             <a:fld id="{B61BEF0D-F0BB-DE4B-95CE-6DB70DBA9567}" type="datetimeFigureOut">
               <a:rPr lang="en-US" dirty="0"/>
               <a:pPr/>
-              <a:t>7/1/2020</a:t>
+              <a:t>6/26/2020</a:t>
             </a:fld>
             <a:endParaRPr lang="en-US" dirty="0"/>
           </a:p>
@@ -3857,7 +3804,7 @@
             <a:fld id="{B61BEF0D-F0BB-DE4B-95CE-6DB70DBA9567}" type="datetimeFigureOut">
               <a:rPr lang="en-US" dirty="0"/>
               <a:pPr/>
-              <a:t>7/1/2020</a:t>
+              <a:t>6/26/2020</a:t>
             </a:fld>
             <a:endParaRPr lang="en-US" dirty="0"/>
           </a:p>
@@ -4116,7 +4063,7 @@
             <a:fld id="{B61BEF0D-F0BB-DE4B-95CE-6DB70DBA9567}" type="datetimeFigureOut">
               <a:rPr lang="en-US" dirty="0"/>
               <a:pPr/>
-              <a:t>7/1/2020</a:t>
+              <a:t>6/26/2020</a:t>
             </a:fld>
             <a:endParaRPr lang="en-US" dirty="0"/>
           </a:p>
@@ -4375,7 +4322,7 @@
             <a:fld id="{B61BEF0D-F0BB-DE4B-95CE-6DB70DBA9567}" type="datetimeFigureOut">
               <a:rPr lang="en-US" dirty="0"/>
               <a:pPr/>
-              <a:t>7/1/2020</a:t>
+              <a:t>6/26/2020</a:t>
             </a:fld>
             <a:endParaRPr lang="en-US" dirty="0"/>
           </a:p>
@@ -4701,7 +4648,7 @@
             <a:fld id="{B61BEF0D-F0BB-DE4B-95CE-6DB70DBA9567}" type="datetimeFigureOut">
               <a:rPr lang="en-US" dirty="0"/>
               <a:pPr/>
-              <a:t>7/1/2020</a:t>
+              <a:t>6/26/2020</a:t>
             </a:fld>
             <a:endParaRPr lang="en-US" dirty="0"/>
           </a:p>
@@ -5021,7 +4968,7 @@
             <a:fld id="{B61BEF0D-F0BB-DE4B-95CE-6DB70DBA9567}" type="datetimeFigureOut">
               <a:rPr lang="en-US" dirty="0"/>
               <a:pPr/>
-              <a:t>7/1/2020</a:t>
+              <a:t>6/26/2020</a:t>
             </a:fld>
             <a:endParaRPr lang="en-US" dirty="0"/>
           </a:p>
@@ -5475,7 +5422,7 @@
             <a:fld id="{B61BEF0D-F0BB-DE4B-95CE-6DB70DBA9567}" type="datetimeFigureOut">
               <a:rPr lang="en-US" dirty="0"/>
               <a:pPr/>
-              <a:t>7/1/2020</a:t>
+              <a:t>6/26/2020</a:t>
             </a:fld>
             <a:endParaRPr lang="en-US" dirty="0"/>
           </a:p>
@@ -5677,7 +5624,7 @@
             <a:fld id="{B61BEF0D-F0BB-DE4B-95CE-6DB70DBA9567}" type="datetimeFigureOut">
               <a:rPr lang="en-US" dirty="0"/>
               <a:pPr/>
-              <a:t>7/1/2020</a:t>
+              <a:t>6/26/2020</a:t>
             </a:fld>
             <a:endParaRPr lang="en-US" dirty="0"/>
           </a:p>
@@ -5851,7 +5798,7 @@
             <a:fld id="{B61BEF0D-F0BB-DE4B-95CE-6DB70DBA9567}" type="datetimeFigureOut">
               <a:rPr lang="en-US" dirty="0"/>
               <a:pPr/>
-              <a:t>7/1/2020</a:t>
+              <a:t>6/26/2020</a:t>
             </a:fld>
             <a:endParaRPr lang="en-US" dirty="0"/>
           </a:p>
@@ -6181,7 +6128,7 @@
             <a:fld id="{B61BEF0D-F0BB-DE4B-95CE-6DB70DBA9567}" type="datetimeFigureOut">
               <a:rPr lang="en-US" dirty="0"/>
               <a:pPr/>
-              <a:t>7/1/2020</a:t>
+              <a:t>6/26/2020</a:t>
             </a:fld>
             <a:endParaRPr lang="en-US" dirty="0"/>
           </a:p>
@@ -6523,7 +6470,7 @@
             <a:fld id="{B61BEF0D-F0BB-DE4B-95CE-6DB70DBA9567}" type="datetimeFigureOut">
               <a:rPr lang="en-US" dirty="0"/>
               <a:pPr/>
-              <a:t>7/1/2020</a:t>
+              <a:t>6/26/2020</a:t>
             </a:fld>
             <a:endParaRPr lang="en-US" dirty="0"/>
           </a:p>
@@ -8637,7 +8584,7 @@
             <a:fld id="{B61BEF0D-F0BB-DE4B-95CE-6DB70DBA9567}" type="datetimeFigureOut">
               <a:rPr lang="en-US" dirty="0"/>
               <a:pPr/>
-              <a:t>7/1/2020</a:t>
+              <a:t>6/26/2020</a:t>
             </a:fld>
             <a:endParaRPr lang="en-US" dirty="0"/>
           </a:p>
@@ -17923,11 +17870,8 @@
                   </a:schemeClr>
                 </a:solidFill>
               </a:rPr>
-              <a:t>Target Demographic:</a:t>
+              <a:t>Target Demographic: </a:t>
             </a:r>
-          </a:p>
-          <a:p>
-            <a:pPr lvl="1"/>
             <a:r>
               <a:rPr lang="en-US" b="1" dirty="0">
                 <a:solidFill>
@@ -17936,10 +17880,20 @@
                   </a:schemeClr>
                 </a:solidFill>
               </a:rPr>
-              <a:t>18-30 year-olds and 50-80 year-olds</a:t>
+              <a:t>18-80 year-olds</a:t>
             </a:r>
           </a:p>
           <a:p>
+            <a:r>
+              <a:rPr lang="en-US">
+                <a:solidFill>
+                  <a:schemeClr val="tx2">
+                    <a:lumMod val="75000"/>
+                  </a:schemeClr>
+                </a:solidFill>
+              </a:rPr>
+              <a:t>Target Demographic size </a:t>
+            </a:r>
             <a:r>
               <a:rPr lang="en-US" dirty="0">
                 <a:solidFill>
@@ -17948,7 +17902,7 @@
                   </a:schemeClr>
                 </a:solidFill>
               </a:rPr>
-              <a:t>Target Demographic size in New Haven County: </a:t>
+              <a:t>in New Haven County: </a:t>
             </a:r>
             <a:r>
               <a:rPr lang="en-US" b="1" dirty="0">
@@ -18113,7 +18067,7 @@
             </a:r>
             <a:r>
               <a:rPr lang="en-US" b="1" dirty="0"/>
-              <a:t>$92,070</a:t>
+              <a:t>$79,400</a:t>
             </a:r>
           </a:p>
           <a:p>
@@ -18123,7 +18077,7 @@
             </a:r>
             <a:r>
               <a:rPr lang="en-US" b="1" dirty="0"/>
-              <a:t>$202,000 </a:t>
+              <a:t>$222,000 </a:t>
             </a:r>
             <a:r>
               <a:rPr lang="en-US" dirty="0"/>
@@ -25950,7 +25904,7 @@
           <a:lstStyle/>
           <a:p>
             <a:r>
-              <a:rPr lang="en-US" dirty="0">
+              <a:rPr lang="en-US">
                 <a:solidFill>
                   <a:schemeClr val="tx2">
                     <a:lumMod val="75000"/>
@@ -25962,7 +25916,7 @@
           </a:p>
           <a:p>
             <a:r>
-              <a:rPr lang="en-US" dirty="0">
+              <a:rPr lang="en-US">
                 <a:solidFill>
                   <a:schemeClr val="tx2">
                     <a:lumMod val="75000"/>
@@ -25974,7 +25928,7 @@
           </a:p>
           <a:p>
             <a:r>
-              <a:rPr lang="en-US" dirty="0">
+              <a:rPr lang="en-US">
                 <a:solidFill>
                   <a:schemeClr val="tx2">
                     <a:lumMod val="75000"/>
@@ -25985,7 +25939,7 @@
             </a:r>
           </a:p>
           <a:p>
-            <a:endParaRPr lang="en-US" dirty="0">
+            <a:endParaRPr lang="en-US">
               <a:solidFill>
                 <a:schemeClr val="tx2">
                   <a:lumMod val="75000"/>
@@ -25995,7 +25949,7 @@
           </a:p>
           <a:p>
             <a:r>
-              <a:rPr lang="en-US" dirty="0">
+              <a:rPr lang="en-US">
                 <a:solidFill>
                   <a:schemeClr val="tx2">
                     <a:lumMod val="75000"/>
@@ -26007,16 +25961,6 @@
           </a:p>
           <a:p>
             <a:r>
-              <a:rPr lang="en-US" dirty="0">
-                <a:solidFill>
-                  <a:schemeClr val="tx2">
-                    <a:lumMod val="75000"/>
-                  </a:schemeClr>
-                </a:solidFill>
-              </a:rPr>
-              <a:t>Religious organizations were </a:t>
-            </a:r>
-            <a:r>
               <a:rPr lang="en-US">
                 <a:solidFill>
                   <a:schemeClr val="tx2">
@@ -26024,17 +25968,7 @@
                   </a:schemeClr>
                 </a:solidFill>
               </a:rPr>
-              <a:t>once the center </a:t>
-            </a:r>
-            <a:r>
-              <a:rPr lang="en-US" dirty="0">
-                <a:solidFill>
-                  <a:schemeClr val="tx2">
-                    <a:lumMod val="75000"/>
-                  </a:schemeClr>
-                </a:solidFill>
-              </a:rPr>
-              <a:t>of local life</a:t>
+              <a:t>Religious organizations were once the epicenter of local life</a:t>
             </a:r>
           </a:p>
         </p:txBody>

</xml_diff>

<commit_message>
before I start working on business registration, I'd like to form a team first. Business registration changes depending on the team.
</commit_message>
<xml_diff>
--- a/Presentation/SocialHub_FrancisT_06_23_2020.pptx
+++ b/Presentation/SocialHub_FrancisT_06_23_2020.pptx
@@ -135,8 +135,7 @@
 <file path=ppt/revisionInfo.xml><?xml version="1.0" encoding="utf-8"?>
 <p1510:revInfo xmlns:a="http://schemas.openxmlformats.org/drawingml/2006/main" xmlns:r="http://schemas.openxmlformats.org/officeDocument/2006/relationships" xmlns:p1510="http://schemas.microsoft.com/office/powerpoint/2015/10/main">
   <p1510:revLst>
-    <p1510:client id="{63F3CF76-1364-475A-823F-3E38657C5F84}" v="2" dt="2020-06-25T20:55:24.299"/>
-    <p1510:client id="{E2F6CC62-A8FA-4CA3-B44E-705F9FC4EF55}" v="81" dt="2020-06-26T14:02:27.736"/>
+    <p1510:client id="{E2F6CC62-A8FA-4CA3-B44E-705F9FC4EF55}" v="82" dt="2020-07-07T13:47:13.480"/>
   </p1510:revLst>
 </p1510:revInfo>
 </file>
@@ -146,7 +145,7 @@
   <pc:docChgLst>
     <pc:chgData name="Francis, Thomas" userId="2e7f689e-290c-4746-ba0f-274b885931e9" providerId="ADAL" clId="{E2F6CC62-A8FA-4CA3-B44E-705F9FC4EF55}"/>
     <pc:docChg chg="undo custSel mod addSld delSld modSld">
-      <pc:chgData name="Francis, Thomas" userId="2e7f689e-290c-4746-ba0f-274b885931e9" providerId="ADAL" clId="{E2F6CC62-A8FA-4CA3-B44E-705F9FC4EF55}" dt="2020-06-26T14:39:48.126" v="7528" actId="20577"/>
+      <pc:chgData name="Francis, Thomas" userId="2e7f689e-290c-4746-ba0f-274b885931e9" providerId="ADAL" clId="{E2F6CC62-A8FA-4CA3-B44E-705F9FC4EF55}" dt="2020-07-07T13:47:44.391" v="7716" actId="1076"/>
       <pc:docMkLst>
         <pc:docMk/>
       </pc:docMkLst>
@@ -417,7 +416,7 @@
         </pc:cxnChg>
       </pc:sldChg>
       <pc:sldChg chg="addSp modSp add mod setBg">
-        <pc:chgData name="Francis, Thomas" userId="2e7f689e-290c-4746-ba0f-274b885931e9" providerId="ADAL" clId="{E2F6CC62-A8FA-4CA3-B44E-705F9FC4EF55}" dt="2020-06-26T14:35:18.500" v="7459" actId="122"/>
+        <pc:chgData name="Francis, Thomas" userId="2e7f689e-290c-4746-ba0f-274b885931e9" providerId="ADAL" clId="{E2F6CC62-A8FA-4CA3-B44E-705F9FC4EF55}" dt="2020-07-07T13:36:34.865" v="7531" actId="20577"/>
         <pc:sldMkLst>
           <pc:docMk/>
           <pc:sldMk cId="3390689853" sldId="262"/>
@@ -431,7 +430,7 @@
           </ac:spMkLst>
         </pc:spChg>
         <pc:spChg chg="mod">
-          <ac:chgData name="Francis, Thomas" userId="2e7f689e-290c-4746-ba0f-274b885931e9" providerId="ADAL" clId="{E2F6CC62-A8FA-4CA3-B44E-705F9FC4EF55}" dt="2020-06-26T14:14:21.062" v="7362" actId="26606"/>
+          <ac:chgData name="Francis, Thomas" userId="2e7f689e-290c-4746-ba0f-274b885931e9" providerId="ADAL" clId="{E2F6CC62-A8FA-4CA3-B44E-705F9FC4EF55}" dt="2020-07-07T13:36:34.865" v="7531" actId="20577"/>
           <ac:spMkLst>
             <pc:docMk/>
             <pc:sldMk cId="3390689853" sldId="262"/>
@@ -918,13 +917,13 @@
         </pc:cxnChg>
       </pc:sldChg>
       <pc:sldChg chg="modSp add">
-        <pc:chgData name="Francis, Thomas" userId="2e7f689e-290c-4746-ba0f-274b885931e9" providerId="ADAL" clId="{E2F6CC62-A8FA-4CA3-B44E-705F9FC4EF55}" dt="2020-06-25T14:57:23.524" v="7006" actId="20577"/>
+        <pc:chgData name="Francis, Thomas" userId="2e7f689e-290c-4746-ba0f-274b885931e9" providerId="ADAL" clId="{E2F6CC62-A8FA-4CA3-B44E-705F9FC4EF55}" dt="2020-07-07T13:44:27.684" v="7703" actId="20577"/>
         <pc:sldMkLst>
           <pc:docMk/>
           <pc:sldMk cId="3345576059" sldId="272"/>
         </pc:sldMkLst>
         <pc:spChg chg="mod">
-          <ac:chgData name="Francis, Thomas" userId="2e7f689e-290c-4746-ba0f-274b885931e9" providerId="ADAL" clId="{E2F6CC62-A8FA-4CA3-B44E-705F9FC4EF55}" dt="2020-06-25T14:57:23.524" v="7006" actId="20577"/>
+          <ac:chgData name="Francis, Thomas" userId="2e7f689e-290c-4746-ba0f-274b885931e9" providerId="ADAL" clId="{E2F6CC62-A8FA-4CA3-B44E-705F9FC4EF55}" dt="2020-07-07T13:44:27.684" v="7703" actId="20577"/>
           <ac:spMkLst>
             <pc:docMk/>
             <pc:sldMk cId="3345576059" sldId="272"/>
@@ -933,7 +932,7 @@
         </pc:spChg>
       </pc:sldChg>
       <pc:sldChg chg="addSp modSp add mod setBg">
-        <pc:chgData name="Francis, Thomas" userId="2e7f689e-290c-4746-ba0f-274b885931e9" providerId="ADAL" clId="{E2F6CC62-A8FA-4CA3-B44E-705F9FC4EF55}" dt="2020-06-26T14:10:22.944" v="7340" actId="20577"/>
+        <pc:chgData name="Francis, Thomas" userId="2e7f689e-290c-4746-ba0f-274b885931e9" providerId="ADAL" clId="{E2F6CC62-A8FA-4CA3-B44E-705F9FC4EF55}" dt="2020-07-07T13:39:34.262" v="7631" actId="20577"/>
         <pc:sldMkLst>
           <pc:docMk/>
           <pc:sldMk cId="3166939221" sldId="273"/>
@@ -947,7 +946,7 @@
           </ac:spMkLst>
         </pc:spChg>
         <pc:spChg chg="mod">
-          <ac:chgData name="Francis, Thomas" userId="2e7f689e-290c-4746-ba0f-274b885931e9" providerId="ADAL" clId="{E2F6CC62-A8FA-4CA3-B44E-705F9FC4EF55}" dt="2020-06-25T14:26:30.736" v="6966" actId="20577"/>
+          <ac:chgData name="Francis, Thomas" userId="2e7f689e-290c-4746-ba0f-274b885931e9" providerId="ADAL" clId="{E2F6CC62-A8FA-4CA3-B44E-705F9FC4EF55}" dt="2020-07-07T13:39:34.262" v="7631" actId="20577"/>
           <ac:spMkLst>
             <pc:docMk/>
             <pc:sldMk cId="3166939221" sldId="273"/>
@@ -1136,7 +1135,7 @@
         </pc:spChg>
       </pc:sldChg>
       <pc:sldChg chg="addSp delSp modSp add mod setBg">
-        <pc:chgData name="Francis, Thomas" userId="2e7f689e-290c-4746-ba0f-274b885931e9" providerId="ADAL" clId="{E2F6CC62-A8FA-4CA3-B44E-705F9FC4EF55}" dt="2020-06-26T14:11:05.567" v="7346" actId="1076"/>
+        <pc:chgData name="Francis, Thomas" userId="2e7f689e-290c-4746-ba0f-274b885931e9" providerId="ADAL" clId="{E2F6CC62-A8FA-4CA3-B44E-705F9FC4EF55}" dt="2020-07-07T13:47:44.391" v="7716" actId="1076"/>
         <pc:sldMkLst>
           <pc:docMk/>
           <pc:sldMk cId="1401021797" sldId="278"/>
@@ -1229,12 +1228,20 @@
             <ac:spMk id="16" creationId="{D49441E5-946F-46B3-BDD2-BAD088532367}"/>
           </ac:spMkLst>
         </pc:spChg>
-        <pc:picChg chg="add mod">
-          <ac:chgData name="Francis, Thomas" userId="2e7f689e-290c-4746-ba0f-274b885931e9" providerId="ADAL" clId="{E2F6CC62-A8FA-4CA3-B44E-705F9FC4EF55}" dt="2020-06-25T13:39:19.332" v="5793" actId="14100"/>
+        <pc:picChg chg="add del mod">
+          <ac:chgData name="Francis, Thomas" userId="2e7f689e-290c-4746-ba0f-274b885931e9" providerId="ADAL" clId="{E2F6CC62-A8FA-4CA3-B44E-705F9FC4EF55}" dt="2020-07-07T13:46:58.315" v="7704" actId="478"/>
           <ac:picMkLst>
             <pc:docMk/>
             <pc:sldMk cId="1401021797" sldId="278"/>
             <ac:picMk id="5" creationId="{573DD099-B936-4870-9CEC-60DACFA5B592}"/>
+          </ac:picMkLst>
+        </pc:picChg>
+        <pc:picChg chg="add mod">
+          <ac:chgData name="Francis, Thomas" userId="2e7f689e-290c-4746-ba0f-274b885931e9" providerId="ADAL" clId="{E2F6CC62-A8FA-4CA3-B44E-705F9FC4EF55}" dt="2020-07-07T13:47:44.391" v="7716" actId="1076"/>
+          <ac:picMkLst>
+            <pc:docMk/>
+            <pc:sldMk cId="1401021797" sldId="278"/>
+            <ac:picMk id="6" creationId="{E27163F9-AE16-4310-AA3F-0731FA78AF3A}"/>
           </ac:picMkLst>
         </pc:picChg>
       </pc:sldChg>
@@ -1775,7 +1782,7 @@
             <a:fld id="{B61BEF0D-F0BB-DE4B-95CE-6DB70DBA9567}" type="datetimeFigureOut">
               <a:rPr lang="en-US" dirty="0"/>
               <a:pPr/>
-              <a:t>6/26/2020</a:t>
+              <a:t>7/7/2020</a:t>
             </a:fld>
             <a:endParaRPr lang="en-US" dirty="0"/>
           </a:p>
@@ -2110,7 +2117,7 @@
             <a:fld id="{B61BEF0D-F0BB-DE4B-95CE-6DB70DBA9567}" type="datetimeFigureOut">
               <a:rPr lang="en-US" dirty="0"/>
               <a:pPr/>
-              <a:t>6/26/2020</a:t>
+              <a:t>7/7/2020</a:t>
             </a:fld>
             <a:endParaRPr lang="en-US" dirty="0"/>
           </a:p>
@@ -2508,7 +2515,7 @@
             <a:fld id="{B61BEF0D-F0BB-DE4B-95CE-6DB70DBA9567}" type="datetimeFigureOut">
               <a:rPr lang="en-US" dirty="0"/>
               <a:pPr/>
-              <a:t>6/26/2020</a:t>
+              <a:t>7/7/2020</a:t>
             </a:fld>
             <a:endParaRPr lang="en-US" dirty="0"/>
           </a:p>
@@ -2840,7 +2847,7 @@
             <a:fld id="{B61BEF0D-F0BB-DE4B-95CE-6DB70DBA9567}" type="datetimeFigureOut">
               <a:rPr lang="en-US" dirty="0"/>
               <a:pPr/>
-              <a:t>6/26/2020</a:t>
+              <a:t>7/7/2020</a:t>
             </a:fld>
             <a:endParaRPr lang="en-US" dirty="0"/>
           </a:p>
@@ -3157,7 +3164,7 @@
             <a:fld id="{B61BEF0D-F0BB-DE4B-95CE-6DB70DBA9567}" type="datetimeFigureOut">
               <a:rPr lang="en-US" dirty="0"/>
               <a:pPr/>
-              <a:t>6/26/2020</a:t>
+              <a:t>7/7/2020</a:t>
             </a:fld>
             <a:endParaRPr lang="en-US" dirty="0"/>
           </a:p>
@@ -3550,7 +3557,7 @@
             <a:fld id="{B61BEF0D-F0BB-DE4B-95CE-6DB70DBA9567}" type="datetimeFigureOut">
               <a:rPr lang="en-US" dirty="0"/>
               <a:pPr/>
-              <a:t>6/26/2020</a:t>
+              <a:t>7/7/2020</a:t>
             </a:fld>
             <a:endParaRPr lang="en-US" dirty="0"/>
           </a:p>
@@ -3804,7 +3811,7 @@
             <a:fld id="{B61BEF0D-F0BB-DE4B-95CE-6DB70DBA9567}" type="datetimeFigureOut">
               <a:rPr lang="en-US" dirty="0"/>
               <a:pPr/>
-              <a:t>6/26/2020</a:t>
+              <a:t>7/7/2020</a:t>
             </a:fld>
             <a:endParaRPr lang="en-US" dirty="0"/>
           </a:p>
@@ -4063,7 +4070,7 @@
             <a:fld id="{B61BEF0D-F0BB-DE4B-95CE-6DB70DBA9567}" type="datetimeFigureOut">
               <a:rPr lang="en-US" dirty="0"/>
               <a:pPr/>
-              <a:t>6/26/2020</a:t>
+              <a:t>7/7/2020</a:t>
             </a:fld>
             <a:endParaRPr lang="en-US" dirty="0"/>
           </a:p>
@@ -4322,7 +4329,7 @@
             <a:fld id="{B61BEF0D-F0BB-DE4B-95CE-6DB70DBA9567}" type="datetimeFigureOut">
               <a:rPr lang="en-US" dirty="0"/>
               <a:pPr/>
-              <a:t>6/26/2020</a:t>
+              <a:t>7/7/2020</a:t>
             </a:fld>
             <a:endParaRPr lang="en-US" dirty="0"/>
           </a:p>
@@ -4648,7 +4655,7 @@
             <a:fld id="{B61BEF0D-F0BB-DE4B-95CE-6DB70DBA9567}" type="datetimeFigureOut">
               <a:rPr lang="en-US" dirty="0"/>
               <a:pPr/>
-              <a:t>6/26/2020</a:t>
+              <a:t>7/7/2020</a:t>
             </a:fld>
             <a:endParaRPr lang="en-US" dirty="0"/>
           </a:p>
@@ -4968,7 +4975,7 @@
             <a:fld id="{B61BEF0D-F0BB-DE4B-95CE-6DB70DBA9567}" type="datetimeFigureOut">
               <a:rPr lang="en-US" dirty="0"/>
               <a:pPr/>
-              <a:t>6/26/2020</a:t>
+              <a:t>7/7/2020</a:t>
             </a:fld>
             <a:endParaRPr lang="en-US" dirty="0"/>
           </a:p>
@@ -5422,7 +5429,7 @@
             <a:fld id="{B61BEF0D-F0BB-DE4B-95CE-6DB70DBA9567}" type="datetimeFigureOut">
               <a:rPr lang="en-US" dirty="0"/>
               <a:pPr/>
-              <a:t>6/26/2020</a:t>
+              <a:t>7/7/2020</a:t>
             </a:fld>
             <a:endParaRPr lang="en-US" dirty="0"/>
           </a:p>
@@ -5624,7 +5631,7 @@
             <a:fld id="{B61BEF0D-F0BB-DE4B-95CE-6DB70DBA9567}" type="datetimeFigureOut">
               <a:rPr lang="en-US" dirty="0"/>
               <a:pPr/>
-              <a:t>6/26/2020</a:t>
+              <a:t>7/7/2020</a:t>
             </a:fld>
             <a:endParaRPr lang="en-US" dirty="0"/>
           </a:p>
@@ -5798,7 +5805,7 @@
             <a:fld id="{B61BEF0D-F0BB-DE4B-95CE-6DB70DBA9567}" type="datetimeFigureOut">
               <a:rPr lang="en-US" dirty="0"/>
               <a:pPr/>
-              <a:t>6/26/2020</a:t>
+              <a:t>7/7/2020</a:t>
             </a:fld>
             <a:endParaRPr lang="en-US" dirty="0"/>
           </a:p>
@@ -6128,7 +6135,7 @@
             <a:fld id="{B61BEF0D-F0BB-DE4B-95CE-6DB70DBA9567}" type="datetimeFigureOut">
               <a:rPr lang="en-US" dirty="0"/>
               <a:pPr/>
-              <a:t>6/26/2020</a:t>
+              <a:t>7/7/2020</a:t>
             </a:fld>
             <a:endParaRPr lang="en-US" dirty="0"/>
           </a:p>
@@ -6470,7 +6477,7 @@
             <a:fld id="{B61BEF0D-F0BB-DE4B-95CE-6DB70DBA9567}" type="datetimeFigureOut">
               <a:rPr lang="en-US" dirty="0"/>
               <a:pPr/>
-              <a:t>6/26/2020</a:t>
+              <a:t>7/7/2020</a:t>
             </a:fld>
             <a:endParaRPr lang="en-US" dirty="0"/>
           </a:p>
@@ -8584,7 +8591,7 @@
             <a:fld id="{B61BEF0D-F0BB-DE4B-95CE-6DB70DBA9567}" type="datetimeFigureOut">
               <a:rPr lang="en-US" dirty="0"/>
               <a:pPr/>
-              <a:t>6/26/2020</a:t>
+              <a:t>7/7/2020</a:t>
             </a:fld>
             <a:endParaRPr lang="en-US" dirty="0"/>
           </a:p>
@@ -17885,15 +17892,43 @@
           </a:p>
           <a:p>
             <a:r>
-              <a:rPr lang="en-US">
+              <a:rPr lang="en-US" dirty="0">
                 <a:solidFill>
                   <a:schemeClr val="tx2">
                     <a:lumMod val="75000"/>
                   </a:schemeClr>
                 </a:solidFill>
               </a:rPr>
-              <a:t>Target Demographic size </a:t>
+              <a:t>Narrowed Target Demographic:</a:t>
             </a:r>
+          </a:p>
+          <a:p>
+            <a:pPr lvl="1"/>
+            <a:r>
+              <a:rPr lang="en-US" b="1" dirty="0">
+                <a:solidFill>
+                  <a:schemeClr val="tx2">
+                    <a:lumMod val="75000"/>
+                  </a:schemeClr>
+                </a:solidFill>
+              </a:rPr>
+              <a:t>18-30 year-olds</a:t>
+            </a:r>
+          </a:p>
+          <a:p>
+            <a:pPr lvl="1"/>
+            <a:r>
+              <a:rPr lang="en-US" b="1" dirty="0">
+                <a:solidFill>
+                  <a:schemeClr val="tx2">
+                    <a:lumMod val="75000"/>
+                  </a:schemeClr>
+                </a:solidFill>
+              </a:rPr>
+              <a:t>50-80 year-olds</a:t>
+            </a:r>
+          </a:p>
+          <a:p>
             <a:r>
               <a:rPr lang="en-US" dirty="0">
                 <a:solidFill>
@@ -17902,7 +17937,7 @@
                   </a:schemeClr>
                 </a:solidFill>
               </a:rPr>
-              <a:t>in New Haven County: </a:t>
+              <a:t>Target Demographic size in New Haven County: </a:t>
             </a:r>
             <a:r>
               <a:rPr lang="en-US" b="1" dirty="0">
@@ -18056,7 +18091,7 @@
             </a:r>
             <a:r>
               <a:rPr lang="en-US" b="1" dirty="0"/>
-              <a:t>$18,500</a:t>
+              <a:t>$30,610</a:t>
             </a:r>
             <a:endParaRPr lang="en-US" dirty="0"/>
           </a:p>
@@ -18067,7 +18102,7 @@
             </a:r>
             <a:r>
               <a:rPr lang="en-US" b="1" dirty="0"/>
-              <a:t>$79,400</a:t>
+              <a:t>$99,650</a:t>
             </a:r>
           </a:p>
           <a:p>
@@ -18077,11 +18112,11 @@
             </a:r>
             <a:r>
               <a:rPr lang="en-US" b="1" dirty="0"/>
-              <a:t>$222,000 </a:t>
+              <a:t>$283,150 </a:t>
             </a:r>
             <a:r>
               <a:rPr lang="en-US" dirty="0"/>
-              <a:t>for the first six months of operation</a:t>
+              <a:t>for the first six months of operation and overhead</a:t>
             </a:r>
             <a:endParaRPr lang="en-US" b="1" dirty="0"/>
           </a:p>
@@ -18092,7 +18127,7 @@
             </a:r>
             <a:r>
               <a:rPr lang="en-US" b="1" dirty="0"/>
-              <a:t>214</a:t>
+              <a:t>355</a:t>
             </a:r>
             <a:r>
               <a:rPr lang="en-US" dirty="0"/>
@@ -18106,7 +18141,7 @@
             </a:r>
             <a:r>
               <a:rPr lang="en-US" b="1" dirty="0"/>
-              <a:t>580</a:t>
+              <a:t>~600</a:t>
             </a:r>
             <a:r>
               <a:rPr lang="en-US" dirty="0"/>
@@ -18560,36 +18595,6 @@
           </a:p>
         </p:txBody>
       </p:sp>
-      <p:pic>
-        <p:nvPicPr>
-          <p:cNvPr id="5" name="Content Placeholder 4" descr="A screenshot of a cell phone&#10;&#10;Description automatically generated">
-            <a:extLst>
-              <a:ext uri="{FF2B5EF4-FFF2-40B4-BE49-F238E27FC236}">
-                <a16:creationId xmlns:a16="http://schemas.microsoft.com/office/drawing/2014/main" id="{573DD099-B936-4870-9CEC-60DACFA5B592}"/>
-              </a:ext>
-            </a:extLst>
-          </p:cNvPr>
-          <p:cNvPicPr>
-            <a:picLocks noChangeAspect="1"/>
-          </p:cNvPicPr>
-          <p:nvPr/>
-        </p:nvPicPr>
-        <p:blipFill>
-          <a:blip r:embed="rId2"/>
-          <a:stretch>
-            <a:fillRect/>
-          </a:stretch>
-        </p:blipFill>
-        <p:spPr>
-          <a:xfrm>
-            <a:off x="2564092" y="2565666"/>
-            <a:ext cx="8979452" cy="2316874"/>
-          </a:xfrm>
-          <a:prstGeom prst="rect">
-            <a:avLst/>
-          </a:prstGeom>
-        </p:spPr>
-      </p:pic>
       <p:sp>
         <p:nvSpPr>
           <p:cNvPr id="11" name="Freeform 12">
@@ -18870,6 +18875,36 @@
           </a:p>
         </p:txBody>
       </p:sp>
+      <p:pic>
+        <p:nvPicPr>
+          <p:cNvPr id="6" name="Picture 5" descr="A screenshot of a cell phone&#10;&#10;Description automatically generated">
+            <a:extLst>
+              <a:ext uri="{FF2B5EF4-FFF2-40B4-BE49-F238E27FC236}">
+                <a16:creationId xmlns:a16="http://schemas.microsoft.com/office/drawing/2014/main" id="{E27163F9-AE16-4310-AA3F-0731FA78AF3A}"/>
+              </a:ext>
+            </a:extLst>
+          </p:cNvPr>
+          <p:cNvPicPr>
+            <a:picLocks noChangeAspect="1"/>
+          </p:cNvPicPr>
+          <p:nvPr/>
+        </p:nvPicPr>
+        <p:blipFill>
+          <a:blip r:embed="rId2"/>
+          <a:stretch>
+            <a:fillRect/>
+          </a:stretch>
+        </p:blipFill>
+        <p:spPr>
+          <a:xfrm>
+            <a:off x="2564092" y="2466952"/>
+            <a:ext cx="8324818" cy="2650398"/>
+          </a:xfrm>
+          <a:prstGeom prst="rect">
+            <a:avLst/>
+          </a:prstGeom>
+        </p:spPr>
+      </p:pic>
     </p:spTree>
     <p:extLst>
       <p:ext uri="{BB962C8B-B14F-4D97-AF65-F5344CB8AC3E}">
@@ -25904,7 +25939,7 @@
           <a:lstStyle/>
           <a:p>
             <a:r>
-              <a:rPr lang="en-US">
+              <a:rPr lang="en-US" dirty="0">
                 <a:solidFill>
                   <a:schemeClr val="tx2">
                     <a:lumMod val="75000"/>
@@ -25916,7 +25951,7 @@
           </a:p>
           <a:p>
             <a:r>
-              <a:rPr lang="en-US">
+              <a:rPr lang="en-US" dirty="0">
                 <a:solidFill>
                   <a:schemeClr val="tx2">
                     <a:lumMod val="75000"/>
@@ -25928,7 +25963,7 @@
           </a:p>
           <a:p>
             <a:r>
-              <a:rPr lang="en-US">
+              <a:rPr lang="en-US" dirty="0">
                 <a:solidFill>
                   <a:schemeClr val="tx2">
                     <a:lumMod val="75000"/>
@@ -25939,7 +25974,7 @@
             </a:r>
           </a:p>
           <a:p>
-            <a:endParaRPr lang="en-US">
+            <a:endParaRPr lang="en-US" dirty="0">
               <a:solidFill>
                 <a:schemeClr val="tx2">
                   <a:lumMod val="75000"/>
@@ -25949,7 +25984,7 @@
           </a:p>
           <a:p>
             <a:r>
-              <a:rPr lang="en-US">
+              <a:rPr lang="en-US" dirty="0">
                 <a:solidFill>
                   <a:schemeClr val="tx2">
                     <a:lumMod val="75000"/>
@@ -25961,14 +25996,14 @@
           </a:p>
           <a:p>
             <a:r>
-              <a:rPr lang="en-US">
+              <a:rPr lang="en-US" dirty="0">
                 <a:solidFill>
                   <a:schemeClr val="tx2">
                     <a:lumMod val="75000"/>
                   </a:schemeClr>
                 </a:solidFill>
               </a:rPr>
-              <a:t>Religious organizations were once the epicenter of local life</a:t>
+              <a:t>Religious organizations were once the center of local life</a:t>
             </a:r>
           </a:p>
         </p:txBody>

</xml_diff>

<commit_message>
deleted financial slides from presentation
</commit_message>
<xml_diff>
--- a/Presentation/SocialHub_FrancisT_06_23_2020.pptx
+++ b/Presentation/SocialHub_FrancisT_06_23_2020.pptx
@@ -23,9 +23,6 @@
     <p:sldId id="270" r:id="rId17"/>
     <p:sldId id="271" r:id="rId18"/>
     <p:sldId id="273" r:id="rId19"/>
-    <p:sldId id="272" r:id="rId20"/>
-    <p:sldId id="278" r:id="rId21"/>
-    <p:sldId id="279" r:id="rId22"/>
   </p:sldIdLst>
   <p:sldSz cx="12192000" cy="6858000"/>
   <p:notesSz cx="6858000" cy="9144000"/>
@@ -130,14 +127,6 @@
     </p:ext>
   </p:extLst>
 </p:presentation>
-</file>
-
-<file path=ppt/revisionInfo.xml><?xml version="1.0" encoding="utf-8"?>
-<p1510:revInfo xmlns:a="http://schemas.openxmlformats.org/drawingml/2006/main" xmlns:r="http://schemas.openxmlformats.org/officeDocument/2006/relationships" xmlns:p1510="http://schemas.microsoft.com/office/powerpoint/2015/10/main">
-  <p1510:revLst>
-    <p1510:client id="{E2F6CC62-A8FA-4CA3-B44E-705F9FC4EF55}" v="82" dt="2020-07-07T13:47:13.480"/>
-  </p1510:revLst>
-</p1510:revInfo>
 </file>
 
 <file path=ppt/changesInfos/changesInfo1.xml><?xml version="1.0" encoding="utf-8"?>
@@ -1485,6 +1474,51 @@
     </pc:docChg>
   </pc:docChgLst>
   <pc:docChgLst>
+    <pc:chgData name="Francis, Thomas" userId="2e7f689e-290c-4746-ba0f-274b885931e9" providerId="ADAL" clId="{42E66BFF-8D15-486F-AC42-6FF4162CF924}"/>
+    <pc:docChg chg="delSld modSld">
+      <pc:chgData name="Francis, Thomas" userId="2e7f689e-290c-4746-ba0f-274b885931e9" providerId="ADAL" clId="{42E66BFF-8D15-486F-AC42-6FF4162CF924}" dt="2020-08-11T15:27:30.148" v="7" actId="404"/>
+      <pc:docMkLst>
+        <pc:docMk/>
+      </pc:docMkLst>
+      <pc:sldChg chg="del">
+        <pc:chgData name="Francis, Thomas" userId="2e7f689e-290c-4746-ba0f-274b885931e9" providerId="ADAL" clId="{42E66BFF-8D15-486F-AC42-6FF4162CF924}" dt="2020-08-11T15:26:29.942" v="2" actId="2696"/>
+        <pc:sldMkLst>
+          <pc:docMk/>
+          <pc:sldMk cId="3345576059" sldId="272"/>
+        </pc:sldMkLst>
+      </pc:sldChg>
+      <pc:sldChg chg="modSp">
+        <pc:chgData name="Francis, Thomas" userId="2e7f689e-290c-4746-ba0f-274b885931e9" providerId="ADAL" clId="{42E66BFF-8D15-486F-AC42-6FF4162CF924}" dt="2020-08-11T15:27:30.148" v="7" actId="404"/>
+        <pc:sldMkLst>
+          <pc:docMk/>
+          <pc:sldMk cId="3166939221" sldId="273"/>
+        </pc:sldMkLst>
+        <pc:spChg chg="mod">
+          <ac:chgData name="Francis, Thomas" userId="2e7f689e-290c-4746-ba0f-274b885931e9" providerId="ADAL" clId="{42E66BFF-8D15-486F-AC42-6FF4162CF924}" dt="2020-08-11T15:27:30.148" v="7" actId="404"/>
+          <ac:spMkLst>
+            <pc:docMk/>
+            <pc:sldMk cId="3166939221" sldId="273"/>
+            <ac:spMk id="3" creationId="{4EDA088C-672F-4FD5-BCB0-9D0AA8F203F3}"/>
+          </ac:spMkLst>
+        </pc:spChg>
+      </pc:sldChg>
+      <pc:sldChg chg="del">
+        <pc:chgData name="Francis, Thomas" userId="2e7f689e-290c-4746-ba0f-274b885931e9" providerId="ADAL" clId="{42E66BFF-8D15-486F-AC42-6FF4162CF924}" dt="2020-08-11T15:26:00.293" v="0" actId="2696"/>
+        <pc:sldMkLst>
+          <pc:docMk/>
+          <pc:sldMk cId="1401021797" sldId="278"/>
+        </pc:sldMkLst>
+      </pc:sldChg>
+      <pc:sldChg chg="del">
+        <pc:chgData name="Francis, Thomas" userId="2e7f689e-290c-4746-ba0f-274b885931e9" providerId="ADAL" clId="{42E66BFF-8D15-486F-AC42-6FF4162CF924}" dt="2020-08-11T15:26:06.077" v="1" actId="2696"/>
+        <pc:sldMkLst>
+          <pc:docMk/>
+          <pc:sldMk cId="4062344240" sldId="279"/>
+        </pc:sldMkLst>
+      </pc:sldChg>
+    </pc:docChg>
+  </pc:docChgLst>
+  <pc:docChgLst>
     <pc:chgData name="Thomas Francis" userId="5c2c6e3652e668e7" providerId="LiveId" clId="{63F3CF76-1364-475A-823F-3E38657C5F84}"/>
     <pc:docChg chg="custSel modSld sldOrd">
       <pc:chgData name="Thomas Francis" userId="5c2c6e3652e668e7" providerId="LiveId" clId="{63F3CF76-1364-475A-823F-3E38657C5F84}" dt="2020-06-25T20:53:56.821" v="184" actId="20577"/>
@@ -1782,7 +1816,7 @@
             <a:fld id="{B61BEF0D-F0BB-DE4B-95CE-6DB70DBA9567}" type="datetimeFigureOut">
               <a:rPr lang="en-US" dirty="0"/>
               <a:pPr/>
-              <a:t>7/7/2020</a:t>
+              <a:t>8/11/2020</a:t>
             </a:fld>
             <a:endParaRPr lang="en-US" dirty="0"/>
           </a:p>
@@ -2117,7 +2151,7 @@
             <a:fld id="{B61BEF0D-F0BB-DE4B-95CE-6DB70DBA9567}" type="datetimeFigureOut">
               <a:rPr lang="en-US" dirty="0"/>
               <a:pPr/>
-              <a:t>7/7/2020</a:t>
+              <a:t>8/11/2020</a:t>
             </a:fld>
             <a:endParaRPr lang="en-US" dirty="0"/>
           </a:p>
@@ -2515,7 +2549,7 @@
             <a:fld id="{B61BEF0D-F0BB-DE4B-95CE-6DB70DBA9567}" type="datetimeFigureOut">
               <a:rPr lang="en-US" dirty="0"/>
               <a:pPr/>
-              <a:t>7/7/2020</a:t>
+              <a:t>8/11/2020</a:t>
             </a:fld>
             <a:endParaRPr lang="en-US" dirty="0"/>
           </a:p>
@@ -2847,7 +2881,7 @@
             <a:fld id="{B61BEF0D-F0BB-DE4B-95CE-6DB70DBA9567}" type="datetimeFigureOut">
               <a:rPr lang="en-US" dirty="0"/>
               <a:pPr/>
-              <a:t>7/7/2020</a:t>
+              <a:t>8/11/2020</a:t>
             </a:fld>
             <a:endParaRPr lang="en-US" dirty="0"/>
           </a:p>
@@ -3164,7 +3198,7 @@
             <a:fld id="{B61BEF0D-F0BB-DE4B-95CE-6DB70DBA9567}" type="datetimeFigureOut">
               <a:rPr lang="en-US" dirty="0"/>
               <a:pPr/>
-              <a:t>7/7/2020</a:t>
+              <a:t>8/11/2020</a:t>
             </a:fld>
             <a:endParaRPr lang="en-US" dirty="0"/>
           </a:p>
@@ -3557,7 +3591,7 @@
             <a:fld id="{B61BEF0D-F0BB-DE4B-95CE-6DB70DBA9567}" type="datetimeFigureOut">
               <a:rPr lang="en-US" dirty="0"/>
               <a:pPr/>
-              <a:t>7/7/2020</a:t>
+              <a:t>8/11/2020</a:t>
             </a:fld>
             <a:endParaRPr lang="en-US" dirty="0"/>
           </a:p>
@@ -3811,7 +3845,7 @@
             <a:fld id="{B61BEF0D-F0BB-DE4B-95CE-6DB70DBA9567}" type="datetimeFigureOut">
               <a:rPr lang="en-US" dirty="0"/>
               <a:pPr/>
-              <a:t>7/7/2020</a:t>
+              <a:t>8/11/2020</a:t>
             </a:fld>
             <a:endParaRPr lang="en-US" dirty="0"/>
           </a:p>
@@ -4070,7 +4104,7 @@
             <a:fld id="{B61BEF0D-F0BB-DE4B-95CE-6DB70DBA9567}" type="datetimeFigureOut">
               <a:rPr lang="en-US" dirty="0"/>
               <a:pPr/>
-              <a:t>7/7/2020</a:t>
+              <a:t>8/11/2020</a:t>
             </a:fld>
             <a:endParaRPr lang="en-US" dirty="0"/>
           </a:p>
@@ -4329,7 +4363,7 @@
             <a:fld id="{B61BEF0D-F0BB-DE4B-95CE-6DB70DBA9567}" type="datetimeFigureOut">
               <a:rPr lang="en-US" dirty="0"/>
               <a:pPr/>
-              <a:t>7/7/2020</a:t>
+              <a:t>8/11/2020</a:t>
             </a:fld>
             <a:endParaRPr lang="en-US" dirty="0"/>
           </a:p>
@@ -4655,7 +4689,7 @@
             <a:fld id="{B61BEF0D-F0BB-DE4B-95CE-6DB70DBA9567}" type="datetimeFigureOut">
               <a:rPr lang="en-US" dirty="0"/>
               <a:pPr/>
-              <a:t>7/7/2020</a:t>
+              <a:t>8/11/2020</a:t>
             </a:fld>
             <a:endParaRPr lang="en-US" dirty="0"/>
           </a:p>
@@ -4975,7 +5009,7 @@
             <a:fld id="{B61BEF0D-F0BB-DE4B-95CE-6DB70DBA9567}" type="datetimeFigureOut">
               <a:rPr lang="en-US" dirty="0"/>
               <a:pPr/>
-              <a:t>7/7/2020</a:t>
+              <a:t>8/11/2020</a:t>
             </a:fld>
             <a:endParaRPr lang="en-US" dirty="0"/>
           </a:p>
@@ -5429,7 +5463,7 @@
             <a:fld id="{B61BEF0D-F0BB-DE4B-95CE-6DB70DBA9567}" type="datetimeFigureOut">
               <a:rPr lang="en-US" dirty="0"/>
               <a:pPr/>
-              <a:t>7/7/2020</a:t>
+              <a:t>8/11/2020</a:t>
             </a:fld>
             <a:endParaRPr lang="en-US" dirty="0"/>
           </a:p>
@@ -5631,7 +5665,7 @@
             <a:fld id="{B61BEF0D-F0BB-DE4B-95CE-6DB70DBA9567}" type="datetimeFigureOut">
               <a:rPr lang="en-US" dirty="0"/>
               <a:pPr/>
-              <a:t>7/7/2020</a:t>
+              <a:t>8/11/2020</a:t>
             </a:fld>
             <a:endParaRPr lang="en-US" dirty="0"/>
           </a:p>
@@ -5805,7 +5839,7 @@
             <a:fld id="{B61BEF0D-F0BB-DE4B-95CE-6DB70DBA9567}" type="datetimeFigureOut">
               <a:rPr lang="en-US" dirty="0"/>
               <a:pPr/>
-              <a:t>7/7/2020</a:t>
+              <a:t>8/11/2020</a:t>
             </a:fld>
             <a:endParaRPr lang="en-US" dirty="0"/>
           </a:p>
@@ -6135,7 +6169,7 @@
             <a:fld id="{B61BEF0D-F0BB-DE4B-95CE-6DB70DBA9567}" type="datetimeFigureOut">
               <a:rPr lang="en-US" dirty="0"/>
               <a:pPr/>
-              <a:t>7/7/2020</a:t>
+              <a:t>8/11/2020</a:t>
             </a:fld>
             <a:endParaRPr lang="en-US" dirty="0"/>
           </a:p>
@@ -6477,7 +6511,7 @@
             <a:fld id="{B61BEF0D-F0BB-DE4B-95CE-6DB70DBA9567}" type="datetimeFigureOut">
               <a:rPr lang="en-US" dirty="0"/>
               <a:pPr/>
-              <a:t>7/7/2020</a:t>
+              <a:t>8/11/2020</a:t>
             </a:fld>
             <a:endParaRPr lang="en-US" dirty="0"/>
           </a:p>
@@ -8591,7 +8625,7 @@
             <a:fld id="{B61BEF0D-F0BB-DE4B-95CE-6DB70DBA9567}" type="datetimeFigureOut">
               <a:rPr lang="en-US" dirty="0"/>
               <a:pPr/>
-              <a:t>7/7/2020</a:t>
+              <a:t>8/11/2020</a:t>
             </a:fld>
             <a:endParaRPr lang="en-US" dirty="0"/>
           </a:p>
@@ -17870,7 +17904,7 @@
           <a:lstStyle/>
           <a:p>
             <a:r>
-              <a:rPr lang="en-US" dirty="0">
+              <a:rPr lang="en-US" sz="2400" dirty="0">
                 <a:solidFill>
                   <a:schemeClr val="tx2">
                     <a:lumMod val="75000"/>
@@ -17880,7 +17914,7 @@
               <a:t>Target Demographic: </a:t>
             </a:r>
             <a:r>
-              <a:rPr lang="en-US" b="1" dirty="0">
+              <a:rPr lang="en-US" sz="2400" b="1" dirty="0">
                 <a:solidFill>
                   <a:schemeClr val="tx2">
                     <a:lumMod val="75000"/>
@@ -17892,7 +17926,7 @@
           </a:p>
           <a:p>
             <a:r>
-              <a:rPr lang="en-US" dirty="0">
+              <a:rPr lang="en-US" sz="2400" dirty="0">
                 <a:solidFill>
                   <a:schemeClr val="tx2">
                     <a:lumMod val="75000"/>
@@ -17905,7 +17939,7 @@
           <a:p>
             <a:pPr lvl="1"/>
             <a:r>
-              <a:rPr lang="en-US" b="1" dirty="0">
+              <a:rPr lang="en-US" sz="2000" b="1" dirty="0">
                 <a:solidFill>
                   <a:schemeClr val="tx2">
                     <a:lumMod val="75000"/>
@@ -17918,7 +17952,7 @@
           <a:p>
             <a:pPr lvl="1"/>
             <a:r>
-              <a:rPr lang="en-US" b="1" dirty="0">
+              <a:rPr lang="en-US" sz="2000" b="1" dirty="0">
                 <a:solidFill>
                   <a:schemeClr val="tx2">
                     <a:lumMod val="75000"/>
@@ -17930,7 +17964,7 @@
           </a:p>
           <a:p>
             <a:r>
-              <a:rPr lang="en-US" dirty="0">
+              <a:rPr lang="en-US" sz="2400" dirty="0">
                 <a:solidFill>
                   <a:schemeClr val="tx2">
                     <a:lumMod val="75000"/>
@@ -17940,7 +17974,7 @@
               <a:t>Target Demographic size in New Haven County: </a:t>
             </a:r>
             <a:r>
-              <a:rPr lang="en-US" b="1" dirty="0">
+              <a:rPr lang="en-US" sz="2400" b="1" dirty="0">
                 <a:solidFill>
                   <a:schemeClr val="tx2">
                     <a:lumMod val="75000"/>
@@ -17950,7 +17984,7 @@
               <a:t>~620,000 </a:t>
             </a:r>
             <a:r>
-              <a:rPr lang="en-US" dirty="0">
+              <a:rPr lang="en-US" sz="2400" dirty="0">
                 <a:solidFill>
                   <a:schemeClr val="tx2">
                     <a:lumMod val="75000"/>
@@ -17960,200 +17994,12 @@
               <a:t>people</a:t>
             </a:r>
           </a:p>
-          <a:p>
-            <a:r>
-              <a:rPr lang="en-US" dirty="0">
-                <a:solidFill>
-                  <a:schemeClr val="tx2">
-                    <a:lumMod val="75000"/>
-                  </a:schemeClr>
-                </a:solidFill>
-              </a:rPr>
-              <a:t>Percent of people needed to break even: </a:t>
-            </a:r>
-            <a:r>
-              <a:rPr lang="en-US" b="1" dirty="0">
-                <a:solidFill>
-                  <a:schemeClr val="tx2">
-                    <a:lumMod val="75000"/>
-                  </a:schemeClr>
-                </a:solidFill>
-              </a:rPr>
-              <a:t>0.035%</a:t>
-            </a:r>
-          </a:p>
-          <a:p>
-            <a:r>
-              <a:rPr lang="en-US" dirty="0">
-                <a:solidFill>
-                  <a:schemeClr val="tx2">
-                    <a:lumMod val="75000"/>
-                  </a:schemeClr>
-                </a:solidFill>
-              </a:rPr>
-              <a:t>Percent of people needed to reach max capacity: </a:t>
-            </a:r>
-            <a:r>
-              <a:rPr lang="en-US" b="1" dirty="0">
-                <a:solidFill>
-                  <a:schemeClr val="tx2">
-                    <a:lumMod val="75000"/>
-                  </a:schemeClr>
-                </a:solidFill>
-              </a:rPr>
-              <a:t>0.098%</a:t>
-            </a:r>
-          </a:p>
         </p:txBody>
       </p:sp>
     </p:spTree>
     <p:extLst>
       <p:ext uri="{BB962C8B-B14F-4D97-AF65-F5344CB8AC3E}">
         <p14:creationId xmlns:p14="http://schemas.microsoft.com/office/powerpoint/2010/main" val="3166939221"/>
-      </p:ext>
-    </p:extLst>
-  </p:cSld>
-  <p:clrMapOvr>
-    <a:masterClrMapping/>
-  </p:clrMapOvr>
-</p:sld>
-</file>
-
-<file path=ppt/slides/slide19.xml><?xml version="1.0" encoding="utf-8"?>
-<p:sld xmlns:a="http://schemas.openxmlformats.org/drawingml/2006/main" xmlns:r="http://schemas.openxmlformats.org/officeDocument/2006/relationships" xmlns:p="http://schemas.openxmlformats.org/presentationml/2006/main">
-  <p:cSld>
-    <p:spTree>
-      <p:nvGrpSpPr>
-        <p:cNvPr id="1" name=""/>
-        <p:cNvGrpSpPr/>
-        <p:nvPr/>
-      </p:nvGrpSpPr>
-      <p:grpSpPr>
-        <a:xfrm>
-          <a:off x="0" y="0"/>
-          <a:ext cx="0" cy="0"/>
-          <a:chOff x="0" y="0"/>
-          <a:chExt cx="0" cy="0"/>
-        </a:xfrm>
-      </p:grpSpPr>
-      <p:sp>
-        <p:nvSpPr>
-          <p:cNvPr id="2" name="Title 1">
-            <a:extLst>
-              <a:ext uri="{FF2B5EF4-FFF2-40B4-BE49-F238E27FC236}">
-                <a16:creationId xmlns:a16="http://schemas.microsoft.com/office/drawing/2014/main" id="{EF0FDFBD-C4F8-4F2B-B418-027C2D9234B8}"/>
-              </a:ext>
-            </a:extLst>
-          </p:cNvPr>
-          <p:cNvSpPr>
-            <a:spLocks noGrp="1"/>
-          </p:cNvSpPr>
-          <p:nvPr>
-            <p:ph type="title"/>
-          </p:nvPr>
-        </p:nvSpPr>
-        <p:spPr/>
-        <p:txBody>
-          <a:bodyPr/>
-          <a:lstStyle/>
-          <a:p>
-            <a:r>
-              <a:rPr lang="en-US" dirty="0"/>
-              <a:t>Finances</a:t>
-            </a:r>
-          </a:p>
-        </p:txBody>
-      </p:sp>
-      <p:sp>
-        <p:nvSpPr>
-          <p:cNvPr id="3" name="Content Placeholder 2">
-            <a:extLst>
-              <a:ext uri="{FF2B5EF4-FFF2-40B4-BE49-F238E27FC236}">
-                <a16:creationId xmlns:a16="http://schemas.microsoft.com/office/drawing/2014/main" id="{71DB8266-80FE-4AE4-8A09-30C2E2B143AA}"/>
-              </a:ext>
-            </a:extLst>
-          </p:cNvPr>
-          <p:cNvSpPr>
-            <a:spLocks noGrp="1"/>
-          </p:cNvSpPr>
-          <p:nvPr>
-            <p:ph idx="1"/>
-          </p:nvPr>
-        </p:nvSpPr>
-        <p:spPr/>
-        <p:txBody>
-          <a:bodyPr/>
-          <a:lstStyle/>
-          <a:p>
-            <a:r>
-              <a:rPr lang="en-US" dirty="0"/>
-              <a:t>Monthly operating costs: </a:t>
-            </a:r>
-            <a:r>
-              <a:rPr lang="en-US" b="1" dirty="0"/>
-              <a:t>$30,610</a:t>
-            </a:r>
-            <a:endParaRPr lang="en-US" dirty="0"/>
-          </a:p>
-          <a:p>
-            <a:r>
-              <a:rPr lang="en-US" dirty="0"/>
-              <a:t>Overhead: </a:t>
-            </a:r>
-            <a:r>
-              <a:rPr lang="en-US" b="1" dirty="0"/>
-              <a:t>$99,650</a:t>
-            </a:r>
-          </a:p>
-          <a:p>
-            <a:r>
-              <a:rPr lang="en-US" dirty="0"/>
-              <a:t>Funding estimate total: </a:t>
-            </a:r>
-            <a:r>
-              <a:rPr lang="en-US" b="1" dirty="0"/>
-              <a:t>$283,150 </a:t>
-            </a:r>
-            <a:r>
-              <a:rPr lang="en-US" dirty="0"/>
-              <a:t>for the first six months of operation and overhead</a:t>
-            </a:r>
-            <a:endParaRPr lang="en-US" b="1" dirty="0"/>
-          </a:p>
-          <a:p>
-            <a:r>
-              <a:rPr lang="en-US" dirty="0"/>
-              <a:t>Break-even point: an engaged community of </a:t>
-            </a:r>
-            <a:r>
-              <a:rPr lang="en-US" b="1" dirty="0"/>
-              <a:t>355</a:t>
-            </a:r>
-            <a:r>
-              <a:rPr lang="en-US" dirty="0"/>
-              <a:t> people</a:t>
-            </a:r>
-          </a:p>
-          <a:p>
-            <a:r>
-              <a:rPr lang="en-US" dirty="0"/>
-              <a:t>Max community engagement capacity: </a:t>
-            </a:r>
-            <a:r>
-              <a:rPr lang="en-US" b="1" dirty="0"/>
-              <a:t>~600</a:t>
-            </a:r>
-            <a:r>
-              <a:rPr lang="en-US" dirty="0"/>
-              <a:t> people</a:t>
-            </a:r>
-          </a:p>
-        </p:txBody>
-      </p:sp>
-    </p:spTree>
-    <p:extLst>
-      <p:ext uri="{BB962C8B-B14F-4D97-AF65-F5344CB8AC3E}">
-        <p14:creationId xmlns:p14="http://schemas.microsoft.com/office/powerpoint/2010/main" val="3345576059"/>
       </p:ext>
     </p:extLst>
   </p:cSld>
@@ -18335,1389 +18181,6 @@
     <p:extLst>
       <p:ext uri="{BB962C8B-B14F-4D97-AF65-F5344CB8AC3E}">
         <p14:creationId xmlns:p14="http://schemas.microsoft.com/office/powerpoint/2010/main" val="2261067227"/>
-      </p:ext>
-    </p:extLst>
-  </p:cSld>
-  <p:clrMapOvr>
-    <a:masterClrMapping/>
-  </p:clrMapOvr>
-</p:sld>
-</file>
-
-<file path=ppt/slides/slide20.xml><?xml version="1.0" encoding="utf-8"?>
-<p:sld xmlns:a="http://schemas.openxmlformats.org/drawingml/2006/main" xmlns:r="http://schemas.openxmlformats.org/officeDocument/2006/relationships" xmlns:p="http://schemas.openxmlformats.org/presentationml/2006/main">
-  <p:cSld>
-    <p:bg>
-      <p:bgPr>
-        <a:gradFill rotWithShape="1">
-          <a:gsLst>
-            <a:gs pos="0">
-              <a:schemeClr val="bg2">
-                <a:tint val="90000"/>
-                <a:satMod val="92000"/>
-                <a:lumMod val="120000"/>
-              </a:schemeClr>
-            </a:gs>
-            <a:gs pos="100000">
-              <a:schemeClr val="bg2">
-                <a:shade val="98000"/>
-                <a:satMod val="120000"/>
-                <a:lumMod val="98000"/>
-              </a:schemeClr>
-            </a:gs>
-          </a:gsLst>
-          <a:path path="circle">
-            <a:fillToRect l="50000" t="50000" r="100000" b="100000"/>
-          </a:path>
-        </a:gradFill>
-        <a:effectLst/>
-      </p:bgPr>
-    </p:bg>
-    <p:spTree>
-      <p:nvGrpSpPr>
-        <p:cNvPr id="1" name=""/>
-        <p:cNvGrpSpPr/>
-        <p:nvPr/>
-      </p:nvGrpSpPr>
-      <p:grpSpPr>
-        <a:xfrm>
-          <a:off x="0" y="0"/>
-          <a:ext cx="0" cy="0"/>
-          <a:chOff x="0" y="0"/>
-          <a:chExt cx="0" cy="0"/>
-        </a:xfrm>
-      </p:grpSpPr>
-      <p:sp useBgFill="1">
-        <p:nvSpPr>
-          <p:cNvPr id="7" name="Rectangle 11">
-            <a:extLst>
-              <a:ext uri="{FF2B5EF4-FFF2-40B4-BE49-F238E27FC236}">
-                <a16:creationId xmlns:a16="http://schemas.microsoft.com/office/drawing/2014/main" id="{3419E28B-721B-4D0D-A1D3-78EAC57253AF}"/>
-              </a:ext>
-              <a:ext uri="{C183D7F6-B498-43B3-948B-1728B52AA6E4}">
-                <adec:decorative xmlns:adec="http://schemas.microsoft.com/office/drawing/2017/decorative" val="1"/>
-              </a:ext>
-            </a:extLst>
-          </p:cNvPr>
-          <p:cNvSpPr>
-            <a:spLocks noGrp="1" noRot="1" noChangeAspect="1" noMove="1" noResize="1" noEditPoints="1" noAdjustHandles="1" noChangeArrowheads="1" noChangeShapeType="1" noTextEdit="1"/>
-          </p:cNvSpPr>
-          <p:nvPr>
-            <p:extLst>
-              <p:ext uri="{386F3935-93C4-4BCD-93E2-E3B085C9AB24}">
-                <p16:designElem xmlns:p16="http://schemas.microsoft.com/office/powerpoint/2015/main" val="1"/>
-              </p:ext>
-            </p:extLst>
-          </p:nvPr>
-        </p:nvSpPr>
-        <p:spPr>
-          <a:xfrm>
-            <a:off x="0" y="-786"/>
-            <a:ext cx="12192000" cy="6854038"/>
-          </a:xfrm>
-          <a:prstGeom prst="rect">
-            <a:avLst/>
-          </a:prstGeom>
-          <a:ln>
-            <a:noFill/>
-          </a:ln>
-        </p:spPr>
-        <p:style>
-          <a:lnRef idx="2">
-            <a:schemeClr val="accent1">
-              <a:shade val="50000"/>
-            </a:schemeClr>
-          </a:lnRef>
-          <a:fillRef idx="1">
-            <a:schemeClr val="accent1"/>
-          </a:fillRef>
-          <a:effectRef idx="0">
-            <a:schemeClr val="accent1"/>
-          </a:effectRef>
-          <a:fontRef idx="minor">
-            <a:schemeClr val="lt1"/>
-          </a:fontRef>
-        </p:style>
-        <p:txBody>
-          <a:bodyPr rtlCol="0" anchor="ctr"/>
-          <a:lstStyle/>
-          <a:p>
-            <a:pPr algn="ctr"/>
-            <a:endParaRPr lang="en-US"/>
-          </a:p>
-        </p:txBody>
-      </p:sp>
-      <p:sp>
-        <p:nvSpPr>
-          <p:cNvPr id="2" name="Title 1">
-            <a:extLst>
-              <a:ext uri="{FF2B5EF4-FFF2-40B4-BE49-F238E27FC236}">
-                <a16:creationId xmlns:a16="http://schemas.microsoft.com/office/drawing/2014/main" id="{955A6AF0-FBBF-4B43-8C54-F118A1CF8DAB}"/>
-              </a:ext>
-            </a:extLst>
-          </p:cNvPr>
-          <p:cNvSpPr>
-            <a:spLocks noGrp="1"/>
-          </p:cNvSpPr>
-          <p:nvPr>
-            <p:ph type="title"/>
-          </p:nvPr>
-        </p:nvSpPr>
-        <p:spPr>
-          <a:xfrm>
-            <a:off x="649224" y="645106"/>
-            <a:ext cx="5122652" cy="1259894"/>
-          </a:xfrm>
-        </p:spPr>
-        <p:txBody>
-          <a:bodyPr>
-            <a:normAutofit/>
-          </a:bodyPr>
-          <a:lstStyle/>
-          <a:p>
-            <a:r>
-              <a:rPr lang="en-US" dirty="0"/>
-              <a:t>Profit Projections</a:t>
-            </a:r>
-          </a:p>
-        </p:txBody>
-      </p:sp>
-      <p:sp>
-        <p:nvSpPr>
-          <p:cNvPr id="8" name="Rectangle 13">
-            <a:extLst>
-              <a:ext uri="{FF2B5EF4-FFF2-40B4-BE49-F238E27FC236}">
-                <a16:creationId xmlns:a16="http://schemas.microsoft.com/office/drawing/2014/main" id="{359E45B9-0D24-465E-84AD-FEDBA836B569}"/>
-              </a:ext>
-              <a:ext uri="{C183D7F6-B498-43B3-948B-1728B52AA6E4}">
-                <adec:decorative xmlns:adec="http://schemas.microsoft.com/office/drawing/2017/decorative" val="1"/>
-              </a:ext>
-            </a:extLst>
-          </p:cNvPr>
-          <p:cNvSpPr>
-            <a:spLocks noGrp="1" noRot="1" noChangeAspect="1" noMove="1" noResize="1" noEditPoints="1" noAdjustHandles="1" noChangeArrowheads="1" noChangeShapeType="1" noTextEdit="1"/>
-          </p:cNvSpPr>
-          <p:nvPr>
-            <p:extLst>
-              <p:ext uri="{386F3935-93C4-4BCD-93E2-E3B085C9AB24}">
-                <p16:designElem xmlns:p16="http://schemas.microsoft.com/office/powerpoint/2015/main" val="1"/>
-              </p:ext>
-            </p:extLst>
-          </p:nvPr>
-        </p:nvSpPr>
-        <p:spPr>
-          <a:xfrm>
-            <a:off x="0" y="0"/>
-            <a:ext cx="182880" cy="6858000"/>
-          </a:xfrm>
-          <a:prstGeom prst="rect">
-            <a:avLst/>
-          </a:prstGeom>
-          <a:solidFill>
-            <a:schemeClr val="tx2"/>
-          </a:solidFill>
-          <a:ln>
-            <a:noFill/>
-          </a:ln>
-          <a:effectLst/>
-        </p:spPr>
-        <p:style>
-          <a:lnRef idx="1">
-            <a:schemeClr val="accent1"/>
-          </a:lnRef>
-          <a:fillRef idx="3">
-            <a:schemeClr val="accent1"/>
-          </a:fillRef>
-          <a:effectRef idx="2">
-            <a:schemeClr val="accent1"/>
-          </a:effectRef>
-          <a:fontRef idx="minor">
-            <a:schemeClr val="lt1"/>
-          </a:fontRef>
-        </p:style>
-      </p:sp>
-      <p:sp>
-        <p:nvSpPr>
-          <p:cNvPr id="10" name="Content Placeholder 8">
-            <a:extLst>
-              <a:ext uri="{FF2B5EF4-FFF2-40B4-BE49-F238E27FC236}">
-                <a16:creationId xmlns:a16="http://schemas.microsoft.com/office/drawing/2014/main" id="{C961D741-D118-4749-A01B-E7B7353BA15A}"/>
-              </a:ext>
-            </a:extLst>
-          </p:cNvPr>
-          <p:cNvSpPr>
-            <a:spLocks noGrp="1"/>
-          </p:cNvSpPr>
-          <p:nvPr>
-            <p:ph idx="1"/>
-          </p:nvPr>
-        </p:nvSpPr>
-        <p:spPr>
-          <a:xfrm>
-            <a:off x="725864" y="2103485"/>
-            <a:ext cx="1838228" cy="3759253"/>
-          </a:xfrm>
-        </p:spPr>
-        <p:txBody>
-          <a:bodyPr>
-            <a:normAutofit/>
-          </a:bodyPr>
-          <a:lstStyle/>
-          <a:p>
-            <a:endParaRPr lang="en-US" dirty="0"/>
-          </a:p>
-          <a:p>
-            <a:endParaRPr lang="en-US" dirty="0"/>
-          </a:p>
-          <a:p>
-            <a:r>
-              <a:rPr lang="en-US" dirty="0"/>
-              <a:t>Community</a:t>
-            </a:r>
-          </a:p>
-          <a:p>
-            <a:r>
-              <a:rPr lang="en-US" dirty="0"/>
-              <a:t>Gross</a:t>
-            </a:r>
-          </a:p>
-          <a:p>
-            <a:endParaRPr lang="en-US" dirty="0"/>
-          </a:p>
-          <a:p>
-            <a:endParaRPr lang="en-US" dirty="0"/>
-          </a:p>
-          <a:p>
-            <a:r>
-              <a:rPr lang="en-US" dirty="0"/>
-              <a:t>Profit</a:t>
-            </a:r>
-          </a:p>
-        </p:txBody>
-      </p:sp>
-      <p:sp>
-        <p:nvSpPr>
-          <p:cNvPr id="11" name="Freeform 12">
-            <a:extLst>
-              <a:ext uri="{FF2B5EF4-FFF2-40B4-BE49-F238E27FC236}">
-                <a16:creationId xmlns:a16="http://schemas.microsoft.com/office/drawing/2014/main" id="{1F36A2FB-17CD-4DA6-9D8A-BFD6ADF6A321}"/>
-              </a:ext>
-              <a:ext uri="{C183D7F6-B498-43B3-948B-1728B52AA6E4}">
-                <adec:decorative xmlns:adec="http://schemas.microsoft.com/office/drawing/2017/decorative" val="1"/>
-              </a:ext>
-            </a:extLst>
-          </p:cNvPr>
-          <p:cNvSpPr>
-            <a:spLocks noGrp="1" noRot="1" noChangeAspect="1" noMove="1" noResize="1" noEditPoints="1" noAdjustHandles="1" noChangeArrowheads="1" noChangeShapeType="1" noTextEdit="1"/>
-          </p:cNvSpPr>
-          <p:nvPr>
-            <p:extLst>
-              <p:ext uri="{386F3935-93C4-4BCD-93E2-E3B085C9AB24}">
-                <p16:designElem xmlns:p16="http://schemas.microsoft.com/office/powerpoint/2015/main" val="1"/>
-              </p:ext>
-            </p:extLst>
-          </p:nvPr>
-        </p:nvSpPr>
-        <p:spPr>
-          <a:xfrm>
-            <a:off x="-1" y="6061223"/>
-            <a:ext cx="1038036" cy="506277"/>
-          </a:xfrm>
-          <a:custGeom>
-            <a:avLst/>
-            <a:gdLst>
-              <a:gd name="connsiteX0" fmla="*/ 0 w 1038036"/>
-              <a:gd name="connsiteY0" fmla="*/ 0 h 506277"/>
-              <a:gd name="connsiteX1" fmla="*/ 182880 w 1038036"/>
-              <a:gd name="connsiteY1" fmla="*/ 0 h 506277"/>
-              <a:gd name="connsiteX2" fmla="*/ 291705 w 1038036"/>
-              <a:gd name="connsiteY2" fmla="*/ 0 h 506277"/>
-              <a:gd name="connsiteX3" fmla="*/ 291705 w 1038036"/>
-              <a:gd name="connsiteY3" fmla="*/ 151 h 506277"/>
-              <a:gd name="connsiteX4" fmla="*/ 692049 w 1038036"/>
-              <a:gd name="connsiteY4" fmla="*/ 705 h 506277"/>
-              <a:gd name="connsiteX5" fmla="*/ 782744 w 1038036"/>
-              <a:gd name="connsiteY5" fmla="*/ 705 h 506277"/>
-              <a:gd name="connsiteX6" fmla="*/ 797001 w 1038036"/>
-              <a:gd name="connsiteY6" fmla="*/ 5473 h 506277"/>
-              <a:gd name="connsiteX7" fmla="*/ 801982 w 1038036"/>
-              <a:gd name="connsiteY7" fmla="*/ 10242 h 506277"/>
-              <a:gd name="connsiteX8" fmla="*/ 1030951 w 1038036"/>
-              <a:gd name="connsiteY8" fmla="*/ 239185 h 506277"/>
-              <a:gd name="connsiteX9" fmla="*/ 1030951 w 1038036"/>
-              <a:gd name="connsiteY9" fmla="*/ 267797 h 506277"/>
-              <a:gd name="connsiteX10" fmla="*/ 801982 w 1038036"/>
-              <a:gd name="connsiteY10" fmla="*/ 496740 h 506277"/>
-              <a:gd name="connsiteX11" fmla="*/ 797001 w 1038036"/>
-              <a:gd name="connsiteY11" fmla="*/ 501508 h 506277"/>
-              <a:gd name="connsiteX12" fmla="*/ 782744 w 1038036"/>
-              <a:gd name="connsiteY12" fmla="*/ 506277 h 506277"/>
-              <a:gd name="connsiteX13" fmla="*/ 692049 w 1038036"/>
-              <a:gd name="connsiteY13" fmla="*/ 506277 h 506277"/>
-              <a:gd name="connsiteX14" fmla="*/ 291705 w 1038036"/>
-              <a:gd name="connsiteY14" fmla="*/ 505140 h 506277"/>
-              <a:gd name="connsiteX15" fmla="*/ 291705 w 1038036"/>
-              <a:gd name="connsiteY15" fmla="*/ 506277 h 506277"/>
-              <a:gd name="connsiteX16" fmla="*/ 0 w 1038036"/>
-              <a:gd name="connsiteY16" fmla="*/ 506277 h 506277"/>
-            </a:gdLst>
-            <a:ahLst/>
-            <a:cxnLst>
-              <a:cxn ang="0">
-                <a:pos x="connsiteX0" y="connsiteY0"/>
-              </a:cxn>
-              <a:cxn ang="0">
-                <a:pos x="connsiteX1" y="connsiteY1"/>
-              </a:cxn>
-              <a:cxn ang="0">
-                <a:pos x="connsiteX2" y="connsiteY2"/>
-              </a:cxn>
-              <a:cxn ang="0">
-                <a:pos x="connsiteX3" y="connsiteY3"/>
-              </a:cxn>
-              <a:cxn ang="0">
-                <a:pos x="connsiteX4" y="connsiteY4"/>
-              </a:cxn>
-              <a:cxn ang="0">
-                <a:pos x="connsiteX5" y="connsiteY5"/>
-              </a:cxn>
-              <a:cxn ang="0">
-                <a:pos x="connsiteX6" y="connsiteY6"/>
-              </a:cxn>
-              <a:cxn ang="0">
-                <a:pos x="connsiteX7" y="connsiteY7"/>
-              </a:cxn>
-              <a:cxn ang="0">
-                <a:pos x="connsiteX8" y="connsiteY8"/>
-              </a:cxn>
-              <a:cxn ang="0">
-                <a:pos x="connsiteX9" y="connsiteY9"/>
-              </a:cxn>
-              <a:cxn ang="0">
-                <a:pos x="connsiteX10" y="connsiteY10"/>
-              </a:cxn>
-              <a:cxn ang="0">
-                <a:pos x="connsiteX11" y="connsiteY11"/>
-              </a:cxn>
-              <a:cxn ang="0">
-                <a:pos x="connsiteX12" y="connsiteY12"/>
-              </a:cxn>
-              <a:cxn ang="0">
-                <a:pos x="connsiteX13" y="connsiteY13"/>
-              </a:cxn>
-              <a:cxn ang="0">
-                <a:pos x="connsiteX14" y="connsiteY14"/>
-              </a:cxn>
-              <a:cxn ang="0">
-                <a:pos x="connsiteX15" y="connsiteY15"/>
-              </a:cxn>
-              <a:cxn ang="0">
-                <a:pos x="connsiteX16" y="connsiteY16"/>
-              </a:cxn>
-            </a:cxnLst>
-            <a:rect l="l" t="t" r="r" b="b"/>
-            <a:pathLst>
-              <a:path w="1038036" h="506277">
-                <a:moveTo>
-                  <a:pt x="0" y="0"/>
-                </a:moveTo>
-                <a:lnTo>
-                  <a:pt x="182880" y="0"/>
-                </a:lnTo>
-                <a:lnTo>
-                  <a:pt x="291705" y="0"/>
-                </a:lnTo>
-                <a:lnTo>
-                  <a:pt x="291705" y="151"/>
-                </a:lnTo>
-                <a:lnTo>
-                  <a:pt x="692049" y="705"/>
-                </a:lnTo>
-                <a:lnTo>
-                  <a:pt x="782744" y="705"/>
-                </a:lnTo>
-                <a:cubicBezTo>
-                  <a:pt x="787553" y="705"/>
-                  <a:pt x="792363" y="5473"/>
-                  <a:pt x="797001" y="5473"/>
-                </a:cubicBezTo>
-                <a:cubicBezTo>
-                  <a:pt x="797001" y="10242"/>
-                  <a:pt x="801982" y="10242"/>
-                  <a:pt x="801982" y="10242"/>
-                </a:cubicBezTo>
-                <a:lnTo>
-                  <a:pt x="1030951" y="239185"/>
-                </a:lnTo>
-                <a:cubicBezTo>
-                  <a:pt x="1040398" y="248722"/>
-                  <a:pt x="1040398" y="258259"/>
-                  <a:pt x="1030951" y="267797"/>
-                </a:cubicBezTo>
-                <a:lnTo>
-                  <a:pt x="801982" y="496740"/>
-                </a:lnTo>
-                <a:cubicBezTo>
-                  <a:pt x="800436" y="498363"/>
-                  <a:pt x="798547" y="499885"/>
-                  <a:pt x="797001" y="501508"/>
-                </a:cubicBezTo>
-                <a:cubicBezTo>
-                  <a:pt x="792363" y="506277"/>
-                  <a:pt x="787553" y="506277"/>
-                  <a:pt x="782744" y="506277"/>
-                </a:cubicBezTo>
-                <a:lnTo>
-                  <a:pt x="692049" y="506277"/>
-                </a:lnTo>
-                <a:lnTo>
-                  <a:pt x="291705" y="505140"/>
-                </a:lnTo>
-                <a:lnTo>
-                  <a:pt x="291705" y="506277"/>
-                </a:lnTo>
-                <a:lnTo>
-                  <a:pt x="0" y="506277"/>
-                </a:lnTo>
-                <a:close/>
-              </a:path>
-            </a:pathLst>
-          </a:custGeom>
-          <a:ln>
-            <a:noFill/>
-          </a:ln>
-        </p:spPr>
-        <p:style>
-          <a:lnRef idx="2">
-            <a:schemeClr val="accent1">
-              <a:shade val="50000"/>
-            </a:schemeClr>
-          </a:lnRef>
-          <a:fillRef idx="1">
-            <a:schemeClr val="accent1"/>
-          </a:fillRef>
-          <a:effectRef idx="0">
-            <a:schemeClr val="accent1"/>
-          </a:effectRef>
-          <a:fontRef idx="minor">
-            <a:schemeClr val="lt1"/>
-          </a:fontRef>
-        </p:style>
-        <p:txBody>
-          <a:bodyPr rtlCol="0" anchor="ctr"/>
-          <a:lstStyle/>
-          <a:p>
-            <a:pPr algn="ctr"/>
-            <a:endParaRPr lang="en-US"/>
-          </a:p>
-        </p:txBody>
-      </p:sp>
-      <p:sp>
-        <p:nvSpPr>
-          <p:cNvPr id="3" name="TextBox 2">
-            <a:extLst>
-              <a:ext uri="{FF2B5EF4-FFF2-40B4-BE49-F238E27FC236}">
-                <a16:creationId xmlns:a16="http://schemas.microsoft.com/office/drawing/2014/main" id="{B122CE73-AA67-4C5F-8470-CC8DDE0B17F9}"/>
-              </a:ext>
-            </a:extLst>
-          </p:cNvPr>
-          <p:cNvSpPr txBox="1"/>
-          <p:nvPr/>
-        </p:nvSpPr>
-        <p:spPr>
-          <a:xfrm>
-            <a:off x="725864" y="1333734"/>
-            <a:ext cx="7843706" cy="1200329"/>
-          </a:xfrm>
-          <a:prstGeom prst="rect">
-            <a:avLst/>
-          </a:prstGeom>
-          <a:noFill/>
-        </p:spPr>
-        <p:txBody>
-          <a:bodyPr wrap="square" rtlCol="0">
-            <a:spAutoFit/>
-          </a:bodyPr>
-          <a:lstStyle/>
-          <a:p>
-            <a:r>
-              <a:rPr lang="en-US" dirty="0"/>
-              <a:t>Membership fee: </a:t>
-            </a:r>
-            <a:r>
-              <a:rPr lang="en-US" b="1" dirty="0"/>
-              <a:t>$40 per month</a:t>
-            </a:r>
-          </a:p>
-          <a:p>
-            <a:r>
-              <a:rPr lang="en-US" dirty="0"/>
-              <a:t>Weekday Entry fee: </a:t>
-            </a:r>
-            <a:r>
-              <a:rPr lang="en-US" b="1" dirty="0"/>
-              <a:t>$10</a:t>
-            </a:r>
-          </a:p>
-          <a:p>
-            <a:r>
-              <a:rPr lang="en-US" dirty="0"/>
-              <a:t>Weekend Entry fee: </a:t>
-            </a:r>
-            <a:r>
-              <a:rPr lang="en-US" b="1" dirty="0"/>
-              <a:t>$20</a:t>
-            </a:r>
-            <a:endParaRPr lang="en-US" dirty="0"/>
-          </a:p>
-          <a:p>
-            <a:endParaRPr lang="en-US" dirty="0"/>
-          </a:p>
-        </p:txBody>
-      </p:sp>
-      <p:pic>
-        <p:nvPicPr>
-          <p:cNvPr id="6" name="Picture 5" descr="A screenshot of a cell phone&#10;&#10;Description automatically generated">
-            <a:extLst>
-              <a:ext uri="{FF2B5EF4-FFF2-40B4-BE49-F238E27FC236}">
-                <a16:creationId xmlns:a16="http://schemas.microsoft.com/office/drawing/2014/main" id="{E27163F9-AE16-4310-AA3F-0731FA78AF3A}"/>
-              </a:ext>
-            </a:extLst>
-          </p:cNvPr>
-          <p:cNvPicPr>
-            <a:picLocks noChangeAspect="1"/>
-          </p:cNvPicPr>
-          <p:nvPr/>
-        </p:nvPicPr>
-        <p:blipFill>
-          <a:blip r:embed="rId2"/>
-          <a:stretch>
-            <a:fillRect/>
-          </a:stretch>
-        </p:blipFill>
-        <p:spPr>
-          <a:xfrm>
-            <a:off x="2564092" y="2466952"/>
-            <a:ext cx="8324818" cy="2650398"/>
-          </a:xfrm>
-          <a:prstGeom prst="rect">
-            <a:avLst/>
-          </a:prstGeom>
-        </p:spPr>
-      </p:pic>
-    </p:spTree>
-    <p:extLst>
-      <p:ext uri="{BB962C8B-B14F-4D97-AF65-F5344CB8AC3E}">
-        <p14:creationId xmlns:p14="http://schemas.microsoft.com/office/powerpoint/2010/main" val="1401021797"/>
-      </p:ext>
-    </p:extLst>
-  </p:cSld>
-  <p:clrMapOvr>
-    <a:masterClrMapping/>
-  </p:clrMapOvr>
-</p:sld>
-</file>
-
-<file path=ppt/slides/slide21.xml><?xml version="1.0" encoding="utf-8"?>
-<p:sld xmlns:a="http://schemas.openxmlformats.org/drawingml/2006/main" xmlns:r="http://schemas.openxmlformats.org/officeDocument/2006/relationships" xmlns:p="http://schemas.openxmlformats.org/presentationml/2006/main">
-  <p:cSld>
-    <p:spTree>
-      <p:nvGrpSpPr>
-        <p:cNvPr id="1" name=""/>
-        <p:cNvGrpSpPr/>
-        <p:nvPr/>
-      </p:nvGrpSpPr>
-      <p:grpSpPr>
-        <a:xfrm>
-          <a:off x="0" y="0"/>
-          <a:ext cx="0" cy="0"/>
-          <a:chOff x="0" y="0"/>
-          <a:chExt cx="0" cy="0"/>
-        </a:xfrm>
-      </p:grpSpPr>
-      <p:sp>
-        <p:nvSpPr>
-          <p:cNvPr id="2" name="Title 1">
-            <a:extLst>
-              <a:ext uri="{FF2B5EF4-FFF2-40B4-BE49-F238E27FC236}">
-                <a16:creationId xmlns:a16="http://schemas.microsoft.com/office/drawing/2014/main" id="{2662D9AB-F2DB-46A7-9EFA-7C00249E6180}"/>
-              </a:ext>
-            </a:extLst>
-          </p:cNvPr>
-          <p:cNvSpPr>
-            <a:spLocks noGrp="1"/>
-          </p:cNvSpPr>
-          <p:nvPr>
-            <p:ph type="title"/>
-          </p:nvPr>
-        </p:nvSpPr>
-        <p:spPr/>
-        <p:txBody>
-          <a:bodyPr/>
-          <a:lstStyle/>
-          <a:p>
-            <a:r>
-              <a:rPr lang="en-US" dirty="0"/>
-              <a:t>Formula for Community Breakdown</a:t>
-            </a:r>
-          </a:p>
-        </p:txBody>
-      </p:sp>
-      <p:sp>
-        <p:nvSpPr>
-          <p:cNvPr id="3" name="Content Placeholder 2">
-            <a:extLst>
-              <a:ext uri="{FF2B5EF4-FFF2-40B4-BE49-F238E27FC236}">
-                <a16:creationId xmlns:a16="http://schemas.microsoft.com/office/drawing/2014/main" id="{770313A2-0A4C-4259-8D0B-3EFF9C904EC7}"/>
-              </a:ext>
-            </a:extLst>
-          </p:cNvPr>
-          <p:cNvSpPr>
-            <a:spLocks noGrp="1"/>
-          </p:cNvSpPr>
-          <p:nvPr>
-            <p:ph idx="1"/>
-          </p:nvPr>
-        </p:nvSpPr>
-        <p:spPr>
-          <a:xfrm>
-            <a:off x="1137037" y="1540189"/>
-            <a:ext cx="10820800" cy="3777622"/>
-          </a:xfrm>
-        </p:spPr>
-        <p:txBody>
-          <a:bodyPr/>
-          <a:lstStyle/>
-          <a:p>
-            <a:pPr marL="0" indent="0">
-              <a:buNone/>
-            </a:pPr>
-            <a:r>
-              <a:rPr lang="en-US" dirty="0"/>
-              <a:t>                              80%                                     20%                        = 100% of total Community</a:t>
-            </a:r>
-          </a:p>
-          <a:p>
-            <a:pPr marL="0" indent="0">
-              <a:buNone/>
-            </a:pPr>
-            <a:endParaRPr lang="en-US" dirty="0"/>
-          </a:p>
-          <a:p>
-            <a:pPr marL="0" indent="0">
-              <a:buNone/>
-            </a:pPr>
-            <a:r>
-              <a:rPr lang="en-US" dirty="0"/>
-              <a:t>            (Weekday + Weekend)         +      Members</a:t>
-            </a:r>
-          </a:p>
-          <a:p>
-            <a:pPr marL="0" indent="0">
-              <a:buNone/>
-            </a:pPr>
-            <a:endParaRPr lang="en-US" dirty="0"/>
-          </a:p>
-          <a:p>
-            <a:pPr marL="0" indent="0">
-              <a:buNone/>
-            </a:pPr>
-            <a:r>
-              <a:rPr lang="en-US" dirty="0"/>
-              <a:t>              80%    20%     80%    20%               80%     20%</a:t>
-            </a:r>
-          </a:p>
-          <a:p>
-            <a:pPr marL="0" indent="0">
-              <a:buNone/>
-            </a:pPr>
-            <a:endParaRPr lang="en-US" dirty="0"/>
-          </a:p>
-          <a:p>
-            <a:pPr marL="0" indent="0">
-              <a:buNone/>
-            </a:pPr>
-            <a:endParaRPr lang="en-US" dirty="0"/>
-          </a:p>
-          <a:p>
-            <a:pPr marL="0" indent="0">
-              <a:buNone/>
-            </a:pPr>
-            <a:r>
-              <a:rPr lang="en-US" dirty="0"/>
-              <a:t>             (2)        (3)      (1)        (2)                (3)        (5)    </a:t>
-            </a:r>
-          </a:p>
-          <a:p>
-            <a:pPr marL="0" indent="0">
-              <a:buNone/>
-            </a:pPr>
-            <a:endParaRPr lang="en-US" dirty="0"/>
-          </a:p>
-        </p:txBody>
-      </p:sp>
-      <p:cxnSp>
-        <p:nvCxnSpPr>
-          <p:cNvPr id="5" name="Straight Arrow Connector 4">
-            <a:extLst>
-              <a:ext uri="{FF2B5EF4-FFF2-40B4-BE49-F238E27FC236}">
-                <a16:creationId xmlns:a16="http://schemas.microsoft.com/office/drawing/2014/main" id="{26147EEF-2B16-4F62-8A6C-0736B9987F81}"/>
-              </a:ext>
-            </a:extLst>
-          </p:cNvPr>
-          <p:cNvCxnSpPr>
-            <a:cxnSpLocks/>
-          </p:cNvCxnSpPr>
-          <p:nvPr/>
-        </p:nvCxnSpPr>
-        <p:spPr>
-          <a:xfrm flipH="1">
-            <a:off x="3288484" y="1905000"/>
-            <a:ext cx="1" cy="477473"/>
-          </a:xfrm>
-          <a:prstGeom prst="straightConnector1">
-            <a:avLst/>
-          </a:prstGeom>
-          <a:ln>
-            <a:tailEnd type="triangle"/>
-          </a:ln>
-        </p:spPr>
-        <p:style>
-          <a:lnRef idx="1">
-            <a:schemeClr val="accent1"/>
-          </a:lnRef>
-          <a:fillRef idx="0">
-            <a:schemeClr val="accent1"/>
-          </a:fillRef>
-          <a:effectRef idx="0">
-            <a:schemeClr val="accent1"/>
-          </a:effectRef>
-          <a:fontRef idx="minor">
-            <a:schemeClr val="tx1"/>
-          </a:fontRef>
-        </p:style>
-      </p:cxnSp>
-      <p:cxnSp>
-        <p:nvCxnSpPr>
-          <p:cNvPr id="8" name="Straight Arrow Connector 7">
-            <a:extLst>
-              <a:ext uri="{FF2B5EF4-FFF2-40B4-BE49-F238E27FC236}">
-                <a16:creationId xmlns:a16="http://schemas.microsoft.com/office/drawing/2014/main" id="{8D76AB83-AB2E-4872-8D73-D2FAB019C222}"/>
-              </a:ext>
-            </a:extLst>
-          </p:cNvPr>
-          <p:cNvCxnSpPr/>
-          <p:nvPr/>
-        </p:nvCxnSpPr>
-        <p:spPr>
-          <a:xfrm flipH="1">
-            <a:off x="2399978" y="2711742"/>
-            <a:ext cx="192947" cy="469084"/>
-          </a:xfrm>
-          <a:prstGeom prst="straightConnector1">
-            <a:avLst/>
-          </a:prstGeom>
-          <a:ln>
-            <a:tailEnd type="triangle"/>
-          </a:ln>
-        </p:spPr>
-        <p:style>
-          <a:lnRef idx="1">
-            <a:schemeClr val="accent1"/>
-          </a:lnRef>
-          <a:fillRef idx="0">
-            <a:schemeClr val="accent1"/>
-          </a:fillRef>
-          <a:effectRef idx="0">
-            <a:schemeClr val="accent1"/>
-          </a:effectRef>
-          <a:fontRef idx="minor">
-            <a:schemeClr val="tx1"/>
-          </a:fontRef>
-        </p:style>
-      </p:cxnSp>
-      <p:cxnSp>
-        <p:nvCxnSpPr>
-          <p:cNvPr id="9" name="Straight Arrow Connector 8">
-            <a:extLst>
-              <a:ext uri="{FF2B5EF4-FFF2-40B4-BE49-F238E27FC236}">
-                <a16:creationId xmlns:a16="http://schemas.microsoft.com/office/drawing/2014/main" id="{B0AC10AB-F001-41AE-A99D-20A85D8584FA}"/>
-              </a:ext>
-            </a:extLst>
-          </p:cNvPr>
-          <p:cNvCxnSpPr/>
-          <p:nvPr/>
-        </p:nvCxnSpPr>
-        <p:spPr>
-          <a:xfrm flipH="1">
-            <a:off x="3759392" y="2750081"/>
-            <a:ext cx="192947" cy="469084"/>
-          </a:xfrm>
-          <a:prstGeom prst="straightConnector1">
-            <a:avLst/>
-          </a:prstGeom>
-          <a:ln>
-            <a:tailEnd type="triangle"/>
-          </a:ln>
-        </p:spPr>
-        <p:style>
-          <a:lnRef idx="1">
-            <a:schemeClr val="accent1"/>
-          </a:lnRef>
-          <a:fillRef idx="0">
-            <a:schemeClr val="accent1"/>
-          </a:fillRef>
-          <a:effectRef idx="0">
-            <a:schemeClr val="accent1"/>
-          </a:effectRef>
-          <a:fontRef idx="minor">
-            <a:schemeClr val="tx1"/>
-          </a:fontRef>
-        </p:style>
-      </p:cxnSp>
-      <p:cxnSp>
-        <p:nvCxnSpPr>
-          <p:cNvPr id="10" name="Straight Arrow Connector 9">
-            <a:extLst>
-              <a:ext uri="{FF2B5EF4-FFF2-40B4-BE49-F238E27FC236}">
-                <a16:creationId xmlns:a16="http://schemas.microsoft.com/office/drawing/2014/main" id="{8917B651-8A04-44F1-B26A-D9D3B786A815}"/>
-              </a:ext>
-            </a:extLst>
-          </p:cNvPr>
-          <p:cNvCxnSpPr/>
-          <p:nvPr/>
-        </p:nvCxnSpPr>
-        <p:spPr>
-          <a:xfrm flipH="1">
-            <a:off x="5773024" y="2754864"/>
-            <a:ext cx="192947" cy="469084"/>
-          </a:xfrm>
-          <a:prstGeom prst="straightConnector1">
-            <a:avLst/>
-          </a:prstGeom>
-          <a:ln>
-            <a:tailEnd type="triangle"/>
-          </a:ln>
-        </p:spPr>
-        <p:style>
-          <a:lnRef idx="1">
-            <a:schemeClr val="accent1"/>
-          </a:lnRef>
-          <a:fillRef idx="0">
-            <a:schemeClr val="accent1"/>
-          </a:fillRef>
-          <a:effectRef idx="0">
-            <a:schemeClr val="accent1"/>
-          </a:effectRef>
-          <a:fontRef idx="minor">
-            <a:schemeClr val="tx1"/>
-          </a:fontRef>
-        </p:style>
-      </p:cxnSp>
-      <p:cxnSp>
-        <p:nvCxnSpPr>
-          <p:cNvPr id="12" name="Straight Arrow Connector 11">
-            <a:extLst>
-              <a:ext uri="{FF2B5EF4-FFF2-40B4-BE49-F238E27FC236}">
-                <a16:creationId xmlns:a16="http://schemas.microsoft.com/office/drawing/2014/main" id="{F817CD03-05E0-4181-B43D-5CAE7456285F}"/>
-              </a:ext>
-            </a:extLst>
-          </p:cNvPr>
-          <p:cNvCxnSpPr>
-            <a:cxnSpLocks/>
-          </p:cNvCxnSpPr>
-          <p:nvPr/>
-        </p:nvCxnSpPr>
-        <p:spPr>
-          <a:xfrm flipH="1">
-            <a:off x="6095999" y="1905000"/>
-            <a:ext cx="1" cy="477473"/>
-          </a:xfrm>
-          <a:prstGeom prst="straightConnector1">
-            <a:avLst/>
-          </a:prstGeom>
-          <a:ln>
-            <a:tailEnd type="triangle"/>
-          </a:ln>
-        </p:spPr>
-        <p:style>
-          <a:lnRef idx="1">
-            <a:schemeClr val="accent1"/>
-          </a:lnRef>
-          <a:fillRef idx="0">
-            <a:schemeClr val="accent1"/>
-          </a:fillRef>
-          <a:effectRef idx="0">
-            <a:schemeClr val="accent1"/>
-          </a:effectRef>
-          <a:fontRef idx="minor">
-            <a:schemeClr val="tx1"/>
-          </a:fontRef>
-        </p:style>
-      </p:cxnSp>
-      <p:cxnSp>
-        <p:nvCxnSpPr>
-          <p:cNvPr id="14" name="Straight Arrow Connector 13">
-            <a:extLst>
-              <a:ext uri="{FF2B5EF4-FFF2-40B4-BE49-F238E27FC236}">
-                <a16:creationId xmlns:a16="http://schemas.microsoft.com/office/drawing/2014/main" id="{BB168110-7D2B-49E3-A07C-F9CA71F3D922}"/>
-              </a:ext>
-            </a:extLst>
-          </p:cNvPr>
-          <p:cNvCxnSpPr/>
-          <p:nvPr/>
-        </p:nvCxnSpPr>
-        <p:spPr>
-          <a:xfrm>
-            <a:off x="2784925" y="2711742"/>
-            <a:ext cx="201556" cy="469084"/>
-          </a:xfrm>
-          <a:prstGeom prst="straightConnector1">
-            <a:avLst/>
-          </a:prstGeom>
-          <a:ln>
-            <a:tailEnd type="triangle"/>
-          </a:ln>
-        </p:spPr>
-        <p:style>
-          <a:lnRef idx="1">
-            <a:schemeClr val="accent1"/>
-          </a:lnRef>
-          <a:fillRef idx="0">
-            <a:schemeClr val="accent1"/>
-          </a:fillRef>
-          <a:effectRef idx="0">
-            <a:schemeClr val="accent1"/>
-          </a:effectRef>
-          <a:fontRef idx="minor">
-            <a:schemeClr val="tx1"/>
-          </a:fontRef>
-        </p:style>
-      </p:cxnSp>
-      <p:cxnSp>
-        <p:nvCxnSpPr>
-          <p:cNvPr id="15" name="Straight Arrow Connector 14">
-            <a:extLst>
-              <a:ext uri="{FF2B5EF4-FFF2-40B4-BE49-F238E27FC236}">
-                <a16:creationId xmlns:a16="http://schemas.microsoft.com/office/drawing/2014/main" id="{ED309313-AABF-4E7E-B3F4-39BA910B47E2}"/>
-              </a:ext>
-            </a:extLst>
-          </p:cNvPr>
-          <p:cNvCxnSpPr/>
-          <p:nvPr/>
-        </p:nvCxnSpPr>
-        <p:spPr>
-          <a:xfrm>
-            <a:off x="4152948" y="2750081"/>
-            <a:ext cx="201556" cy="469084"/>
-          </a:xfrm>
-          <a:prstGeom prst="straightConnector1">
-            <a:avLst/>
-          </a:prstGeom>
-          <a:ln>
-            <a:tailEnd type="triangle"/>
-          </a:ln>
-        </p:spPr>
-        <p:style>
-          <a:lnRef idx="1">
-            <a:schemeClr val="accent1"/>
-          </a:lnRef>
-          <a:fillRef idx="0">
-            <a:schemeClr val="accent1"/>
-          </a:fillRef>
-          <a:effectRef idx="0">
-            <a:schemeClr val="accent1"/>
-          </a:effectRef>
-          <a:fontRef idx="minor">
-            <a:schemeClr val="tx1"/>
-          </a:fontRef>
-        </p:style>
-      </p:cxnSp>
-      <p:cxnSp>
-        <p:nvCxnSpPr>
-          <p:cNvPr id="16" name="Straight Arrow Connector 15">
-            <a:extLst>
-              <a:ext uri="{FF2B5EF4-FFF2-40B4-BE49-F238E27FC236}">
-                <a16:creationId xmlns:a16="http://schemas.microsoft.com/office/drawing/2014/main" id="{6E3B9402-5654-437C-9B10-2C382E6AEC45}"/>
-              </a:ext>
-            </a:extLst>
-          </p:cNvPr>
-          <p:cNvCxnSpPr/>
-          <p:nvPr/>
-        </p:nvCxnSpPr>
-        <p:spPr>
-          <a:xfrm>
-            <a:off x="6293813" y="2750081"/>
-            <a:ext cx="201556" cy="469084"/>
-          </a:xfrm>
-          <a:prstGeom prst="straightConnector1">
-            <a:avLst/>
-          </a:prstGeom>
-          <a:ln>
-            <a:tailEnd type="triangle"/>
-          </a:ln>
-        </p:spPr>
-        <p:style>
-          <a:lnRef idx="1">
-            <a:schemeClr val="accent1"/>
-          </a:lnRef>
-          <a:fillRef idx="0">
-            <a:schemeClr val="accent1"/>
-          </a:fillRef>
-          <a:effectRef idx="0">
-            <a:schemeClr val="accent1"/>
-          </a:effectRef>
-          <a:fontRef idx="minor">
-            <a:schemeClr val="tx1"/>
-          </a:fontRef>
-        </p:style>
-      </p:cxnSp>
-      <p:cxnSp>
-        <p:nvCxnSpPr>
-          <p:cNvPr id="18" name="Straight Connector 17">
-            <a:extLst>
-              <a:ext uri="{FF2B5EF4-FFF2-40B4-BE49-F238E27FC236}">
-                <a16:creationId xmlns:a16="http://schemas.microsoft.com/office/drawing/2014/main" id="{C0EEE9D5-684E-4043-9BD0-A4D5D405C568}"/>
-              </a:ext>
-            </a:extLst>
-          </p:cNvPr>
-          <p:cNvCxnSpPr/>
-          <p:nvPr/>
-        </p:nvCxnSpPr>
-        <p:spPr>
-          <a:xfrm>
-            <a:off x="3691156" y="3498209"/>
-            <a:ext cx="0" cy="822121"/>
-          </a:xfrm>
-          <a:prstGeom prst="line">
-            <a:avLst/>
-          </a:prstGeom>
-        </p:spPr>
-        <p:style>
-          <a:lnRef idx="1">
-            <a:schemeClr val="accent1"/>
-          </a:lnRef>
-          <a:fillRef idx="0">
-            <a:schemeClr val="accent1"/>
-          </a:fillRef>
-          <a:effectRef idx="0">
-            <a:schemeClr val="accent1"/>
-          </a:effectRef>
-          <a:fontRef idx="minor">
-            <a:schemeClr val="tx1"/>
-          </a:fontRef>
-        </p:style>
-      </p:cxnSp>
-      <p:cxnSp>
-        <p:nvCxnSpPr>
-          <p:cNvPr id="19" name="Straight Connector 18">
-            <a:extLst>
-              <a:ext uri="{FF2B5EF4-FFF2-40B4-BE49-F238E27FC236}">
-                <a16:creationId xmlns:a16="http://schemas.microsoft.com/office/drawing/2014/main" id="{13B7F9FF-4F5A-428E-8A82-FE8C7C2F40B5}"/>
-              </a:ext>
-            </a:extLst>
-          </p:cNvPr>
-          <p:cNvCxnSpPr/>
-          <p:nvPr/>
-        </p:nvCxnSpPr>
-        <p:spPr>
-          <a:xfrm>
-            <a:off x="4447563" y="3498208"/>
-            <a:ext cx="0" cy="822121"/>
-          </a:xfrm>
-          <a:prstGeom prst="line">
-            <a:avLst/>
-          </a:prstGeom>
-        </p:spPr>
-        <p:style>
-          <a:lnRef idx="1">
-            <a:schemeClr val="accent1"/>
-          </a:lnRef>
-          <a:fillRef idx="0">
-            <a:schemeClr val="accent1"/>
-          </a:fillRef>
-          <a:effectRef idx="0">
-            <a:schemeClr val="accent1"/>
-          </a:effectRef>
-          <a:fontRef idx="minor">
-            <a:schemeClr val="tx1"/>
-          </a:fontRef>
-        </p:style>
-      </p:cxnSp>
-      <p:cxnSp>
-        <p:nvCxnSpPr>
-          <p:cNvPr id="20" name="Straight Connector 19">
-            <a:extLst>
-              <a:ext uri="{FF2B5EF4-FFF2-40B4-BE49-F238E27FC236}">
-                <a16:creationId xmlns:a16="http://schemas.microsoft.com/office/drawing/2014/main" id="{6AFB718B-5FE4-44EA-B898-DEBC1B3EDC24}"/>
-              </a:ext>
-            </a:extLst>
-          </p:cNvPr>
-          <p:cNvCxnSpPr/>
-          <p:nvPr/>
-        </p:nvCxnSpPr>
-        <p:spPr>
-          <a:xfrm>
-            <a:off x="5740866" y="3498208"/>
-            <a:ext cx="0" cy="822121"/>
-          </a:xfrm>
-          <a:prstGeom prst="line">
-            <a:avLst/>
-          </a:prstGeom>
-        </p:spPr>
-        <p:style>
-          <a:lnRef idx="1">
-            <a:schemeClr val="accent1"/>
-          </a:lnRef>
-          <a:fillRef idx="0">
-            <a:schemeClr val="accent1"/>
-          </a:fillRef>
-          <a:effectRef idx="0">
-            <a:schemeClr val="accent1"/>
-          </a:effectRef>
-          <a:fontRef idx="minor">
-            <a:schemeClr val="tx1"/>
-          </a:fontRef>
-        </p:style>
-      </p:cxnSp>
-      <p:cxnSp>
-        <p:nvCxnSpPr>
-          <p:cNvPr id="21" name="Straight Connector 20">
-            <a:extLst>
-              <a:ext uri="{FF2B5EF4-FFF2-40B4-BE49-F238E27FC236}">
-                <a16:creationId xmlns:a16="http://schemas.microsoft.com/office/drawing/2014/main" id="{5E3F9216-A7BE-4A99-9AB1-952DE90C0662}"/>
-              </a:ext>
-            </a:extLst>
-          </p:cNvPr>
-          <p:cNvCxnSpPr/>
-          <p:nvPr/>
-        </p:nvCxnSpPr>
-        <p:spPr>
-          <a:xfrm>
-            <a:off x="6547437" y="3498208"/>
-            <a:ext cx="0" cy="822121"/>
-          </a:xfrm>
-          <a:prstGeom prst="line">
-            <a:avLst/>
-          </a:prstGeom>
-        </p:spPr>
-        <p:style>
-          <a:lnRef idx="1">
-            <a:schemeClr val="accent1"/>
-          </a:lnRef>
-          <a:fillRef idx="0">
-            <a:schemeClr val="accent1"/>
-          </a:fillRef>
-          <a:effectRef idx="0">
-            <a:schemeClr val="accent1"/>
-          </a:effectRef>
-          <a:fontRef idx="minor">
-            <a:schemeClr val="tx1"/>
-          </a:fontRef>
-        </p:style>
-      </p:cxnSp>
-      <p:cxnSp>
-        <p:nvCxnSpPr>
-          <p:cNvPr id="24" name="Straight Connector 23">
-            <a:extLst>
-              <a:ext uri="{FF2B5EF4-FFF2-40B4-BE49-F238E27FC236}">
-                <a16:creationId xmlns:a16="http://schemas.microsoft.com/office/drawing/2014/main" id="{ECEBF768-63D4-486B-A33F-A3440837C216}"/>
-              </a:ext>
-            </a:extLst>
-          </p:cNvPr>
-          <p:cNvCxnSpPr/>
-          <p:nvPr/>
-        </p:nvCxnSpPr>
-        <p:spPr>
-          <a:xfrm>
-            <a:off x="2986481" y="3498208"/>
-            <a:ext cx="0" cy="822121"/>
-          </a:xfrm>
-          <a:prstGeom prst="line">
-            <a:avLst/>
-          </a:prstGeom>
-        </p:spPr>
-        <p:style>
-          <a:lnRef idx="1">
-            <a:schemeClr val="accent1"/>
-          </a:lnRef>
-          <a:fillRef idx="0">
-            <a:schemeClr val="accent1"/>
-          </a:fillRef>
-          <a:effectRef idx="0">
-            <a:schemeClr val="accent1"/>
-          </a:effectRef>
-          <a:fontRef idx="minor">
-            <a:schemeClr val="tx1"/>
-          </a:fontRef>
-        </p:style>
-      </p:cxnSp>
-      <p:cxnSp>
-        <p:nvCxnSpPr>
-          <p:cNvPr id="25" name="Straight Connector 24">
-            <a:extLst>
-              <a:ext uri="{FF2B5EF4-FFF2-40B4-BE49-F238E27FC236}">
-                <a16:creationId xmlns:a16="http://schemas.microsoft.com/office/drawing/2014/main" id="{41DA78D4-2056-4FD7-918D-35DD647FAC53}"/>
-              </a:ext>
-            </a:extLst>
-          </p:cNvPr>
-          <p:cNvCxnSpPr/>
-          <p:nvPr/>
-        </p:nvCxnSpPr>
-        <p:spPr>
-          <a:xfrm>
-            <a:off x="2224481" y="3498208"/>
-            <a:ext cx="0" cy="822121"/>
-          </a:xfrm>
-          <a:prstGeom prst="line">
-            <a:avLst/>
-          </a:prstGeom>
-        </p:spPr>
-        <p:style>
-          <a:lnRef idx="1">
-            <a:schemeClr val="accent1"/>
-          </a:lnRef>
-          <a:fillRef idx="0">
-            <a:schemeClr val="accent1"/>
-          </a:fillRef>
-          <a:effectRef idx="0">
-            <a:schemeClr val="accent1"/>
-          </a:effectRef>
-          <a:fontRef idx="minor">
-            <a:schemeClr val="tx1"/>
-          </a:fontRef>
-        </p:style>
-      </p:cxnSp>
-      <p:sp>
-        <p:nvSpPr>
-          <p:cNvPr id="26" name="Rectangle 25">
-            <a:extLst>
-              <a:ext uri="{FF2B5EF4-FFF2-40B4-BE49-F238E27FC236}">
-                <a16:creationId xmlns:a16="http://schemas.microsoft.com/office/drawing/2014/main" id="{D6CB9168-6994-43DE-889E-35C0B5182226}"/>
-              </a:ext>
-            </a:extLst>
-          </p:cNvPr>
-          <p:cNvSpPr/>
-          <p:nvPr/>
-        </p:nvSpPr>
-        <p:spPr>
-          <a:xfrm>
-            <a:off x="1879134" y="4352379"/>
-            <a:ext cx="5058558" cy="1024964"/>
-          </a:xfrm>
-          <a:prstGeom prst="rect">
-            <a:avLst/>
-          </a:prstGeom>
-          <a:noFill/>
-        </p:spPr>
-        <p:style>
-          <a:lnRef idx="2">
-            <a:schemeClr val="accent1">
-              <a:shade val="50000"/>
-            </a:schemeClr>
-          </a:lnRef>
-          <a:fillRef idx="1">
-            <a:schemeClr val="accent1"/>
-          </a:fillRef>
-          <a:effectRef idx="0">
-            <a:schemeClr val="accent1"/>
-          </a:effectRef>
-          <a:fontRef idx="minor">
-            <a:schemeClr val="lt1"/>
-          </a:fontRef>
-        </p:style>
-        <p:txBody>
-          <a:bodyPr rtlCol="0" anchor="ctr"/>
-          <a:lstStyle/>
-          <a:p>
-            <a:pPr algn="ctr"/>
-            <a:endParaRPr lang="en-US"/>
-          </a:p>
-        </p:txBody>
-      </p:sp>
-      <p:sp>
-        <p:nvSpPr>
-          <p:cNvPr id="27" name="TextBox 26">
-            <a:extLst>
-              <a:ext uri="{FF2B5EF4-FFF2-40B4-BE49-F238E27FC236}">
-                <a16:creationId xmlns:a16="http://schemas.microsoft.com/office/drawing/2014/main" id="{870119F7-0201-48E8-92DD-FB68E4DEDB6A}"/>
-              </a:ext>
-            </a:extLst>
-          </p:cNvPr>
-          <p:cNvSpPr txBox="1"/>
-          <p:nvPr/>
-        </p:nvSpPr>
-        <p:spPr>
-          <a:xfrm>
-            <a:off x="2828486" y="4889165"/>
-            <a:ext cx="3137484" cy="369332"/>
-          </a:xfrm>
-          <a:prstGeom prst="rect">
-            <a:avLst/>
-          </a:prstGeom>
-          <a:noFill/>
-        </p:spPr>
-        <p:txBody>
-          <a:bodyPr wrap="square" rtlCol="0">
-            <a:spAutoFit/>
-          </a:bodyPr>
-          <a:lstStyle/>
-          <a:p>
-            <a:r>
-              <a:rPr lang="en-US" dirty="0"/>
-              <a:t>Weekly Visiting Frequency</a:t>
-            </a:r>
-          </a:p>
-        </p:txBody>
-      </p:sp>
-      <p:sp>
-        <p:nvSpPr>
-          <p:cNvPr id="28" name="TextBox 27">
-            <a:extLst>
-              <a:ext uri="{FF2B5EF4-FFF2-40B4-BE49-F238E27FC236}">
-                <a16:creationId xmlns:a16="http://schemas.microsoft.com/office/drawing/2014/main" id="{46CE1A09-1BCF-4A54-9ACF-C7C6D1B0612B}"/>
-              </a:ext>
-            </a:extLst>
-          </p:cNvPr>
-          <p:cNvSpPr txBox="1"/>
-          <p:nvPr/>
-        </p:nvSpPr>
-        <p:spPr>
-          <a:xfrm>
-            <a:off x="7837498" y="2583809"/>
-            <a:ext cx="3605074" cy="1754326"/>
-          </a:xfrm>
-          <a:prstGeom prst="rect">
-            <a:avLst/>
-          </a:prstGeom>
-          <a:noFill/>
-        </p:spPr>
-        <p:txBody>
-          <a:bodyPr wrap="square" rtlCol="0">
-            <a:spAutoFit/>
-          </a:bodyPr>
-          <a:lstStyle/>
-          <a:p>
-            <a:r>
-              <a:rPr lang="en-US" dirty="0"/>
-              <a:t>The 80/20 rule is used to approximate profit from sub-communities of engagement.</a:t>
-            </a:r>
-          </a:p>
-          <a:p>
-            <a:endParaRPr lang="en-US" dirty="0"/>
-          </a:p>
-          <a:p>
-            <a:r>
-              <a:rPr lang="en-US" dirty="0"/>
-              <a:t>Assumes exclusive sub-communities.</a:t>
-            </a:r>
-          </a:p>
-        </p:txBody>
-      </p:sp>
-    </p:spTree>
-    <p:extLst>
-      <p:ext uri="{BB962C8B-B14F-4D97-AF65-F5344CB8AC3E}">
-        <p14:creationId xmlns:p14="http://schemas.microsoft.com/office/powerpoint/2010/main" val="4062344240"/>
       </p:ext>
     </p:extLst>
   </p:cSld>

</xml_diff>